<commit_message>
Updated books to read
</commit_message>
<xml_diff>
--- a/Presentation/books-to-read.pptx
+++ b/Presentation/books-to-read.pptx
@@ -5,7 +5,7 @@
     <p:sldMasterId id="2147483648" r:id="rId1"/>
   </p:sldMasterIdLst>
   <p:notesMasterIdLst>
-    <p:notesMasterId r:id="rId20"/>
+    <p:notesMasterId r:id="rId22"/>
   </p:notesMasterIdLst>
   <p:sldIdLst>
     <p:sldId id="258" r:id="rId2"/>
@@ -22,10 +22,12 @@
     <p:sldId id="262" r:id="rId13"/>
     <p:sldId id="260" r:id="rId14"/>
     <p:sldId id="263" r:id="rId15"/>
-    <p:sldId id="264" r:id="rId16"/>
-    <p:sldId id="261" r:id="rId17"/>
-    <p:sldId id="275" r:id="rId18"/>
-    <p:sldId id="276" r:id="rId19"/>
+    <p:sldId id="281" r:id="rId16"/>
+    <p:sldId id="280" r:id="rId17"/>
+    <p:sldId id="264" r:id="rId18"/>
+    <p:sldId id="261" r:id="rId19"/>
+    <p:sldId id="275" r:id="rId20"/>
+    <p:sldId id="276" r:id="rId21"/>
   </p:sldIdLst>
   <p:sldSz cx="9144000" cy="6858000" type="screen4x3"/>
   <p:notesSz cx="6858000" cy="9144000"/>
@@ -209,7 +211,7 @@
           <a:p>
             <a:fld id="{B24A7054-7FFB-49F4-A126-5DF6E687FF53}" type="datetimeFigureOut">
               <a:rPr lang="ru-RU" smtClean="0"/>
-              <a:t>15.09.2014</a:t>
+              <a:t>19.09.2014</a:t>
             </a:fld>
             <a:endParaRPr lang="ru-RU"/>
           </a:p>
@@ -1491,7 +1493,7 @@
           <a:p>
             <a:fld id="{8E6E6A2A-E9D3-4A0D-B04A-ABDD367A1E08}" type="datetimeFigureOut">
               <a:rPr lang="ru-RU" smtClean="0"/>
-              <a:t>15.09.2014</a:t>
+              <a:t>19.09.2014</a:t>
             </a:fld>
             <a:endParaRPr lang="ru-RU"/>
           </a:p>
@@ -2936,7 +2938,7 @@
           <a:p>
             <a:fld id="{AC3D3127-B7C4-45E3-9797-C527EC9FDD78}" type="datetimeFigureOut">
               <a:rPr lang="ru-RU" smtClean="0"/>
-              <a:t>15.09.2014</a:t>
+              <a:t>19.09.2014</a:t>
             </a:fld>
             <a:endParaRPr lang="ru-RU"/>
           </a:p>
@@ -4260,6 +4262,261 @@
 </file>
 
 <file path=ppt/slides/slide14.xml><?xml version="1.0" encoding="utf-8"?>
+<p:sld xmlns:a="http://schemas.openxmlformats.org/drawingml/2006/main" xmlns:r="http://schemas.openxmlformats.org/officeDocument/2006/relationships" xmlns:p="http://schemas.openxmlformats.org/presentationml/2006/main" show="0">
+  <p:cSld>
+    <p:spTree>
+      <p:nvGrpSpPr>
+        <p:cNvPr id="1" name=""/>
+        <p:cNvGrpSpPr/>
+        <p:nvPr/>
+      </p:nvGrpSpPr>
+      <p:grpSpPr>
+        <a:xfrm>
+          <a:off x="0" y="0"/>
+          <a:ext cx="0" cy="0"/>
+          <a:chOff x="0" y="0"/>
+          <a:chExt cx="0" cy="0"/>
+        </a:xfrm>
+      </p:grpSpPr>
+      <p:sp>
+        <p:nvSpPr>
+          <p:cNvPr id="2" name="Title 1"/>
+          <p:cNvSpPr>
+            <a:spLocks noGrp="1"/>
+          </p:cNvSpPr>
+          <p:nvPr>
+            <p:ph type="title"/>
+          </p:nvPr>
+        </p:nvSpPr>
+        <p:spPr>
+          <a:xfrm>
+            <a:off x="457200" y="2857500"/>
+            <a:ext cx="8229600" cy="1143000"/>
+          </a:xfrm>
+        </p:spPr>
+        <p:txBody>
+          <a:bodyPr/>
+          <a:lstStyle/>
+          <a:p>
+            <a:r>
+              <a:rPr lang="en-US" dirty="0" smtClean="0"/>
+              <a:t>ADO.NET / </a:t>
+            </a:r>
+            <a:r>
+              <a:rPr lang="en-US" dirty="0" err="1" smtClean="0"/>
+              <a:t>EntityFramework</a:t>
+            </a:r>
+            <a:endParaRPr lang="ru-RU" dirty="0"/>
+          </a:p>
+        </p:txBody>
+      </p:sp>
+    </p:spTree>
+    <p:extLst>
+      <p:ext uri="{BB962C8B-B14F-4D97-AF65-F5344CB8AC3E}">
+        <p14:creationId xmlns:p14="http://schemas.microsoft.com/office/powerpoint/2010/main" val="2493670811"/>
+      </p:ext>
+    </p:extLst>
+  </p:cSld>
+  <p:clrMapOvr>
+    <a:masterClrMapping/>
+  </p:clrMapOvr>
+  <mc:AlternateContent xmlns:mc="http://schemas.openxmlformats.org/markup-compatibility/2006">
+    <mc:Choice xmlns:p14="http://schemas.microsoft.com/office/powerpoint/2010/main" Requires="p14">
+      <p:transition spd="slow" p14:dur="2000"/>
+    </mc:Choice>
+    <mc:Fallback>
+      <p:transition spd="slow"/>
+    </mc:Fallback>
+  </mc:AlternateContent>
+  <p:timing>
+    <p:tnLst>
+      <p:par>
+        <p:cTn id="1" dur="indefinite" restart="never" nodeType="tmRoot"/>
+      </p:par>
+    </p:tnLst>
+  </p:timing>
+</p:sld>
+</file>
+
+<file path=ppt/slides/slide15.xml><?xml version="1.0" encoding="utf-8"?>
+<p:sld xmlns:a="http://schemas.openxmlformats.org/drawingml/2006/main" xmlns:r="http://schemas.openxmlformats.org/officeDocument/2006/relationships" xmlns:p="http://schemas.openxmlformats.org/presentationml/2006/main" show="0">
+  <p:cSld>
+    <p:spTree>
+      <p:nvGrpSpPr>
+        <p:cNvPr id="1" name=""/>
+        <p:cNvGrpSpPr/>
+        <p:nvPr/>
+      </p:nvGrpSpPr>
+      <p:grpSpPr>
+        <a:xfrm>
+          <a:off x="0" y="0"/>
+          <a:ext cx="0" cy="0"/>
+          <a:chOff x="0" y="0"/>
+          <a:chExt cx="0" cy="0"/>
+        </a:xfrm>
+      </p:grpSpPr>
+      <p:sp>
+        <p:nvSpPr>
+          <p:cNvPr id="2" name="Title 1"/>
+          <p:cNvSpPr>
+            <a:spLocks noGrp="1"/>
+          </p:cNvSpPr>
+          <p:nvPr>
+            <p:ph type="title"/>
+          </p:nvPr>
+        </p:nvSpPr>
+        <p:spPr/>
+        <p:txBody>
+          <a:bodyPr/>
+          <a:lstStyle/>
+          <a:p>
+            <a:r>
+              <a:rPr lang="en-US" dirty="0" smtClean="0"/>
+              <a:t>Review</a:t>
+            </a:r>
+            <a:endParaRPr lang="ru-RU" dirty="0"/>
+          </a:p>
+        </p:txBody>
+      </p:sp>
+      <p:sp>
+        <p:nvSpPr>
+          <p:cNvPr id="3" name="Content Placeholder 2"/>
+          <p:cNvSpPr>
+            <a:spLocks noGrp="1"/>
+          </p:cNvSpPr>
+          <p:nvPr>
+            <p:ph idx="1"/>
+          </p:nvPr>
+        </p:nvSpPr>
+        <p:spPr/>
+        <p:txBody>
+          <a:bodyPr>
+            <a:normAutofit fontScale="92500"/>
+          </a:bodyPr>
+          <a:lstStyle/>
+          <a:p>
+            <a:r>
+              <a:rPr lang="en-US" dirty="0"/>
+              <a:t>Programming Entity Framework: </a:t>
+            </a:r>
+            <a:r>
+              <a:rPr lang="en-US" dirty="0" err="1" smtClean="0"/>
+              <a:t>DbContext</a:t>
+            </a:r>
+            <a:r>
+              <a:rPr lang="en-US" dirty="0"/>
+              <a:t/>
+            </a:r>
+            <a:br>
+              <a:rPr lang="en-US" dirty="0"/>
+            </a:br>
+            <a:r>
+              <a:rPr lang="en-US" dirty="0" smtClean="0"/>
+              <a:t>Julia </a:t>
+            </a:r>
+            <a:r>
+              <a:rPr lang="en-US" dirty="0" err="1" smtClean="0"/>
+              <a:t>Lerman</a:t>
+            </a:r>
+            <a:r>
+              <a:rPr lang="en-US" dirty="0" smtClean="0"/>
+              <a:t>, </a:t>
+            </a:r>
+            <a:r>
+              <a:rPr lang="en-US" dirty="0"/>
+              <a:t>Rowan </a:t>
+            </a:r>
+            <a:r>
+              <a:rPr lang="en-US" dirty="0" smtClean="0"/>
+              <a:t>Miller</a:t>
+            </a:r>
+          </a:p>
+          <a:p>
+            <a:r>
+              <a:rPr lang="en-US" dirty="0"/>
+              <a:t>Programming Entity Framework: Code First</a:t>
+            </a:r>
+            <a:br>
+              <a:rPr lang="en-US" dirty="0"/>
+            </a:br>
+            <a:r>
+              <a:rPr lang="en-US" dirty="0"/>
+              <a:t>Julia </a:t>
+            </a:r>
+            <a:r>
+              <a:rPr lang="en-US" dirty="0" err="1"/>
+              <a:t>Lerman</a:t>
+            </a:r>
+            <a:r>
+              <a:rPr lang="en-US" dirty="0"/>
+              <a:t>, Rowan Miller</a:t>
+            </a:r>
+            <a:br>
+              <a:rPr lang="en-US" dirty="0"/>
+            </a:br>
+            <a:r>
+              <a:rPr lang="en-US" dirty="0"/>
+              <a:t>Programming Entity Framework: Building Data Centric Apps with the ADO.NET Entity </a:t>
+            </a:r>
+            <a:r>
+              <a:rPr lang="en-US" dirty="0" smtClean="0"/>
+              <a:t>Framework</a:t>
+            </a:r>
+            <a:br>
+              <a:rPr lang="en-US" dirty="0" smtClean="0"/>
+            </a:br>
+            <a:r>
+              <a:rPr lang="en-US" dirty="0"/>
+              <a:t>Julia </a:t>
+            </a:r>
+            <a:r>
+              <a:rPr lang="en-US" dirty="0" err="1" smtClean="0"/>
+              <a:t>Lerman</a:t>
+            </a:r>
+            <a:endParaRPr lang="en-US" dirty="0" smtClean="0"/>
+          </a:p>
+          <a:p>
+            <a:r>
+              <a:rPr lang="en-US" dirty="0"/>
+              <a:t>Entity Framework 6 </a:t>
+            </a:r>
+            <a:r>
+              <a:rPr lang="en-US" dirty="0" smtClean="0"/>
+              <a:t>Recipes</a:t>
+            </a:r>
+            <a:br>
+              <a:rPr lang="en-US" dirty="0" smtClean="0"/>
+            </a:br>
+            <a:r>
+              <a:rPr lang="en-US" dirty="0" smtClean="0"/>
+              <a:t>Brian Driscoll</a:t>
+            </a:r>
+            <a:endParaRPr lang="ru-RU" dirty="0"/>
+          </a:p>
+        </p:txBody>
+      </p:sp>
+    </p:spTree>
+    <p:extLst>
+      <p:ext uri="{BB962C8B-B14F-4D97-AF65-F5344CB8AC3E}">
+        <p14:creationId xmlns:p14="http://schemas.microsoft.com/office/powerpoint/2010/main" val="589673823"/>
+      </p:ext>
+    </p:extLst>
+  </p:cSld>
+  <p:clrMapOvr>
+    <a:masterClrMapping/>
+  </p:clrMapOvr>
+  <mc:AlternateContent xmlns:mc="http://schemas.openxmlformats.org/markup-compatibility/2006">
+    <mc:Choice xmlns:p14="http://schemas.microsoft.com/office/powerpoint/2010/main" Requires="p14">
+      <p:transition spd="slow" p14:dur="2000"/>
+    </mc:Choice>
+    <mc:Fallback>
+      <p:transition spd="slow"/>
+    </mc:Fallback>
+  </mc:AlternateContent>
+</p:sld>
+</file>
+
+<file path=ppt/slides/slide16.xml><?xml version="1.0" encoding="utf-8"?>
 <p:sld xmlns:a="http://schemas.openxmlformats.org/drawingml/2006/main" xmlns:r="http://schemas.openxmlformats.org/officeDocument/2006/relationships" xmlns:p="http://schemas.openxmlformats.org/presentationml/2006/main">
   <p:cSld>
     <p:spTree>
@@ -4307,7 +4564,7 @@
     </p:spTree>
     <p:extLst>
       <p:ext uri="{BB962C8B-B14F-4D97-AF65-F5344CB8AC3E}">
-        <p14:creationId xmlns:p14="http://schemas.microsoft.com/office/powerpoint/2010/main" val="2493670811"/>
+        <p14:creationId xmlns:p14="http://schemas.microsoft.com/office/powerpoint/2010/main" val="1206248273"/>
       </p:ext>
     </p:extLst>
   </p:cSld>
@@ -4324,7 +4581,7 @@
 </p:sld>
 </file>
 
-<file path=ppt/slides/slide15.xml><?xml version="1.0" encoding="utf-8"?>
+<file path=ppt/slides/slide17.xml><?xml version="1.0" encoding="utf-8"?>
 <p:sld xmlns:a="http://schemas.openxmlformats.org/drawingml/2006/main" xmlns:r="http://schemas.openxmlformats.org/officeDocument/2006/relationships" xmlns:p="http://schemas.openxmlformats.org/presentationml/2006/main">
   <p:cSld>
     <p:spTree>
@@ -4505,7 +4762,7 @@
 </p:sld>
 </file>
 
-<file path=ppt/slides/slide16.xml><?xml version="1.0" encoding="utf-8"?>
+<file path=ppt/slides/slide18.xml><?xml version="1.0" encoding="utf-8"?>
 <p:sld xmlns:a="http://schemas.openxmlformats.org/drawingml/2006/main" xmlns:r="http://schemas.openxmlformats.org/officeDocument/2006/relationships" xmlns:p="http://schemas.openxmlformats.org/presentationml/2006/main">
   <p:cSld>
     <p:spTree>
@@ -4572,7 +4829,7 @@
 </p:sld>
 </file>
 
-<file path=ppt/slides/slide17.xml><?xml version="1.0" encoding="utf-8"?>
+<file path=ppt/slides/slide19.xml><?xml version="1.0" encoding="utf-8"?>
 <p:sld xmlns:a="http://schemas.openxmlformats.org/drawingml/2006/main" xmlns:r="http://schemas.openxmlformats.org/officeDocument/2006/relationships" xmlns:p="http://schemas.openxmlformats.org/presentationml/2006/main">
   <p:cSld>
     <p:spTree>
@@ -4719,106 +4976,6 @@
 </p:sld>
 </file>
 
-<file path=ppt/slides/slide18.xml><?xml version="1.0" encoding="utf-8"?>
-<p:sld xmlns:a="http://schemas.openxmlformats.org/drawingml/2006/main" xmlns:r="http://schemas.openxmlformats.org/officeDocument/2006/relationships" xmlns:p="http://schemas.openxmlformats.org/presentationml/2006/main">
-  <p:cSld>
-    <p:spTree>
-      <p:nvGrpSpPr>
-        <p:cNvPr id="1" name=""/>
-        <p:cNvGrpSpPr/>
-        <p:nvPr/>
-      </p:nvGrpSpPr>
-      <p:grpSpPr>
-        <a:xfrm>
-          <a:off x="0" y="0"/>
-          <a:ext cx="0" cy="0"/>
-          <a:chOff x="0" y="0"/>
-          <a:chExt cx="0" cy="0"/>
-        </a:xfrm>
-      </p:grpSpPr>
-      <p:sp>
-        <p:nvSpPr>
-          <p:cNvPr id="2" name="Title 1"/>
-          <p:cNvSpPr>
-            <a:spLocks noGrp="1"/>
-          </p:cNvSpPr>
-          <p:nvPr>
-            <p:ph type="title"/>
-          </p:nvPr>
-        </p:nvSpPr>
-        <p:spPr/>
-        <p:txBody>
-          <a:bodyPr/>
-          <a:lstStyle/>
-          <a:p>
-            <a:r>
-              <a:rPr lang="ru-RU" dirty="0"/>
-              <a:t>Бесплатные электронные книги</a:t>
-            </a:r>
-          </a:p>
-        </p:txBody>
-      </p:sp>
-      <p:sp>
-        <p:nvSpPr>
-          <p:cNvPr id="3" name="Content Placeholder 2"/>
-          <p:cNvSpPr>
-            <a:spLocks noGrp="1"/>
-          </p:cNvSpPr>
-          <p:nvPr>
-            <p:ph idx="1"/>
-          </p:nvPr>
-        </p:nvSpPr>
-        <p:spPr/>
-        <p:txBody>
-          <a:bodyPr>
-            <a:normAutofit/>
-          </a:bodyPr>
-          <a:lstStyle/>
-          <a:p>
-            <a:r>
-              <a:rPr lang="ru-RU" sz="2800" dirty="0"/>
-              <a:t>Виртуальная академия </a:t>
-            </a:r>
-            <a:r>
-              <a:rPr lang="en-US" sz="2800" dirty="0" smtClean="0"/>
-              <a:t>Microsoft</a:t>
-            </a:r>
-            <a:r>
-              <a:rPr lang="ru-RU" sz="2800" dirty="0" smtClean="0"/>
-              <a:t/>
-            </a:r>
-            <a:br>
-              <a:rPr lang="ru-RU" sz="2800" dirty="0" smtClean="0"/>
-            </a:br>
-            <a:r>
-              <a:rPr lang="en-US" sz="2800" dirty="0" smtClean="0">
-                <a:hlinkClick r:id="rId2"/>
-              </a:rPr>
-              <a:t>http</a:t>
-            </a:r>
-            <a:r>
-              <a:rPr lang="en-US" sz="2800" dirty="0">
-                <a:hlinkClick r:id="rId2"/>
-              </a:rPr>
-              <a:t>://www.microsoftvirtualacademy.com/ebooks</a:t>
-            </a:r>
-            <a:endParaRPr lang="ru-RU" sz="2800" dirty="0"/>
-          </a:p>
-        </p:txBody>
-      </p:sp>
-    </p:spTree>
-    <p:extLst>
-      <p:ext uri="{BB962C8B-B14F-4D97-AF65-F5344CB8AC3E}">
-        <p14:creationId xmlns:p14="http://schemas.microsoft.com/office/powerpoint/2010/main" val="2763383620"/>
-      </p:ext>
-    </p:extLst>
-  </p:cSld>
-  <p:clrMapOvr>
-    <a:masterClrMapping/>
-  </p:clrMapOvr>
-</p:sld>
-</file>
-
 <file path=ppt/slides/slide2.xml><?xml version="1.0" encoding="utf-8"?>
 <p:sld xmlns:a="http://schemas.openxmlformats.org/drawingml/2006/main" xmlns:r="http://schemas.openxmlformats.org/officeDocument/2006/relationships" xmlns:p="http://schemas.openxmlformats.org/presentationml/2006/main">
   <p:cSld>
@@ -4995,6 +5152,106 @@
       </p:par>
     </p:tnLst>
   </p:timing>
+</p:sld>
+</file>
+
+<file path=ppt/slides/slide20.xml><?xml version="1.0" encoding="utf-8"?>
+<p:sld xmlns:a="http://schemas.openxmlformats.org/drawingml/2006/main" xmlns:r="http://schemas.openxmlformats.org/officeDocument/2006/relationships" xmlns:p="http://schemas.openxmlformats.org/presentationml/2006/main">
+  <p:cSld>
+    <p:spTree>
+      <p:nvGrpSpPr>
+        <p:cNvPr id="1" name=""/>
+        <p:cNvGrpSpPr/>
+        <p:nvPr/>
+      </p:nvGrpSpPr>
+      <p:grpSpPr>
+        <a:xfrm>
+          <a:off x="0" y="0"/>
+          <a:ext cx="0" cy="0"/>
+          <a:chOff x="0" y="0"/>
+          <a:chExt cx="0" cy="0"/>
+        </a:xfrm>
+      </p:grpSpPr>
+      <p:sp>
+        <p:nvSpPr>
+          <p:cNvPr id="2" name="Title 1"/>
+          <p:cNvSpPr>
+            <a:spLocks noGrp="1"/>
+          </p:cNvSpPr>
+          <p:nvPr>
+            <p:ph type="title"/>
+          </p:nvPr>
+        </p:nvSpPr>
+        <p:spPr/>
+        <p:txBody>
+          <a:bodyPr/>
+          <a:lstStyle/>
+          <a:p>
+            <a:r>
+              <a:rPr lang="ru-RU" dirty="0"/>
+              <a:t>Бесплатные электронные книги</a:t>
+            </a:r>
+          </a:p>
+        </p:txBody>
+      </p:sp>
+      <p:sp>
+        <p:nvSpPr>
+          <p:cNvPr id="3" name="Content Placeholder 2"/>
+          <p:cNvSpPr>
+            <a:spLocks noGrp="1"/>
+          </p:cNvSpPr>
+          <p:nvPr>
+            <p:ph idx="1"/>
+          </p:nvPr>
+        </p:nvSpPr>
+        <p:spPr/>
+        <p:txBody>
+          <a:bodyPr>
+            <a:normAutofit/>
+          </a:bodyPr>
+          <a:lstStyle/>
+          <a:p>
+            <a:r>
+              <a:rPr lang="ru-RU" sz="2800" dirty="0"/>
+              <a:t>Виртуальная академия </a:t>
+            </a:r>
+            <a:r>
+              <a:rPr lang="en-US" sz="2800" dirty="0" smtClean="0"/>
+              <a:t>Microsoft</a:t>
+            </a:r>
+            <a:r>
+              <a:rPr lang="ru-RU" sz="2800" dirty="0" smtClean="0"/>
+              <a:t/>
+            </a:r>
+            <a:br>
+              <a:rPr lang="ru-RU" sz="2800" dirty="0" smtClean="0"/>
+            </a:br>
+            <a:r>
+              <a:rPr lang="en-US" sz="2800" dirty="0" smtClean="0">
+                <a:hlinkClick r:id="rId2"/>
+              </a:rPr>
+              <a:t>http</a:t>
+            </a:r>
+            <a:r>
+              <a:rPr lang="en-US" sz="2800" dirty="0">
+                <a:hlinkClick r:id="rId2"/>
+              </a:rPr>
+              <a:t>://www.microsoftvirtualacademy.com/ebooks</a:t>
+            </a:r>
+            <a:endParaRPr lang="ru-RU" sz="2800" dirty="0"/>
+          </a:p>
+        </p:txBody>
+      </p:sp>
+    </p:spTree>
+    <p:extLst>
+      <p:ext uri="{BB962C8B-B14F-4D97-AF65-F5344CB8AC3E}">
+        <p14:creationId xmlns:p14="http://schemas.microsoft.com/office/powerpoint/2010/main" val="2763383620"/>
+      </p:ext>
+    </p:extLst>
+  </p:cSld>
+  <p:clrMapOvr>
+    <a:masterClrMapping/>
+  </p:clrMapOvr>
 </p:sld>
 </file>
 

</xml_diff>

<commit_message>
Added Jonh Skeet book
</commit_message>
<xml_diff>
--- a/Presentation/books-to-read.pptx
+++ b/Presentation/books-to-read.pptx
@@ -5,29 +5,30 @@
     <p:sldMasterId id="2147483648" r:id="rId1"/>
   </p:sldMasterIdLst>
   <p:notesMasterIdLst>
-    <p:notesMasterId r:id="rId22"/>
+    <p:notesMasterId r:id="rId23"/>
   </p:notesMasterIdLst>
   <p:sldIdLst>
     <p:sldId id="258" r:id="rId2"/>
     <p:sldId id="269" r:id="rId3"/>
     <p:sldId id="270" r:id="rId4"/>
-    <p:sldId id="277" r:id="rId5"/>
-    <p:sldId id="271" r:id="rId6"/>
-    <p:sldId id="265" r:id="rId7"/>
-    <p:sldId id="268" r:id="rId8"/>
-    <p:sldId id="279" r:id="rId9"/>
-    <p:sldId id="278" r:id="rId10"/>
-    <p:sldId id="272" r:id="rId11"/>
-    <p:sldId id="259" r:id="rId12"/>
-    <p:sldId id="262" r:id="rId13"/>
-    <p:sldId id="260" r:id="rId14"/>
-    <p:sldId id="263" r:id="rId15"/>
-    <p:sldId id="281" r:id="rId16"/>
-    <p:sldId id="280" r:id="rId17"/>
-    <p:sldId id="264" r:id="rId18"/>
-    <p:sldId id="261" r:id="rId19"/>
-    <p:sldId id="275" r:id="rId20"/>
-    <p:sldId id="276" r:id="rId21"/>
+    <p:sldId id="282" r:id="rId5"/>
+    <p:sldId id="277" r:id="rId6"/>
+    <p:sldId id="271" r:id="rId7"/>
+    <p:sldId id="265" r:id="rId8"/>
+    <p:sldId id="268" r:id="rId9"/>
+    <p:sldId id="279" r:id="rId10"/>
+    <p:sldId id="278" r:id="rId11"/>
+    <p:sldId id="272" r:id="rId12"/>
+    <p:sldId id="259" r:id="rId13"/>
+    <p:sldId id="262" r:id="rId14"/>
+    <p:sldId id="260" r:id="rId15"/>
+    <p:sldId id="263" r:id="rId16"/>
+    <p:sldId id="281" r:id="rId17"/>
+    <p:sldId id="280" r:id="rId18"/>
+    <p:sldId id="264" r:id="rId19"/>
+    <p:sldId id="261" r:id="rId20"/>
+    <p:sldId id="275" r:id="rId21"/>
+    <p:sldId id="276" r:id="rId22"/>
   </p:sldIdLst>
   <p:sldSz cx="9144000" cy="6858000" type="screen4x3"/>
   <p:notesSz cx="6858000" cy="9144000"/>
@@ -211,7 +212,7 @@
           <a:p>
             <a:fld id="{B24A7054-7FFB-49F4-A126-5DF6E687FF53}" type="datetimeFigureOut">
               <a:rPr lang="ru-RU" smtClean="0"/>
-              <a:t>19.09.2014</a:t>
+              <a:t>14.02.2015</a:t>
             </a:fld>
             <a:endParaRPr lang="ru-RU"/>
           </a:p>
@@ -1493,7 +1494,7 @@
           <a:p>
             <a:fld id="{8E6E6A2A-E9D3-4A0D-B04A-ABDD367A1E08}" type="datetimeFigureOut">
               <a:rPr lang="ru-RU" smtClean="0"/>
-              <a:t>19.09.2014</a:t>
+              <a:t>14.02.2015</a:t>
             </a:fld>
             <a:endParaRPr lang="ru-RU"/>
           </a:p>
@@ -2938,7 +2939,7 @@
           <a:p>
             <a:fld id="{AC3D3127-B7C4-45E3-9797-C527EC9FDD78}" type="datetimeFigureOut">
               <a:rPr lang="ru-RU" smtClean="0"/>
-              <a:t>19.09.2014</a:t>
+              <a:t>14.02.2015</a:t>
             </a:fld>
             <a:endParaRPr lang="ru-RU"/>
           </a:p>
@@ -3523,6 +3524,230 @@
 </file>
 
 <file path=ppt/slides/slide10.xml><?xml version="1.0" encoding="utf-8"?>
+<p:sld xmlns:a="http://schemas.openxmlformats.org/drawingml/2006/main" xmlns:r="http://schemas.openxmlformats.org/officeDocument/2006/relationships" xmlns:p="http://schemas.openxmlformats.org/presentationml/2006/main" show="0">
+  <p:cSld>
+    <p:spTree>
+      <p:nvGrpSpPr>
+        <p:cNvPr id="1" name=""/>
+        <p:cNvGrpSpPr/>
+        <p:nvPr/>
+      </p:nvGrpSpPr>
+      <p:grpSpPr>
+        <a:xfrm>
+          <a:off x="0" y="0"/>
+          <a:ext cx="0" cy="0"/>
+          <a:chOff x="0" y="0"/>
+          <a:chExt cx="0" cy="0"/>
+        </a:xfrm>
+      </p:grpSpPr>
+      <p:sp>
+        <p:nvSpPr>
+          <p:cNvPr id="2" name="Title 1"/>
+          <p:cNvSpPr>
+            <a:spLocks noGrp="1"/>
+          </p:cNvSpPr>
+          <p:nvPr>
+            <p:ph type="title"/>
+          </p:nvPr>
+        </p:nvSpPr>
+        <p:spPr>
+          <a:noFill/>
+          <a:ln>
+            <a:solidFill>
+              <a:schemeClr val="tx1"/>
+            </a:solidFill>
+          </a:ln>
+        </p:spPr>
+        <p:txBody>
+          <a:bodyPr>
+            <a:noAutofit/>
+          </a:bodyPr>
+          <a:lstStyle/>
+          <a:p>
+            <a:r>
+              <a:rPr lang="ru-RU" sz="2400" i="1" dirty="0">
+                <a:solidFill>
+                  <a:srgbClr val="FFFF00"/>
+                </a:solidFill>
+              </a:rPr>
+              <a:t>Паттерны проектирования</a:t>
+            </a:r>
+            <a:r>
+              <a:rPr lang="en-US" sz="2400" i="1" dirty="0" smtClean="0"/>
+              <a:t/>
+            </a:r>
+            <a:br>
+              <a:rPr lang="en-US" sz="2400" i="1" dirty="0" smtClean="0"/>
+            </a:br>
+            <a:r>
+              <a:rPr lang="ru-RU" sz="2400" dirty="0"/>
+              <a:t>Эрик </a:t>
+            </a:r>
+            <a:r>
+              <a:rPr lang="ru-RU" sz="2400" dirty="0" smtClean="0"/>
+              <a:t>Фримен</a:t>
+            </a:r>
+            <a:r>
+              <a:rPr lang="en-US" sz="2400" dirty="0" smtClean="0"/>
+              <a:t>, </a:t>
+            </a:r>
+            <a:r>
+              <a:rPr lang="ru-RU" sz="2400" dirty="0"/>
+              <a:t>Элизабет </a:t>
+            </a:r>
+            <a:r>
+              <a:rPr lang="ru-RU" sz="2400" dirty="0" smtClean="0"/>
+              <a:t>Фримен</a:t>
+            </a:r>
+            <a:r>
+              <a:rPr lang="en-US" sz="2400" dirty="0" smtClean="0"/>
+              <a:t>, </a:t>
+            </a:r>
+            <a:r>
+              <a:rPr lang="ru-RU" sz="2400" dirty="0"/>
+              <a:t>Кэтти </a:t>
+            </a:r>
+            <a:r>
+              <a:rPr lang="ru-RU" sz="2400" dirty="0" smtClean="0"/>
+              <a:t>Сьерра</a:t>
+            </a:r>
+            <a:r>
+              <a:rPr lang="en-US" sz="2400" dirty="0" smtClean="0"/>
+              <a:t>, </a:t>
+            </a:r>
+            <a:r>
+              <a:rPr lang="ru-RU" sz="2400" dirty="0"/>
+              <a:t>Берт </a:t>
+            </a:r>
+            <a:r>
+              <a:rPr lang="ru-RU" sz="2400" dirty="0" smtClean="0"/>
+              <a:t>Бейтс</a:t>
+            </a:r>
+            <a:endParaRPr lang="ru-RU" sz="2400" dirty="0"/>
+          </a:p>
+        </p:txBody>
+      </p:sp>
+      <p:sp>
+        <p:nvSpPr>
+          <p:cNvPr id="3" name="Content Placeholder 2"/>
+          <p:cNvSpPr>
+            <a:spLocks noGrp="1"/>
+          </p:cNvSpPr>
+          <p:nvPr>
+            <p:ph idx="1"/>
+          </p:nvPr>
+        </p:nvSpPr>
+        <p:spPr>
+          <a:xfrm>
+            <a:off x="3131840" y="1600200"/>
+            <a:ext cx="5554960" cy="4525963"/>
+          </a:xfrm>
+        </p:spPr>
+        <p:txBody>
+          <a:bodyPr anchor="t" anchorCtr="0">
+            <a:normAutofit/>
+          </a:bodyPr>
+          <a:lstStyle/>
+          <a:p>
+            <a:pPr marL="0" indent="0">
+              <a:buNone/>
+            </a:pPr>
+            <a:r>
+              <a:rPr lang="en-US" dirty="0" smtClean="0"/>
+              <a:t>....</a:t>
+            </a:r>
+          </a:p>
+          <a:p>
+            <a:pPr marL="0" indent="0">
+              <a:buNone/>
+            </a:pPr>
+            <a:endParaRPr lang="en-US" dirty="0"/>
+          </a:p>
+          <a:p>
+            <a:pPr marL="0" indent="0">
+              <a:buNone/>
+            </a:pPr>
+            <a:r>
+              <a:rPr lang="en-US" dirty="0">
+                <a:hlinkClick r:id="rId2"/>
+              </a:rPr>
+              <a:t>http://</a:t>
+            </a:r>
+            <a:r>
+              <a:rPr lang="en-US" dirty="0" smtClean="0">
+                <a:hlinkClick r:id="rId2"/>
+              </a:rPr>
+              <a:t>oz.by/books/more10182766.html</a:t>
+            </a:r>
+            <a:endParaRPr lang="en-US" dirty="0" smtClean="0"/>
+          </a:p>
+          <a:p>
+            <a:pPr marL="0" indent="0">
+              <a:buNone/>
+            </a:pPr>
+            <a:endParaRPr lang="ru-RU" dirty="0"/>
+          </a:p>
+        </p:txBody>
+      </p:sp>
+      <p:pic>
+        <p:nvPicPr>
+          <p:cNvPr id="5" name="Picture 4"/>
+          <p:cNvPicPr>
+            <a:picLocks noChangeAspect="1"/>
+          </p:cNvPicPr>
+          <p:nvPr/>
+        </p:nvPicPr>
+        <p:blipFill>
+          <a:blip r:embed="rId3">
+            <a:extLst>
+              <a:ext uri="{28A0092B-C50C-407E-A947-70E740481C1C}">
+                <a14:useLocalDpi xmlns:a14="http://schemas.microsoft.com/office/drawing/2010/main" val="0"/>
+              </a:ext>
+            </a:extLst>
+          </a:blip>
+          <a:stretch>
+            <a:fillRect/>
+          </a:stretch>
+        </p:blipFill>
+        <p:spPr>
+          <a:xfrm>
+            <a:off x="467544" y="1600200"/>
+            <a:ext cx="2520000" cy="2910600"/>
+          </a:xfrm>
+          <a:prstGeom prst="rect">
+            <a:avLst/>
+          </a:prstGeom>
+        </p:spPr>
+      </p:pic>
+    </p:spTree>
+    <p:extLst>
+      <p:ext uri="{BB962C8B-B14F-4D97-AF65-F5344CB8AC3E}">
+        <p14:creationId xmlns:p14="http://schemas.microsoft.com/office/powerpoint/2010/main" val="1722243663"/>
+      </p:ext>
+    </p:extLst>
+  </p:cSld>
+  <p:clrMapOvr>
+    <a:masterClrMapping/>
+  </p:clrMapOvr>
+  <mc:AlternateContent xmlns:mc="http://schemas.openxmlformats.org/markup-compatibility/2006" xmlns:p14="http://schemas.microsoft.com/office/powerpoint/2010/main">
+    <mc:Choice Requires="p14">
+      <p:transition spd="slow" p14:dur="2000"/>
+    </mc:Choice>
+    <mc:Fallback xmlns="">
+      <p:transition spd="slow"/>
+    </mc:Fallback>
+  </mc:AlternateContent>
+  <p:timing>
+    <p:tnLst>
+      <p:par>
+        <p:cTn id="1" dur="indefinite" restart="never" nodeType="tmRoot"/>
+      </p:par>
+    </p:tnLst>
+  </p:timing>
+</p:sld>
+</file>
+
+<file path=ppt/slides/slide11.xml><?xml version="1.0" encoding="utf-8"?>
 <p:sld xmlns:a="http://schemas.openxmlformats.org/drawingml/2006/main" xmlns:r="http://schemas.openxmlformats.org/officeDocument/2006/relationships" xmlns:p="http://schemas.openxmlformats.org/presentationml/2006/main">
   <p:cSld>
     <p:spTree>
@@ -3721,7 +3946,7 @@
 </p:sld>
 </file>
 
-<file path=ppt/slides/slide11.xml><?xml version="1.0" encoding="utf-8"?>
+<file path=ppt/slides/slide12.xml><?xml version="1.0" encoding="utf-8"?>
 <p:sld xmlns:a="http://schemas.openxmlformats.org/drawingml/2006/main" xmlns:r="http://schemas.openxmlformats.org/officeDocument/2006/relationships" xmlns:p="http://schemas.openxmlformats.org/presentationml/2006/main">
   <p:cSld>
     <p:spTree>
@@ -3786,7 +4011,7 @@
 </p:sld>
 </file>
 
-<file path=ppt/slides/slide12.xml><?xml version="1.0" encoding="utf-8"?>
+<file path=ppt/slides/slide13.xml><?xml version="1.0" encoding="utf-8"?>
 <p:sld xmlns:a="http://schemas.openxmlformats.org/drawingml/2006/main" xmlns:r="http://schemas.openxmlformats.org/officeDocument/2006/relationships" xmlns:p="http://schemas.openxmlformats.org/presentationml/2006/main">
   <p:cSld>
     <p:spTree>
@@ -4075,7 +4300,7 @@
 </p:sld>
 </file>
 
-<file path=ppt/slides/slide13.xml><?xml version="1.0" encoding="utf-8"?>
+<file path=ppt/slides/slide14.xml><?xml version="1.0" encoding="utf-8"?>
 <p:sld xmlns:a="http://schemas.openxmlformats.org/drawingml/2006/main" xmlns:r="http://schemas.openxmlformats.org/officeDocument/2006/relationships" xmlns:p="http://schemas.openxmlformats.org/presentationml/2006/main">
   <p:cSld>
     <p:spTree>
@@ -4261,83 +4486,6 @@
 </p:sld>
 </file>
 
-<file path=ppt/slides/slide14.xml><?xml version="1.0" encoding="utf-8"?>
-<p:sld xmlns:a="http://schemas.openxmlformats.org/drawingml/2006/main" xmlns:r="http://schemas.openxmlformats.org/officeDocument/2006/relationships" xmlns:p="http://schemas.openxmlformats.org/presentationml/2006/main" show="0">
-  <p:cSld>
-    <p:spTree>
-      <p:nvGrpSpPr>
-        <p:cNvPr id="1" name=""/>
-        <p:cNvGrpSpPr/>
-        <p:nvPr/>
-      </p:nvGrpSpPr>
-      <p:grpSpPr>
-        <a:xfrm>
-          <a:off x="0" y="0"/>
-          <a:ext cx="0" cy="0"/>
-          <a:chOff x="0" y="0"/>
-          <a:chExt cx="0" cy="0"/>
-        </a:xfrm>
-      </p:grpSpPr>
-      <p:sp>
-        <p:nvSpPr>
-          <p:cNvPr id="2" name="Title 1"/>
-          <p:cNvSpPr>
-            <a:spLocks noGrp="1"/>
-          </p:cNvSpPr>
-          <p:nvPr>
-            <p:ph type="title"/>
-          </p:nvPr>
-        </p:nvSpPr>
-        <p:spPr>
-          <a:xfrm>
-            <a:off x="457200" y="2857500"/>
-            <a:ext cx="8229600" cy="1143000"/>
-          </a:xfrm>
-        </p:spPr>
-        <p:txBody>
-          <a:bodyPr/>
-          <a:lstStyle/>
-          <a:p>
-            <a:r>
-              <a:rPr lang="en-US" dirty="0" smtClean="0"/>
-              <a:t>ADO.NET / </a:t>
-            </a:r>
-            <a:r>
-              <a:rPr lang="en-US" dirty="0" err="1" smtClean="0"/>
-              <a:t>EntityFramework</a:t>
-            </a:r>
-            <a:endParaRPr lang="ru-RU" dirty="0"/>
-          </a:p>
-        </p:txBody>
-      </p:sp>
-    </p:spTree>
-    <p:extLst>
-      <p:ext uri="{BB962C8B-B14F-4D97-AF65-F5344CB8AC3E}">
-        <p14:creationId xmlns:p14="http://schemas.microsoft.com/office/powerpoint/2010/main" val="2493670811"/>
-      </p:ext>
-    </p:extLst>
-  </p:cSld>
-  <p:clrMapOvr>
-    <a:masterClrMapping/>
-  </p:clrMapOvr>
-  <mc:AlternateContent xmlns:mc="http://schemas.openxmlformats.org/markup-compatibility/2006">
-    <mc:Choice xmlns:p14="http://schemas.microsoft.com/office/powerpoint/2010/main" Requires="p14">
-      <p:transition spd="slow" p14:dur="2000"/>
-    </mc:Choice>
-    <mc:Fallback>
-      <p:transition spd="slow"/>
-    </mc:Fallback>
-  </mc:AlternateContent>
-  <p:timing>
-    <p:tnLst>
-      <p:par>
-        <p:cTn id="1" dur="indefinite" restart="never" nodeType="tmRoot"/>
-      </p:par>
-    </p:tnLst>
-  </p:timing>
-</p:sld>
-</file>
-
 <file path=ppt/slides/slide15.xml><?xml version="1.0" encoding="utf-8"?>
 <p:sld xmlns:a="http://schemas.openxmlformats.org/drawingml/2006/main" xmlns:r="http://schemas.openxmlformats.org/officeDocument/2006/relationships" xmlns:p="http://schemas.openxmlformats.org/presentationml/2006/main" show="0">
   <p:cSld>
@@ -4365,6 +4513,83 @@
             <p:ph type="title"/>
           </p:nvPr>
         </p:nvSpPr>
+        <p:spPr>
+          <a:xfrm>
+            <a:off x="457200" y="2857500"/>
+            <a:ext cx="8229600" cy="1143000"/>
+          </a:xfrm>
+        </p:spPr>
+        <p:txBody>
+          <a:bodyPr/>
+          <a:lstStyle/>
+          <a:p>
+            <a:r>
+              <a:rPr lang="en-US" dirty="0" smtClean="0"/>
+              <a:t>ADO.NET / </a:t>
+            </a:r>
+            <a:r>
+              <a:rPr lang="en-US" dirty="0" err="1" smtClean="0"/>
+              <a:t>EntityFramework</a:t>
+            </a:r>
+            <a:endParaRPr lang="ru-RU" dirty="0"/>
+          </a:p>
+        </p:txBody>
+      </p:sp>
+    </p:spTree>
+    <p:extLst>
+      <p:ext uri="{BB962C8B-B14F-4D97-AF65-F5344CB8AC3E}">
+        <p14:creationId xmlns:p14="http://schemas.microsoft.com/office/powerpoint/2010/main" val="2493670811"/>
+      </p:ext>
+    </p:extLst>
+  </p:cSld>
+  <p:clrMapOvr>
+    <a:masterClrMapping/>
+  </p:clrMapOvr>
+  <mc:AlternateContent xmlns:mc="http://schemas.openxmlformats.org/markup-compatibility/2006" xmlns:p14="http://schemas.microsoft.com/office/powerpoint/2010/main">
+    <mc:Choice Requires="p14">
+      <p:transition spd="slow" p14:dur="2000"/>
+    </mc:Choice>
+    <mc:Fallback xmlns="">
+      <p:transition spd="slow"/>
+    </mc:Fallback>
+  </mc:AlternateContent>
+  <p:timing>
+    <p:tnLst>
+      <p:par>
+        <p:cTn id="1" dur="indefinite" restart="never" nodeType="tmRoot"/>
+      </p:par>
+    </p:tnLst>
+  </p:timing>
+</p:sld>
+</file>
+
+<file path=ppt/slides/slide16.xml><?xml version="1.0" encoding="utf-8"?>
+<p:sld xmlns:a="http://schemas.openxmlformats.org/drawingml/2006/main" xmlns:r="http://schemas.openxmlformats.org/officeDocument/2006/relationships" xmlns:p="http://schemas.openxmlformats.org/presentationml/2006/main" show="0">
+  <p:cSld>
+    <p:spTree>
+      <p:nvGrpSpPr>
+        <p:cNvPr id="1" name=""/>
+        <p:cNvGrpSpPr/>
+        <p:nvPr/>
+      </p:nvGrpSpPr>
+      <p:grpSpPr>
+        <a:xfrm>
+          <a:off x="0" y="0"/>
+          <a:ext cx="0" cy="0"/>
+          <a:chOff x="0" y="0"/>
+          <a:chExt cx="0" cy="0"/>
+        </a:xfrm>
+      </p:grpSpPr>
+      <p:sp>
+        <p:nvSpPr>
+          <p:cNvPr id="2" name="Title 1"/>
+          <p:cNvSpPr>
+            <a:spLocks noGrp="1"/>
+          </p:cNvSpPr>
+          <p:nvPr>
+            <p:ph type="title"/>
+          </p:nvPr>
+        </p:nvSpPr>
         <p:spPr/>
         <p:txBody>
           <a:bodyPr/>
@@ -4505,18 +4730,18 @@
   <p:clrMapOvr>
     <a:masterClrMapping/>
   </p:clrMapOvr>
-  <mc:AlternateContent xmlns:mc="http://schemas.openxmlformats.org/markup-compatibility/2006">
-    <mc:Choice xmlns:p14="http://schemas.microsoft.com/office/powerpoint/2010/main" Requires="p14">
+  <mc:AlternateContent xmlns:mc="http://schemas.openxmlformats.org/markup-compatibility/2006" xmlns:p14="http://schemas.microsoft.com/office/powerpoint/2010/main">
+    <mc:Choice Requires="p14">
       <p:transition spd="slow" p14:dur="2000"/>
     </mc:Choice>
-    <mc:Fallback>
+    <mc:Fallback xmlns="">
       <p:transition spd="slow"/>
     </mc:Fallback>
   </mc:AlternateContent>
 </p:sld>
 </file>
 
-<file path=ppt/slides/slide16.xml><?xml version="1.0" encoding="utf-8"?>
+<file path=ppt/slides/slide17.xml><?xml version="1.0" encoding="utf-8"?>
 <p:sld xmlns:a="http://schemas.openxmlformats.org/drawingml/2006/main" xmlns:r="http://schemas.openxmlformats.org/officeDocument/2006/relationships" xmlns:p="http://schemas.openxmlformats.org/presentationml/2006/main">
   <p:cSld>
     <p:spTree>
@@ -4581,7 +4806,7 @@
 </p:sld>
 </file>
 
-<file path=ppt/slides/slide17.xml><?xml version="1.0" encoding="utf-8"?>
+<file path=ppt/slides/slide18.xml><?xml version="1.0" encoding="utf-8"?>
 <p:sld xmlns:a="http://schemas.openxmlformats.org/drawingml/2006/main" xmlns:r="http://schemas.openxmlformats.org/officeDocument/2006/relationships" xmlns:p="http://schemas.openxmlformats.org/presentationml/2006/main">
   <p:cSld>
     <p:spTree>
@@ -4762,73 +4987,6 @@
 </p:sld>
 </file>
 
-<file path=ppt/slides/slide18.xml><?xml version="1.0" encoding="utf-8"?>
-<p:sld xmlns:a="http://schemas.openxmlformats.org/drawingml/2006/main" xmlns:r="http://schemas.openxmlformats.org/officeDocument/2006/relationships" xmlns:p="http://schemas.openxmlformats.org/presentationml/2006/main">
-  <p:cSld>
-    <p:spTree>
-      <p:nvGrpSpPr>
-        <p:cNvPr id="1" name=""/>
-        <p:cNvGrpSpPr/>
-        <p:nvPr/>
-      </p:nvGrpSpPr>
-      <p:grpSpPr>
-        <a:xfrm>
-          <a:off x="0" y="0"/>
-          <a:ext cx="0" cy="0"/>
-          <a:chOff x="0" y="0"/>
-          <a:chExt cx="0" cy="0"/>
-        </a:xfrm>
-      </p:grpSpPr>
-      <p:sp>
-        <p:nvSpPr>
-          <p:cNvPr id="2" name="Title 1"/>
-          <p:cNvSpPr>
-            <a:spLocks noGrp="1"/>
-          </p:cNvSpPr>
-          <p:nvPr>
-            <p:ph type="title"/>
-          </p:nvPr>
-        </p:nvSpPr>
-        <p:spPr>
-          <a:xfrm>
-            <a:off x="457200" y="2459174"/>
-            <a:ext cx="8229600" cy="1939652"/>
-          </a:xfrm>
-        </p:spPr>
-        <p:txBody>
-          <a:bodyPr>
-            <a:normAutofit/>
-          </a:bodyPr>
-          <a:lstStyle/>
-          <a:p>
-            <a:r>
-              <a:rPr lang="ru-RU" dirty="0" smtClean="0"/>
-              <a:t>Другое</a:t>
-            </a:r>
-            <a:endParaRPr lang="ru-RU" dirty="0"/>
-          </a:p>
-        </p:txBody>
-      </p:sp>
-    </p:spTree>
-    <p:extLst>
-      <p:ext uri="{BB962C8B-B14F-4D97-AF65-F5344CB8AC3E}">
-        <p14:creationId xmlns:p14="http://schemas.microsoft.com/office/powerpoint/2010/main" val="941366620"/>
-      </p:ext>
-    </p:extLst>
-  </p:cSld>
-  <p:clrMapOvr>
-    <a:masterClrMapping/>
-  </p:clrMapOvr>
-  <p:timing>
-    <p:tnLst>
-      <p:par>
-        <p:cTn id="1" dur="indefinite" restart="never" nodeType="tmRoot"/>
-      </p:par>
-    </p:tnLst>
-  </p:timing>
-</p:sld>
-</file>
-
 <file path=ppt/slides/slide19.xml><?xml version="1.0" encoding="utf-8"?>
 <p:sld xmlns:a="http://schemas.openxmlformats.org/drawingml/2006/main" xmlns:r="http://schemas.openxmlformats.org/officeDocument/2006/relationships" xmlns:p="http://schemas.openxmlformats.org/presentationml/2006/main">
   <p:cSld>
@@ -4857,109 +5015,29 @@
           </p:nvPr>
         </p:nvSpPr>
         <p:spPr>
-          <a:noFill/>
-          <a:ln>
-            <a:solidFill>
-              <a:schemeClr val="tx1"/>
-            </a:solidFill>
-          </a:ln>
+          <a:xfrm>
+            <a:off x="457200" y="2459174"/>
+            <a:ext cx="8229600" cy="1939652"/>
+          </a:xfrm>
         </p:spPr>
         <p:txBody>
           <a:bodyPr>
-            <a:noAutofit/>
-          </a:bodyPr>
-          <a:lstStyle/>
-          <a:p>
-            <a:r>
-              <a:rPr lang="en-US" sz="2400" i="1" dirty="0">
-                <a:solidFill>
-                  <a:srgbClr val="FFFF00"/>
-                </a:solidFill>
-              </a:rPr>
-              <a:t>Pragmatic Thinking and Learning: Refactor Your Wetware</a:t>
-            </a:r>
-            <a:r>
-              <a:rPr lang="en-US" sz="2400" dirty="0" smtClean="0"/>
-              <a:t/>
-            </a:r>
-            <a:br>
-              <a:rPr lang="en-US" sz="2400" dirty="0" smtClean="0"/>
-            </a:br>
-            <a:r>
-              <a:rPr lang="en-US" sz="2400" dirty="0" smtClean="0"/>
-              <a:t>Andy Hunt</a:t>
-            </a:r>
-            <a:endParaRPr lang="ru-RU" sz="2400" dirty="0"/>
-          </a:p>
-        </p:txBody>
-      </p:sp>
-      <p:sp>
-        <p:nvSpPr>
-          <p:cNvPr id="3" name="Content Placeholder 2"/>
-          <p:cNvSpPr>
-            <a:spLocks noGrp="1"/>
-          </p:cNvSpPr>
-          <p:nvPr>
-            <p:ph idx="1"/>
-          </p:nvPr>
-        </p:nvSpPr>
-        <p:spPr>
-          <a:xfrm>
-            <a:off x="3131840" y="1568450"/>
-            <a:ext cx="5554960" cy="4525963"/>
-          </a:xfrm>
-        </p:spPr>
-        <p:txBody>
-          <a:bodyPr anchor="t" anchorCtr="0">
             <a:normAutofit/>
           </a:bodyPr>
           <a:lstStyle/>
           <a:p>
-            <a:pPr marL="0" indent="0">
-              <a:buNone/>
-            </a:pPr>
-            <a:r>
-              <a:rPr lang="ru-RU" sz="2800" dirty="0" smtClean="0"/>
-              <a:t>Учит использовать свой мозг более эффективно.</a:t>
-            </a:r>
-            <a:endParaRPr lang="ru-RU" sz="2800" dirty="0"/>
-          </a:p>
-        </p:txBody>
-      </p:sp>
-      <p:pic>
-        <p:nvPicPr>
-          <p:cNvPr id="5" name="Picture 4"/>
-          <p:cNvPicPr>
-            <a:picLocks noChangeAspect="1"/>
-          </p:cNvPicPr>
-          <p:nvPr/>
-        </p:nvPicPr>
-        <p:blipFill>
-          <a:blip r:embed="rId2">
-            <a:extLst>
-              <a:ext uri="{28A0092B-C50C-407E-A947-70E740481C1C}">
-                <a14:useLocalDpi xmlns:a14="http://schemas.microsoft.com/office/drawing/2010/main" val="0"/>
-              </a:ext>
-            </a:extLst>
-          </a:blip>
-          <a:stretch>
-            <a:fillRect/>
-          </a:stretch>
-        </p:blipFill>
-        <p:spPr>
-          <a:xfrm>
-            <a:off x="467544" y="1568449"/>
-            <a:ext cx="2520000" cy="3014308"/>
-          </a:xfrm>
-          <a:prstGeom prst="rect">
-            <a:avLst/>
-          </a:prstGeom>
-        </p:spPr>
-      </p:pic>
+            <a:r>
+              <a:rPr lang="ru-RU" dirty="0" smtClean="0"/>
+              <a:t>Другое</a:t>
+            </a:r>
+            <a:endParaRPr lang="ru-RU" dirty="0"/>
+          </a:p>
+        </p:txBody>
+      </p:sp>
     </p:spTree>
     <p:extLst>
       <p:ext uri="{BB962C8B-B14F-4D97-AF65-F5344CB8AC3E}">
-        <p14:creationId xmlns:p14="http://schemas.microsoft.com/office/powerpoint/2010/main" val="1237191104"/>
+        <p14:creationId xmlns:p14="http://schemas.microsoft.com/office/powerpoint/2010/main" val="941366620"/>
       </p:ext>
     </p:extLst>
   </p:cSld>
@@ -5182,6 +5260,153 @@
             <p:ph type="title"/>
           </p:nvPr>
         </p:nvSpPr>
+        <p:spPr>
+          <a:noFill/>
+          <a:ln>
+            <a:solidFill>
+              <a:schemeClr val="tx1"/>
+            </a:solidFill>
+          </a:ln>
+        </p:spPr>
+        <p:txBody>
+          <a:bodyPr>
+            <a:noAutofit/>
+          </a:bodyPr>
+          <a:lstStyle/>
+          <a:p>
+            <a:r>
+              <a:rPr lang="en-US" sz="2400" i="1" dirty="0">
+                <a:solidFill>
+                  <a:srgbClr val="FFFF00"/>
+                </a:solidFill>
+              </a:rPr>
+              <a:t>Pragmatic Thinking and Learning: Refactor Your Wetware</a:t>
+            </a:r>
+            <a:r>
+              <a:rPr lang="en-US" sz="2400" dirty="0" smtClean="0"/>
+              <a:t/>
+            </a:r>
+            <a:br>
+              <a:rPr lang="en-US" sz="2400" dirty="0" smtClean="0"/>
+            </a:br>
+            <a:r>
+              <a:rPr lang="en-US" sz="2400" dirty="0" smtClean="0"/>
+              <a:t>Andy Hunt</a:t>
+            </a:r>
+            <a:endParaRPr lang="ru-RU" sz="2400" dirty="0"/>
+          </a:p>
+        </p:txBody>
+      </p:sp>
+      <p:sp>
+        <p:nvSpPr>
+          <p:cNvPr id="3" name="Content Placeholder 2"/>
+          <p:cNvSpPr>
+            <a:spLocks noGrp="1"/>
+          </p:cNvSpPr>
+          <p:nvPr>
+            <p:ph idx="1"/>
+          </p:nvPr>
+        </p:nvSpPr>
+        <p:spPr>
+          <a:xfrm>
+            <a:off x="3131840" y="1568450"/>
+            <a:ext cx="5554960" cy="4525963"/>
+          </a:xfrm>
+        </p:spPr>
+        <p:txBody>
+          <a:bodyPr anchor="t" anchorCtr="0">
+            <a:normAutofit/>
+          </a:bodyPr>
+          <a:lstStyle/>
+          <a:p>
+            <a:pPr marL="0" indent="0">
+              <a:buNone/>
+            </a:pPr>
+            <a:r>
+              <a:rPr lang="ru-RU" sz="2800" dirty="0" smtClean="0"/>
+              <a:t>Учит использовать свой мозг более эффективно.</a:t>
+            </a:r>
+            <a:endParaRPr lang="ru-RU" sz="2800" dirty="0"/>
+          </a:p>
+        </p:txBody>
+      </p:sp>
+      <p:pic>
+        <p:nvPicPr>
+          <p:cNvPr id="5" name="Picture 4"/>
+          <p:cNvPicPr>
+            <a:picLocks noChangeAspect="1"/>
+          </p:cNvPicPr>
+          <p:nvPr/>
+        </p:nvPicPr>
+        <p:blipFill>
+          <a:blip r:embed="rId2">
+            <a:extLst>
+              <a:ext uri="{28A0092B-C50C-407E-A947-70E740481C1C}">
+                <a14:useLocalDpi xmlns:a14="http://schemas.microsoft.com/office/drawing/2010/main" val="0"/>
+              </a:ext>
+            </a:extLst>
+          </a:blip>
+          <a:stretch>
+            <a:fillRect/>
+          </a:stretch>
+        </p:blipFill>
+        <p:spPr>
+          <a:xfrm>
+            <a:off x="467544" y="1568449"/>
+            <a:ext cx="2520000" cy="3014308"/>
+          </a:xfrm>
+          <a:prstGeom prst="rect">
+            <a:avLst/>
+          </a:prstGeom>
+        </p:spPr>
+      </p:pic>
+    </p:spTree>
+    <p:extLst>
+      <p:ext uri="{BB962C8B-B14F-4D97-AF65-F5344CB8AC3E}">
+        <p14:creationId xmlns:p14="http://schemas.microsoft.com/office/powerpoint/2010/main" val="1237191104"/>
+      </p:ext>
+    </p:extLst>
+  </p:cSld>
+  <p:clrMapOvr>
+    <a:masterClrMapping/>
+  </p:clrMapOvr>
+  <p:timing>
+    <p:tnLst>
+      <p:par>
+        <p:cTn id="1" dur="indefinite" restart="never" nodeType="tmRoot"/>
+      </p:par>
+    </p:tnLst>
+  </p:timing>
+</p:sld>
+</file>
+
+<file path=ppt/slides/slide21.xml><?xml version="1.0" encoding="utf-8"?>
+<p:sld xmlns:a="http://schemas.openxmlformats.org/drawingml/2006/main" xmlns:r="http://schemas.openxmlformats.org/officeDocument/2006/relationships" xmlns:p="http://schemas.openxmlformats.org/presentationml/2006/main">
+  <p:cSld>
+    <p:spTree>
+      <p:nvGrpSpPr>
+        <p:cNvPr id="1" name=""/>
+        <p:cNvGrpSpPr/>
+        <p:nvPr/>
+      </p:nvGrpSpPr>
+      <p:grpSpPr>
+        <a:xfrm>
+          <a:off x="0" y="0"/>
+          <a:ext cx="0" cy="0"/>
+          <a:chOff x="0" y="0"/>
+          <a:chExt cx="0" cy="0"/>
+        </a:xfrm>
+      </p:grpSpPr>
+      <p:sp>
+        <p:nvSpPr>
+          <p:cNvPr id="2" name="Title 1"/>
+          <p:cNvSpPr>
+            <a:spLocks noGrp="1"/>
+          </p:cNvSpPr>
+          <p:nvPr>
+            <p:ph type="title"/>
+          </p:nvPr>
+        </p:nvSpPr>
         <p:spPr/>
         <p:txBody>
           <a:bodyPr/>
@@ -5484,12 +5709,28 @@
           <a:lstStyle/>
           <a:p>
             <a:r>
+              <a:rPr lang="en-US" sz="2400" i="1" dirty="0" smtClean="0">
+                <a:solidFill>
+                  <a:srgbClr val="FFFF00"/>
+                </a:solidFill>
+              </a:rPr>
+              <a:t>C</a:t>
+            </a:r>
+            <a:r>
+              <a:rPr lang="en-US" sz="2400" i="1" dirty="0">
+                <a:solidFill>
+                  <a:srgbClr val="FFFF00"/>
+                </a:solidFill>
+              </a:rPr>
+              <a:t># </a:t>
+            </a:r>
+            <a:r>
               <a:rPr lang="ru-RU" sz="2400" i="1" dirty="0">
                 <a:solidFill>
                   <a:srgbClr val="FFFF00"/>
                 </a:solidFill>
               </a:rPr>
-              <a:t>WPF: Windows Presentation Foundation в .NET 4.5 с примерами на C# 5.0 для профессионалов</a:t>
+              <a:t>программирование для профессионалов</a:t>
             </a:r>
             <a:r>
               <a:rPr lang="en-US" sz="2400" dirty="0" smtClean="0"/>
@@ -5499,12 +5740,8 @@
               <a:rPr lang="en-US" sz="2400" dirty="0" smtClean="0"/>
             </a:br>
             <a:r>
-              <a:rPr lang="ru-RU" sz="2400" dirty="0"/>
-              <a:t>Мэтью </a:t>
-            </a:r>
-            <a:r>
               <a:rPr lang="ru-RU" sz="2400" dirty="0" smtClean="0"/>
-              <a:t>Мак-Дональд</a:t>
+              <a:t>Джон Скит</a:t>
             </a:r>
             <a:endParaRPr lang="ru-RU" sz="2400" dirty="0"/>
           </a:p>
@@ -5537,15 +5774,43 @@
             </a:pPr>
             <a:r>
               <a:rPr lang="ru-RU" sz="2800" dirty="0" smtClean="0"/>
-              <a:t>Прекрасная книга по </a:t>
+              <a:t>Джон Скит </a:t>
+            </a:r>
+            <a:r>
+              <a:rPr lang="ru-RU" sz="2800" dirty="0" smtClean="0"/>
+              <a:t>заслуженно </a:t>
+            </a:r>
+            <a:r>
+              <a:rPr lang="ru-RU" sz="2800" dirty="0" smtClean="0"/>
+              <a:t>известен как «Чак Норрис </a:t>
             </a:r>
             <a:r>
               <a:rPr lang="en-US" sz="2800" dirty="0" smtClean="0"/>
-              <a:t>WPF </a:t>
+              <a:t>.NET</a:t>
+            </a:r>
+            <a:r>
+              <a:rPr lang="en-US" sz="2800" dirty="0" smtClean="0"/>
+              <a:t>-a</a:t>
             </a:r>
             <a:r>
               <a:rPr lang="ru-RU" sz="2800" dirty="0" smtClean="0"/>
-              <a:t>с отличными примерами.</a:t>
+              <a:t>». Он как и Джеффри Рихтер подробно объясняет тонкости реализации </a:t>
+            </a:r>
+            <a:r>
+              <a:rPr lang="en-US" sz="2800" dirty="0" smtClean="0"/>
+              <a:t>.NET </a:t>
+            </a:r>
+            <a:r>
+              <a:rPr lang="ru-RU" sz="2800" dirty="0" smtClean="0"/>
+              <a:t>и </a:t>
+            </a:r>
+            <a:r>
+              <a:rPr lang="en-US" sz="2800" dirty="0" smtClean="0"/>
+              <a:t>C# </a:t>
+            </a:r>
+            <a:r>
+              <a:rPr lang="ru-RU" sz="2800" dirty="0" smtClean="0"/>
+              <a:t>которые необходимо знать профессионалам.</a:t>
             </a:r>
             <a:endParaRPr lang="ru-RU" sz="2800" dirty="0"/>
           </a:p>
@@ -5553,9 +5818,9 @@
       </p:sp>
       <p:pic>
         <p:nvPicPr>
-          <p:cNvPr id="4" name="Picture 3"/>
+          <p:cNvPr id="1031" name="Picture 7"/>
           <p:cNvPicPr>
-            <a:picLocks noChangeAspect="1"/>
+            <a:picLocks noChangeAspect="1" noChangeArrowheads="1"/>
           </p:cNvPicPr>
           <p:nvPr/>
         </p:nvPicPr>
@@ -5567,24 +5832,58 @@
               </a:ext>
             </a:extLst>
           </a:blip>
+          <a:srcRect/>
           <a:stretch>
             <a:fillRect/>
           </a:stretch>
         </p:blipFill>
-        <p:spPr>
+        <p:spPr bwMode="auto">
           <a:xfrm>
-            <a:off x="467544" y="1568450"/>
-            <a:ext cx="2520000" cy="3691800"/>
+            <a:off x="475082" y="1600200"/>
+            <a:ext cx="2438400" cy="3571875"/>
           </a:xfrm>
           <a:prstGeom prst="rect">
             <a:avLst/>
           </a:prstGeom>
+          <a:noFill/>
+          <a:ln>
+            <a:noFill/>
+          </a:ln>
+          <a:effectLst/>
+          <a:extLst>
+            <a:ext uri="{909E8E84-426E-40DD-AFC4-6F175D3DCCD1}">
+              <a14:hiddenFill xmlns:a14="http://schemas.microsoft.com/office/drawing/2010/main">
+                <a:solidFill>
+                  <a:schemeClr val="accent1"/>
+                </a:solidFill>
+              </a14:hiddenFill>
+            </a:ext>
+            <a:ext uri="{91240B29-F687-4F45-9708-019B960494DF}">
+              <a14:hiddenLine xmlns:a14="http://schemas.microsoft.com/office/drawing/2010/main" w="9525">
+                <a:solidFill>
+                  <a:schemeClr val="tx1"/>
+                </a:solidFill>
+                <a:miter lim="800000"/>
+                <a:headEnd/>
+                <a:tailEnd/>
+              </a14:hiddenLine>
+            </a:ext>
+            <a:ext uri="{AF507438-7753-43E0-B8FC-AC1667EBCBE1}">
+              <a14:hiddenEffects xmlns:a14="http://schemas.microsoft.com/office/drawing/2010/main">
+                <a:effectLst>
+                  <a:outerShdw dist="35921" dir="2700000" algn="ctr" rotWithShape="0">
+                    <a:schemeClr val="bg2"/>
+                  </a:outerShdw>
+                </a:effectLst>
+              </a14:hiddenEffects>
+            </a:ext>
+          </a:extLst>
         </p:spPr>
       </p:pic>
     </p:spTree>
     <p:extLst>
       <p:ext uri="{BB962C8B-B14F-4D97-AF65-F5344CB8AC3E}">
-        <p14:creationId xmlns:p14="http://schemas.microsoft.com/office/powerpoint/2010/main" val="3304043920"/>
+        <p14:creationId xmlns:p14="http://schemas.microsoft.com/office/powerpoint/2010/main" val="2056253551"/>
       </p:ext>
     </p:extLst>
   </p:cSld>
@@ -5643,6 +5942,165 @@
           <a:lstStyle/>
           <a:p>
             <a:r>
+              <a:rPr lang="ru-RU" sz="2400" i="1" dirty="0">
+                <a:solidFill>
+                  <a:srgbClr val="FFFF00"/>
+                </a:solidFill>
+              </a:rPr>
+              <a:t>WPF: Windows Presentation Foundation в .NET 4.5 с примерами на C# 5.0 для профессионалов</a:t>
+            </a:r>
+            <a:r>
+              <a:rPr lang="en-US" sz="2400" dirty="0" smtClean="0"/>
+              <a:t/>
+            </a:r>
+            <a:br>
+              <a:rPr lang="en-US" sz="2400" dirty="0" smtClean="0"/>
+            </a:br>
+            <a:r>
+              <a:rPr lang="ru-RU" sz="2400" dirty="0"/>
+              <a:t>Мэтью </a:t>
+            </a:r>
+            <a:r>
+              <a:rPr lang="ru-RU" sz="2400" dirty="0" smtClean="0"/>
+              <a:t>Мак-Дональд</a:t>
+            </a:r>
+            <a:endParaRPr lang="ru-RU" sz="2400" dirty="0"/>
+          </a:p>
+        </p:txBody>
+      </p:sp>
+      <p:sp>
+        <p:nvSpPr>
+          <p:cNvPr id="3" name="Content Placeholder 2"/>
+          <p:cNvSpPr>
+            <a:spLocks noGrp="1"/>
+          </p:cNvSpPr>
+          <p:nvPr>
+            <p:ph idx="1"/>
+          </p:nvPr>
+        </p:nvSpPr>
+        <p:spPr>
+          <a:xfrm>
+            <a:off x="3131840" y="1600200"/>
+            <a:ext cx="5554960" cy="4525963"/>
+          </a:xfrm>
+        </p:spPr>
+        <p:txBody>
+          <a:bodyPr anchor="t" anchorCtr="0">
+            <a:normAutofit/>
+          </a:bodyPr>
+          <a:lstStyle/>
+          <a:p>
+            <a:pPr marL="0" indent="0">
+              <a:buNone/>
+            </a:pPr>
+            <a:r>
+              <a:rPr lang="ru-RU" sz="2800" dirty="0" smtClean="0"/>
+              <a:t>Прекрасная книга по </a:t>
+            </a:r>
+            <a:r>
+              <a:rPr lang="en-US" sz="2800" dirty="0" smtClean="0"/>
+              <a:t>WPF </a:t>
+            </a:r>
+            <a:r>
+              <a:rPr lang="ru-RU" sz="2800" dirty="0" smtClean="0"/>
+              <a:t>с отличными примерами.</a:t>
+            </a:r>
+            <a:endParaRPr lang="ru-RU" sz="2800" dirty="0"/>
+          </a:p>
+        </p:txBody>
+      </p:sp>
+      <p:pic>
+        <p:nvPicPr>
+          <p:cNvPr id="4" name="Picture 3"/>
+          <p:cNvPicPr>
+            <a:picLocks noChangeAspect="1"/>
+          </p:cNvPicPr>
+          <p:nvPr/>
+        </p:nvPicPr>
+        <p:blipFill>
+          <a:blip r:embed="rId2">
+            <a:extLst>
+              <a:ext uri="{28A0092B-C50C-407E-A947-70E740481C1C}">
+                <a14:useLocalDpi xmlns:a14="http://schemas.microsoft.com/office/drawing/2010/main" val="0"/>
+              </a:ext>
+            </a:extLst>
+          </a:blip>
+          <a:stretch>
+            <a:fillRect/>
+          </a:stretch>
+        </p:blipFill>
+        <p:spPr>
+          <a:xfrm>
+            <a:off x="467544" y="1568450"/>
+            <a:ext cx="2520000" cy="3691800"/>
+          </a:xfrm>
+          <a:prstGeom prst="rect">
+            <a:avLst/>
+          </a:prstGeom>
+        </p:spPr>
+      </p:pic>
+    </p:spTree>
+    <p:extLst>
+      <p:ext uri="{BB962C8B-B14F-4D97-AF65-F5344CB8AC3E}">
+        <p14:creationId xmlns:p14="http://schemas.microsoft.com/office/powerpoint/2010/main" val="3304043920"/>
+      </p:ext>
+    </p:extLst>
+  </p:cSld>
+  <p:clrMapOvr>
+    <a:masterClrMapping/>
+  </p:clrMapOvr>
+  <p:timing>
+    <p:tnLst>
+      <p:par>
+        <p:cTn id="1" dur="indefinite" restart="never" nodeType="tmRoot"/>
+      </p:par>
+    </p:tnLst>
+  </p:timing>
+</p:sld>
+</file>
+
+<file path=ppt/slides/slide6.xml><?xml version="1.0" encoding="utf-8"?>
+<p:sld xmlns:a="http://schemas.openxmlformats.org/drawingml/2006/main" xmlns:r="http://schemas.openxmlformats.org/officeDocument/2006/relationships" xmlns:p="http://schemas.openxmlformats.org/presentationml/2006/main">
+  <p:cSld>
+    <p:spTree>
+      <p:nvGrpSpPr>
+        <p:cNvPr id="1" name=""/>
+        <p:cNvGrpSpPr/>
+        <p:nvPr/>
+      </p:nvGrpSpPr>
+      <p:grpSpPr>
+        <a:xfrm>
+          <a:off x="0" y="0"/>
+          <a:ext cx="0" cy="0"/>
+          <a:chOff x="0" y="0"/>
+          <a:chExt cx="0" cy="0"/>
+        </a:xfrm>
+      </p:grpSpPr>
+      <p:sp>
+        <p:nvSpPr>
+          <p:cNvPr id="2" name="Title 1"/>
+          <p:cNvSpPr>
+            <a:spLocks noGrp="1"/>
+          </p:cNvSpPr>
+          <p:nvPr>
+            <p:ph type="title"/>
+          </p:nvPr>
+        </p:nvSpPr>
+        <p:spPr>
+          <a:noFill/>
+          <a:ln>
+            <a:solidFill>
+              <a:schemeClr val="tx1"/>
+            </a:solidFill>
+          </a:ln>
+        </p:spPr>
+        <p:txBody>
+          <a:bodyPr>
+            <a:noAutofit/>
+          </a:bodyPr>
+          <a:lstStyle/>
+          <a:p>
+            <a:r>
               <a:rPr lang="en-US" sz="2400" i="1" dirty="0">
                 <a:solidFill>
                   <a:srgbClr val="FFFF00"/>
@@ -5811,7 +6269,7 @@
 </p:sld>
 </file>
 
-<file path=ppt/slides/slide6.xml><?xml version="1.0" encoding="utf-8"?>
+<file path=ppt/slides/slide7.xml><?xml version="1.0" encoding="utf-8"?>
 <p:sld xmlns:a="http://schemas.openxmlformats.org/drawingml/2006/main" xmlns:r="http://schemas.openxmlformats.org/officeDocument/2006/relationships" xmlns:p="http://schemas.openxmlformats.org/presentationml/2006/main">
   <p:cSld>
     <p:spTree>
@@ -5878,7 +6336,7 @@
 </p:sld>
 </file>
 
-<file path=ppt/slides/slide7.xml><?xml version="1.0" encoding="utf-8"?>
+<file path=ppt/slides/slide8.xml><?xml version="1.0" encoding="utf-8"?>
 <p:sld xmlns:a="http://schemas.openxmlformats.org/drawingml/2006/main" xmlns:r="http://schemas.openxmlformats.org/officeDocument/2006/relationships" xmlns:p="http://schemas.openxmlformats.org/presentationml/2006/main" show="0">
   <p:cSld>
     <p:spTree>
@@ -6082,7 +6540,7 @@
 </p:sld>
 </file>
 
-<file path=ppt/slides/slide8.xml><?xml version="1.0" encoding="utf-8"?>
+<file path=ppt/slides/slide9.xml><?xml version="1.0" encoding="utf-8"?>
 <p:sld xmlns:a="http://schemas.openxmlformats.org/drawingml/2006/main" xmlns:r="http://schemas.openxmlformats.org/officeDocument/2006/relationships" xmlns:p="http://schemas.openxmlformats.org/presentationml/2006/main">
   <p:cSld>
     <p:spTree>
@@ -6238,230 +6696,6 @@
   <p:clrMapOvr>
     <a:masterClrMapping/>
   </p:clrMapOvr>
-  <p:timing>
-    <p:tnLst>
-      <p:par>
-        <p:cTn id="1" dur="indefinite" restart="never" nodeType="tmRoot"/>
-      </p:par>
-    </p:tnLst>
-  </p:timing>
-</p:sld>
-</file>
-
-<file path=ppt/slides/slide9.xml><?xml version="1.0" encoding="utf-8"?>
-<p:sld xmlns:a="http://schemas.openxmlformats.org/drawingml/2006/main" xmlns:r="http://schemas.openxmlformats.org/officeDocument/2006/relationships" xmlns:p="http://schemas.openxmlformats.org/presentationml/2006/main" show="0">
-  <p:cSld>
-    <p:spTree>
-      <p:nvGrpSpPr>
-        <p:cNvPr id="1" name=""/>
-        <p:cNvGrpSpPr/>
-        <p:nvPr/>
-      </p:nvGrpSpPr>
-      <p:grpSpPr>
-        <a:xfrm>
-          <a:off x="0" y="0"/>
-          <a:ext cx="0" cy="0"/>
-          <a:chOff x="0" y="0"/>
-          <a:chExt cx="0" cy="0"/>
-        </a:xfrm>
-      </p:grpSpPr>
-      <p:sp>
-        <p:nvSpPr>
-          <p:cNvPr id="2" name="Title 1"/>
-          <p:cNvSpPr>
-            <a:spLocks noGrp="1"/>
-          </p:cNvSpPr>
-          <p:nvPr>
-            <p:ph type="title"/>
-          </p:nvPr>
-        </p:nvSpPr>
-        <p:spPr>
-          <a:noFill/>
-          <a:ln>
-            <a:solidFill>
-              <a:schemeClr val="tx1"/>
-            </a:solidFill>
-          </a:ln>
-        </p:spPr>
-        <p:txBody>
-          <a:bodyPr>
-            <a:noAutofit/>
-          </a:bodyPr>
-          <a:lstStyle/>
-          <a:p>
-            <a:r>
-              <a:rPr lang="ru-RU" sz="2400" i="1" dirty="0">
-                <a:solidFill>
-                  <a:srgbClr val="FFFF00"/>
-                </a:solidFill>
-              </a:rPr>
-              <a:t>Паттерны проектирования</a:t>
-            </a:r>
-            <a:r>
-              <a:rPr lang="en-US" sz="2400" i="1" dirty="0" smtClean="0"/>
-              <a:t/>
-            </a:r>
-            <a:br>
-              <a:rPr lang="en-US" sz="2400" i="1" dirty="0" smtClean="0"/>
-            </a:br>
-            <a:r>
-              <a:rPr lang="ru-RU" sz="2400" dirty="0"/>
-              <a:t>Эрик </a:t>
-            </a:r>
-            <a:r>
-              <a:rPr lang="ru-RU" sz="2400" dirty="0" smtClean="0"/>
-              <a:t>Фримен</a:t>
-            </a:r>
-            <a:r>
-              <a:rPr lang="en-US" sz="2400" dirty="0" smtClean="0"/>
-              <a:t>, </a:t>
-            </a:r>
-            <a:r>
-              <a:rPr lang="ru-RU" sz="2400" dirty="0"/>
-              <a:t>Элизабет </a:t>
-            </a:r>
-            <a:r>
-              <a:rPr lang="ru-RU" sz="2400" dirty="0" smtClean="0"/>
-              <a:t>Фримен</a:t>
-            </a:r>
-            <a:r>
-              <a:rPr lang="en-US" sz="2400" dirty="0" smtClean="0"/>
-              <a:t>, </a:t>
-            </a:r>
-            <a:r>
-              <a:rPr lang="ru-RU" sz="2400" dirty="0"/>
-              <a:t>Кэтти </a:t>
-            </a:r>
-            <a:r>
-              <a:rPr lang="ru-RU" sz="2400" dirty="0" smtClean="0"/>
-              <a:t>Сьерра</a:t>
-            </a:r>
-            <a:r>
-              <a:rPr lang="en-US" sz="2400" dirty="0" smtClean="0"/>
-              <a:t>, </a:t>
-            </a:r>
-            <a:r>
-              <a:rPr lang="ru-RU" sz="2400" dirty="0"/>
-              <a:t>Берт </a:t>
-            </a:r>
-            <a:r>
-              <a:rPr lang="ru-RU" sz="2400" dirty="0" smtClean="0"/>
-              <a:t>Бейтс</a:t>
-            </a:r>
-            <a:endParaRPr lang="ru-RU" sz="2400" dirty="0"/>
-          </a:p>
-        </p:txBody>
-      </p:sp>
-      <p:sp>
-        <p:nvSpPr>
-          <p:cNvPr id="3" name="Content Placeholder 2"/>
-          <p:cNvSpPr>
-            <a:spLocks noGrp="1"/>
-          </p:cNvSpPr>
-          <p:nvPr>
-            <p:ph idx="1"/>
-          </p:nvPr>
-        </p:nvSpPr>
-        <p:spPr>
-          <a:xfrm>
-            <a:off x="3131840" y="1600200"/>
-            <a:ext cx="5554960" cy="4525963"/>
-          </a:xfrm>
-        </p:spPr>
-        <p:txBody>
-          <a:bodyPr anchor="t" anchorCtr="0">
-            <a:normAutofit/>
-          </a:bodyPr>
-          <a:lstStyle/>
-          <a:p>
-            <a:pPr marL="0" indent="0">
-              <a:buNone/>
-            </a:pPr>
-            <a:r>
-              <a:rPr lang="en-US" dirty="0" smtClean="0"/>
-              <a:t>....</a:t>
-            </a:r>
-          </a:p>
-          <a:p>
-            <a:pPr marL="0" indent="0">
-              <a:buNone/>
-            </a:pPr>
-            <a:endParaRPr lang="en-US" dirty="0"/>
-          </a:p>
-          <a:p>
-            <a:pPr marL="0" indent="0">
-              <a:buNone/>
-            </a:pPr>
-            <a:r>
-              <a:rPr lang="en-US" dirty="0">
-                <a:hlinkClick r:id="rId2"/>
-              </a:rPr>
-              <a:t>http://</a:t>
-            </a:r>
-            <a:r>
-              <a:rPr lang="en-US" dirty="0" smtClean="0">
-                <a:hlinkClick r:id="rId2"/>
-              </a:rPr>
-              <a:t>oz.by/books/more10182766.html</a:t>
-            </a:r>
-            <a:endParaRPr lang="en-US" dirty="0" smtClean="0"/>
-          </a:p>
-          <a:p>
-            <a:pPr marL="0" indent="0">
-              <a:buNone/>
-            </a:pPr>
-            <a:endParaRPr lang="ru-RU" dirty="0"/>
-          </a:p>
-        </p:txBody>
-      </p:sp>
-      <p:pic>
-        <p:nvPicPr>
-          <p:cNvPr id="5" name="Picture 4"/>
-          <p:cNvPicPr>
-            <a:picLocks noChangeAspect="1"/>
-          </p:cNvPicPr>
-          <p:nvPr/>
-        </p:nvPicPr>
-        <p:blipFill>
-          <a:blip r:embed="rId3">
-            <a:extLst>
-              <a:ext uri="{28A0092B-C50C-407E-A947-70E740481C1C}">
-                <a14:useLocalDpi xmlns:a14="http://schemas.microsoft.com/office/drawing/2010/main" val="0"/>
-              </a:ext>
-            </a:extLst>
-          </a:blip>
-          <a:stretch>
-            <a:fillRect/>
-          </a:stretch>
-        </p:blipFill>
-        <p:spPr>
-          <a:xfrm>
-            <a:off x="467544" y="1600200"/>
-            <a:ext cx="2520000" cy="2910600"/>
-          </a:xfrm>
-          <a:prstGeom prst="rect">
-            <a:avLst/>
-          </a:prstGeom>
-        </p:spPr>
-      </p:pic>
-    </p:spTree>
-    <p:extLst>
-      <p:ext uri="{BB962C8B-B14F-4D97-AF65-F5344CB8AC3E}">
-        <p14:creationId xmlns:p14="http://schemas.microsoft.com/office/powerpoint/2010/main" val="1722243663"/>
-      </p:ext>
-    </p:extLst>
-  </p:cSld>
-  <p:clrMapOvr>
-    <a:masterClrMapping/>
-  </p:clrMapOvr>
-  <mc:AlternateContent xmlns:mc="http://schemas.openxmlformats.org/markup-compatibility/2006" xmlns:p14="http://schemas.microsoft.com/office/powerpoint/2010/main">
-    <mc:Choice Requires="p14">
-      <p:transition spd="slow" p14:dur="2000"/>
-    </mc:Choice>
-    <mc:Fallback xmlns="">
-      <p:transition spd="slow"/>
-    </mc:Fallback>
-  </mc:AlternateContent>
   <p:timing>
     <p:tnLst>
       <p:par>

</xml_diff>

<commit_message>
Updated books. Added "Art of unit testing"
</commit_message>
<xml_diff>
--- a/Presentation/books-to-read.pptx
+++ b/Presentation/books-to-read.pptx
@@ -5,7 +5,7 @@
     <p:sldMasterId id="2147483648" r:id="rId1"/>
   </p:sldMasterIdLst>
   <p:notesMasterIdLst>
-    <p:notesMasterId r:id="rId23"/>
+    <p:notesMasterId r:id="rId25"/>
   </p:notesMasterIdLst>
   <p:sldIdLst>
     <p:sldId id="258" r:id="rId2"/>
@@ -24,11 +24,13 @@
     <p:sldId id="260" r:id="rId15"/>
     <p:sldId id="263" r:id="rId16"/>
     <p:sldId id="281" r:id="rId17"/>
-    <p:sldId id="280" r:id="rId18"/>
-    <p:sldId id="264" r:id="rId19"/>
-    <p:sldId id="261" r:id="rId20"/>
-    <p:sldId id="275" r:id="rId21"/>
-    <p:sldId id="276" r:id="rId22"/>
+    <p:sldId id="283" r:id="rId18"/>
+    <p:sldId id="284" r:id="rId19"/>
+    <p:sldId id="280" r:id="rId20"/>
+    <p:sldId id="264" r:id="rId21"/>
+    <p:sldId id="261" r:id="rId22"/>
+    <p:sldId id="275" r:id="rId23"/>
+    <p:sldId id="276" r:id="rId24"/>
   </p:sldIdLst>
   <p:sldSz cx="9144000" cy="6858000" type="screen4x3"/>
   <p:notesSz cx="6858000" cy="9144000"/>
@@ -212,7 +214,7 @@
           <a:p>
             <a:fld id="{B24A7054-7FFB-49F4-A126-5DF6E687FF53}" type="datetimeFigureOut">
               <a:rPr lang="ru-RU" smtClean="0"/>
-              <a:t>14.02.2015</a:t>
+              <a:t>11.04.2016</a:t>
             </a:fld>
             <a:endParaRPr lang="ru-RU"/>
           </a:p>
@@ -1494,7 +1496,7 @@
           <a:p>
             <a:fld id="{8E6E6A2A-E9D3-4A0D-B04A-ABDD367A1E08}" type="datetimeFigureOut">
               <a:rPr lang="ru-RU" smtClean="0"/>
-              <a:t>14.02.2015</a:t>
+              <a:t>11.04.2016</a:t>
             </a:fld>
             <a:endParaRPr lang="ru-RU"/>
           </a:p>
@@ -2939,7 +2941,7 @@
           <a:p>
             <a:fld id="{AC3D3127-B7C4-45E3-9797-C527EC9FDD78}" type="datetimeFigureOut">
               <a:rPr lang="ru-RU" smtClean="0"/>
-              <a:t>14.02.2015</a:t>
+              <a:t>11.04.2016</a:t>
             </a:fld>
             <a:endParaRPr lang="ru-RU"/>
           </a:p>
@@ -4341,34 +4343,85 @@
           <a:lstStyle/>
           <a:p>
             <a:r>
-              <a:rPr lang="ru-RU" sz="2800" dirty="0" smtClean="0"/>
+              <a:rPr lang="ru-RU" sz="2800" dirty="0" smtClean="0">
+                <a:solidFill>
+                  <a:srgbClr val="FFFF00"/>
+                </a:solidFill>
+              </a:rPr>
+              <a:t>Рефакторинг</a:t>
+            </a:r>
+            <a:r>
+              <a:rPr lang="ru-RU" sz="2800" dirty="0">
+                <a:solidFill>
+                  <a:srgbClr val="FFFF00"/>
+                </a:solidFill>
+              </a:rPr>
+              <a:t>. Улучшение существующего </a:t>
+            </a:r>
+            <a:r>
+              <a:rPr lang="ru-RU" sz="2800" dirty="0" smtClean="0">
+                <a:solidFill>
+                  <a:srgbClr val="FFFF00"/>
+                </a:solidFill>
+              </a:rPr>
+              <a:t>кода</a:t>
+            </a:r>
+            <a:r>
+              <a:rPr lang="en-US" sz="2800" dirty="0" smtClean="0">
+                <a:solidFill>
+                  <a:srgbClr val="FFFF00"/>
+                </a:solidFill>
+              </a:rPr>
+              <a:t/>
+            </a:r>
+            <a:br>
+              <a:rPr lang="en-US" sz="2800" dirty="0" smtClean="0">
+                <a:solidFill>
+                  <a:srgbClr val="FFFF00"/>
+                </a:solidFill>
+              </a:rPr>
+            </a:br>
+            <a:r>
+              <a:rPr lang="ru-RU" sz="2800" dirty="0" smtClean="0">
+                <a:solidFill>
+                  <a:srgbClr val="FFFF00"/>
+                </a:solidFill>
+              </a:rPr>
+              <a:t>(</a:t>
+            </a:r>
+            <a:r>
+              <a:rPr lang="en-US" sz="2800" dirty="0">
+                <a:solidFill>
+                  <a:srgbClr val="FFFF00"/>
+                </a:solidFill>
+              </a:rPr>
+              <a:t>Refactoring: Improving the Design of Existing Code</a:t>
+            </a:r>
+            <a:r>
+              <a:rPr lang="ru-RU" sz="2800" dirty="0" smtClean="0">
+                <a:solidFill>
+                  <a:srgbClr val="FFFF00"/>
+                </a:solidFill>
+              </a:rPr>
+              <a:t>)</a:t>
+            </a:r>
+            <a:r>
+              <a:rPr lang="en-US" sz="2800" dirty="0" smtClean="0"/>
+              <a:t/>
+            </a:r>
+            <a:br>
+              <a:rPr lang="en-US" sz="2800" dirty="0" smtClean="0"/>
+            </a:br>
+            <a:r>
+              <a:rPr lang="ru-RU" sz="2800" dirty="0"/>
               <a:t>Мартин Фаулер (</a:t>
             </a:r>
             <a:r>
-              <a:rPr lang="en-US" sz="2800" dirty="0" smtClean="0"/>
+              <a:rPr lang="en-US" sz="2800" dirty="0"/>
               <a:t>Martin Fowler</a:t>
             </a:r>
             <a:r>
               <a:rPr lang="ru-RU" sz="2800" dirty="0"/>
-              <a:t>)</a:t>
-            </a:r>
-            <a:br>
-              <a:rPr lang="ru-RU" sz="2800" dirty="0"/>
-            </a:br>
-            <a:r>
-              <a:rPr lang="ru-RU" sz="2800" dirty="0"/>
-              <a:t>Рефакторинг. Улучшение существующего кода </a:t>
-            </a:r>
-            <a:r>
-              <a:rPr lang="ru-RU" sz="2800" dirty="0" smtClean="0"/>
-              <a:t>(</a:t>
-            </a:r>
-            <a:r>
-              <a:rPr lang="en-US" sz="2800" dirty="0"/>
-              <a:t>Refactoring: Improving the Design of Existing Code</a:t>
-            </a:r>
-            <a:r>
-              <a:rPr lang="ru-RU" sz="2800" dirty="0" smtClean="0"/>
               <a:t>)</a:t>
             </a:r>
             <a:endParaRPr lang="ru-RU" sz="2800" dirty="0"/>
@@ -4775,12 +4828,21 @@
           </a:xfrm>
         </p:spPr>
         <p:txBody>
-          <a:bodyPr/>
+          <a:bodyPr>
+            <a:normAutofit fontScale="90000"/>
+          </a:bodyPr>
           <a:lstStyle/>
           <a:p>
             <a:r>
               <a:rPr lang="ru-RU" dirty="0" smtClean="0"/>
-              <a:t>Проектирование</a:t>
+              <a:t>Разработка через тестирование</a:t>
+            </a:r>
+            <a:br>
+              <a:rPr lang="ru-RU" dirty="0" smtClean="0"/>
+            </a:br>
+            <a:r>
+              <a:rPr lang="en-US" dirty="0" smtClean="0"/>
+              <a:t>TDD: Test Driven Development</a:t>
             </a:r>
             <a:endParaRPr lang="ru-RU" dirty="0"/>
           </a:p>
@@ -4789,7 +4851,7 @@
     </p:spTree>
     <p:extLst>
       <p:ext uri="{BB962C8B-B14F-4D97-AF65-F5344CB8AC3E}">
-        <p14:creationId xmlns:p14="http://schemas.microsoft.com/office/powerpoint/2010/main" val="1206248273"/>
+        <p14:creationId xmlns:p14="http://schemas.microsoft.com/office/powerpoint/2010/main" val="3190292504"/>
       </p:ext>
     </p:extLst>
   </p:cSld>
@@ -4842,48 +4904,79 @@
         </p:spPr>
         <p:txBody>
           <a:bodyPr>
-            <a:normAutofit/>
+            <a:normAutofit fontScale="90000"/>
           </a:bodyPr>
           <a:lstStyle/>
           <a:p>
             <a:r>
+              <a:rPr lang="ru-RU" sz="2800" dirty="0" smtClean="0">
+                <a:solidFill>
+                  <a:srgbClr val="FFFF00"/>
+                </a:solidFill>
+              </a:rPr>
+              <a:t>Искусство автономного тестирования с примерами на С#</a:t>
+            </a:r>
+            <a:r>
+              <a:rPr lang="en-US" sz="2800" dirty="0">
+                <a:solidFill>
+                  <a:srgbClr val="FFFF00"/>
+                </a:solidFill>
+              </a:rPr>
+              <a:t/>
+            </a:r>
+            <a:br>
+              <a:rPr lang="en-US" sz="2800" dirty="0">
+                <a:solidFill>
+                  <a:srgbClr val="FFFF00"/>
+                </a:solidFill>
+              </a:rPr>
+            </a:br>
+            <a:r>
+              <a:rPr lang="en-US" sz="2800" dirty="0">
+                <a:solidFill>
+                  <a:srgbClr val="FFFF00"/>
+                </a:solidFill>
+              </a:rPr>
+              <a:t> The Art of Unit Testing, </a:t>
+            </a:r>
+            <a:r>
+              <a:rPr lang="en-US" sz="2800" dirty="0" smtClean="0">
+                <a:solidFill>
+                  <a:srgbClr val="FFFF00"/>
+                </a:solidFill>
+              </a:rPr>
+              <a:t>with </a:t>
+            </a:r>
+            <a:r>
+              <a:rPr lang="en-US" sz="2800" dirty="0">
+                <a:solidFill>
+                  <a:srgbClr val="FFFF00"/>
+                </a:solidFill>
+              </a:rPr>
+              <a:t>examples in C#</a:t>
+            </a:r>
+            <a:r>
               <a:rPr lang="en-US" sz="2800" dirty="0" smtClean="0"/>
-              <a:t>Krzysztof </a:t>
-            </a:r>
-            <a:r>
-              <a:rPr lang="en-US" sz="2800" dirty="0" err="1"/>
-              <a:t>Cwalina</a:t>
-            </a:r>
-            <a:r>
-              <a:rPr lang="en-US" sz="2800" dirty="0"/>
-              <a:t>, Brad </a:t>
-            </a:r>
-            <a:r>
-              <a:rPr lang="en-US" sz="2800" dirty="0" smtClean="0"/>
-              <a:t>Abrams</a:t>
+              <a:t/>
             </a:r>
             <a:br>
               <a:rPr lang="en-US" sz="2800" dirty="0" smtClean="0"/>
             </a:br>
             <a:r>
-              <a:rPr lang="ru-RU" sz="2800" dirty="0"/>
-              <a:t>«</a:t>
+              <a:rPr lang="ru-RU" sz="2800" dirty="0" smtClean="0"/>
+              <a:t>Рой Ошероув</a:t>
             </a:r>
             <a:r>
               <a:rPr lang="en-US" sz="2800" dirty="0"/>
-              <a:t>Framework Design Guidelines</a:t>
-            </a:r>
-            <a:r>
-              <a:rPr lang="ru-RU" sz="2800" dirty="0" smtClean="0"/>
-              <a:t>»</a:t>
-            </a:r>
-            <a:r>
-              <a:rPr lang="en-US" sz="2800" dirty="0" smtClean="0"/>
-              <a:t>, 2nd </a:t>
+              <a:t> (Roy </a:t>
+            </a:r>
+            <a:r>
+              <a:rPr lang="en-US" sz="2800" dirty="0" err="1"/>
+              <a:t>Osherove</a:t>
             </a:r>
             <a:r>
               <a:rPr lang="en-US" sz="2800" dirty="0"/>
-              <a:t>Edition, 2008</a:t>
+              <a:t>)</a:t>
             </a:r>
             <a:endParaRPr lang="ru-RU" sz="2800" dirty="0"/>
           </a:p>
@@ -4915,27 +5008,107 @@
               <a:buNone/>
             </a:pPr>
             <a:r>
+              <a:rPr lang="en-US" dirty="0" smtClean="0"/>
+              <a:t>A</a:t>
+            </a:r>
+            <a:r>
+              <a:rPr lang="ru-RU" dirty="0" smtClean="0"/>
+              <a:t>втор </a:t>
+            </a:r>
+            <a:r>
               <a:rPr lang="ru-RU" dirty="0"/>
-              <a:t>Разработка качественных систем является весьма сложной задачей, а разработка качественных библиотек (особенно фреймворков) является поистине вершиной мастерства архитекторов и разработчиков. Сложность здесь кроется в специфике принимаемых решений, ведь акцент серьезно смещается в сторону простоты и удобства использования, расширяемости и надежности. И хотя именно тема разработка библиотек является центральной, книга будет также невероятно полезна и простым разработчикам, ведь знание ключевых идиом языка является совершенно необходимым, когда команда смотрит хотя бы немного дальше своего носа, и заботится не только о написании кода, но и о его последующем сопровождении</a:t>
+              <a:t>шаг за шагом проведет вас по пути от первого простенького автономного теста до создания полного комплекта тестов - понятых, удобных для сопровождения и заслуживающих доверия. Вы и не заметите, как перейдете к более сложным вопросам - заглушкам и подставкам - и попутно научитесь работать с изолирующими каркасами типа </a:t>
+            </a:r>
+            <a:r>
+              <a:rPr lang="ru-RU" dirty="0" err="1"/>
+              <a:t>Moq</a:t>
+            </a:r>
+            <a:r>
+              <a:rPr lang="ru-RU" dirty="0"/>
+              <a:t>, </a:t>
+            </a:r>
+            <a:r>
+              <a:rPr lang="ru-RU" dirty="0" err="1"/>
+              <a:t>FakeltEasy</a:t>
+            </a:r>
+            <a:r>
+              <a:rPr lang="ru-RU" dirty="0"/>
+              <a:t> или </a:t>
+            </a:r>
+            <a:r>
+              <a:rPr lang="ru-RU" dirty="0" err="1"/>
+              <a:t>Typemock</a:t>
+            </a:r>
+            <a:r>
+              <a:rPr lang="ru-RU" dirty="0"/>
+              <a:t> </a:t>
+            </a:r>
+            <a:r>
+              <a:rPr lang="ru-RU" dirty="0" err="1"/>
+              <a:t>Isolator</a:t>
+            </a:r>
+            <a:r>
+              <a:rPr lang="ru-RU" dirty="0"/>
+              <a:t>. Вы узнаете о паттернах тестирования и организации тестов, о том, как проводить </a:t>
+            </a:r>
+            <a:r>
+              <a:rPr lang="ru-RU" dirty="0" err="1"/>
+              <a:t>рефакторинг</a:t>
+            </a:r>
+            <a:r>
+              <a:rPr lang="ru-RU" dirty="0"/>
+              <a:t> приложении и тестировать "</a:t>
+            </a:r>
+            <a:r>
+              <a:rPr lang="ru-RU" dirty="0" err="1"/>
+              <a:t>нетестопригодный</a:t>
+            </a:r>
+            <a:r>
+              <a:rPr lang="ru-RU" dirty="0"/>
+              <a:t>" код. Не забыл автор и об интеграционном тестировании и тестировании работы с базами данных</a:t>
             </a:r>
             <a:r>
               <a:rPr lang="ru-RU" dirty="0" smtClean="0"/>
               <a:t>.</a:t>
             </a:r>
+            <a:endParaRPr lang="en-US" dirty="0" smtClean="0"/>
+          </a:p>
+          <a:p>
+            <a:pPr marL="0" indent="0">
+              <a:buNone/>
+            </a:pPr>
+            <a:endParaRPr lang="en-US" dirty="0"/>
+          </a:p>
+          <a:p>
+            <a:pPr marL="0" indent="0">
+              <a:buNone/>
+            </a:pPr>
+            <a:r>
+              <a:rPr lang="en-US" dirty="0">
+                <a:hlinkClick r:id="rId2"/>
+              </a:rPr>
+              <a:t>http://</a:t>
+            </a:r>
+            <a:r>
+              <a:rPr lang="en-US" dirty="0" smtClean="0">
+                <a:hlinkClick r:id="rId2"/>
+              </a:rPr>
+              <a:t>oz.by/books/more10382361.html</a:t>
+            </a:r>
             <a:endParaRPr lang="ru-RU" dirty="0"/>
           </a:p>
         </p:txBody>
       </p:sp>
       <p:pic>
         <p:nvPicPr>
-          <p:cNvPr id="4098" name="Picture 2" descr="clip_image026"/>
+          <p:cNvPr id="1027" name="Picture 3"/>
           <p:cNvPicPr>
             <a:picLocks noChangeAspect="1" noChangeArrowheads="1"/>
           </p:cNvPicPr>
           <p:nvPr/>
         </p:nvPicPr>
         <p:blipFill>
-          <a:blip r:embed="rId2">
+          <a:blip r:embed="rId3">
             <a:extLst>
               <a:ext uri="{28A0092B-C50C-407E-A947-70E740481C1C}">
                 <a14:useLocalDpi xmlns:a14="http://schemas.microsoft.com/office/drawing/2010/main" val="0"/>
@@ -4949,20 +5122,43 @@
         </p:blipFill>
         <p:spPr bwMode="auto">
           <a:xfrm>
-            <a:off x="155575" y="2286000"/>
-            <a:ext cx="1685925" cy="2286001"/>
+            <a:off x="251520" y="2132856"/>
+            <a:ext cx="1905000" cy="2819400"/>
           </a:xfrm>
           <a:prstGeom prst="rect">
             <a:avLst/>
           </a:prstGeom>
           <a:noFill/>
+          <a:ln>
+            <a:noFill/>
+          </a:ln>
+          <a:effectLst/>
           <a:extLst>
             <a:ext uri="{909E8E84-426E-40DD-AFC4-6F175D3DCCD1}">
               <a14:hiddenFill xmlns:a14="http://schemas.microsoft.com/office/drawing/2010/main">
                 <a:solidFill>
-                  <a:srgbClr val="FFFFFF"/>
+                  <a:schemeClr val="accent1"/>
                 </a:solidFill>
               </a14:hiddenFill>
+            </a:ext>
+            <a:ext uri="{91240B29-F687-4F45-9708-019B960494DF}">
+              <a14:hiddenLine xmlns:a14="http://schemas.microsoft.com/office/drawing/2010/main" w="9525">
+                <a:solidFill>
+                  <a:schemeClr val="tx1"/>
+                </a:solidFill>
+                <a:miter lim="800000"/>
+                <a:headEnd/>
+                <a:tailEnd/>
+              </a14:hiddenLine>
+            </a:ext>
+            <a:ext uri="{AF507438-7753-43E0-B8FC-AC1667EBCBE1}">
+              <a14:hiddenEffects xmlns:a14="http://schemas.microsoft.com/office/drawing/2010/main">
+                <a:effectLst>
+                  <a:outerShdw dist="35921" dir="2700000" algn="ctr" rotWithShape="0">
+                    <a:schemeClr val="bg2"/>
+                  </a:outerShdw>
+                </a:effectLst>
+              </a14:hiddenEffects>
             </a:ext>
           </a:extLst>
         </p:spPr>
@@ -4970,7 +5166,7 @@
     </p:spTree>
     <p:extLst>
       <p:ext uri="{BB962C8B-B14F-4D97-AF65-F5344CB8AC3E}">
-        <p14:creationId xmlns:p14="http://schemas.microsoft.com/office/powerpoint/2010/main" val="3172888255"/>
+        <p14:creationId xmlns:p14="http://schemas.microsoft.com/office/powerpoint/2010/main" val="592976606"/>
       </p:ext>
     </p:extLst>
   </p:cSld>
@@ -5016,19 +5212,17 @@
         </p:nvSpPr>
         <p:spPr>
           <a:xfrm>
-            <a:off x="457200" y="2459174"/>
-            <a:ext cx="8229600" cy="1939652"/>
+            <a:off x="457200" y="2857500"/>
+            <a:ext cx="8229600" cy="1143000"/>
           </a:xfrm>
         </p:spPr>
         <p:txBody>
-          <a:bodyPr>
-            <a:normAutofit/>
-          </a:bodyPr>
+          <a:bodyPr/>
           <a:lstStyle/>
           <a:p>
             <a:r>
               <a:rPr lang="ru-RU" dirty="0" smtClean="0"/>
-              <a:t>Другое</a:t>
+              <a:t>Проектирование</a:t>
             </a:r>
             <a:endParaRPr lang="ru-RU" dirty="0"/>
           </a:p>
@@ -5037,7 +5231,7 @@
     </p:spTree>
     <p:extLst>
       <p:ext uri="{BB962C8B-B14F-4D97-AF65-F5344CB8AC3E}">
-        <p14:creationId xmlns:p14="http://schemas.microsoft.com/office/powerpoint/2010/main" val="941366620"/>
+        <p14:creationId xmlns:p14="http://schemas.microsoft.com/office/powerpoint/2010/main" val="1206248273"/>
       </p:ext>
     </p:extLst>
   </p:cSld>
@@ -5261,6 +5455,254 @@
           </p:nvPr>
         </p:nvSpPr>
         <p:spPr>
+          <a:ln>
+            <a:solidFill>
+              <a:schemeClr val="tx1"/>
+            </a:solidFill>
+          </a:ln>
+        </p:spPr>
+        <p:txBody>
+          <a:bodyPr>
+            <a:normAutofit/>
+          </a:bodyPr>
+          <a:lstStyle/>
+          <a:p>
+            <a:r>
+              <a:rPr lang="en-US" sz="2800" dirty="0" smtClean="0"/>
+              <a:t>Krzysztof </a:t>
+            </a:r>
+            <a:r>
+              <a:rPr lang="en-US" sz="2800" dirty="0" err="1"/>
+              <a:t>Cwalina</a:t>
+            </a:r>
+            <a:r>
+              <a:rPr lang="en-US" sz="2800" dirty="0"/>
+              <a:t>, Brad </a:t>
+            </a:r>
+            <a:r>
+              <a:rPr lang="en-US" sz="2800" dirty="0" smtClean="0"/>
+              <a:t>Abrams</a:t>
+            </a:r>
+            <a:br>
+              <a:rPr lang="en-US" sz="2800" dirty="0" smtClean="0"/>
+            </a:br>
+            <a:r>
+              <a:rPr lang="ru-RU" sz="2800" dirty="0"/>
+              <a:t>«</a:t>
+            </a:r>
+            <a:r>
+              <a:rPr lang="en-US" sz="2800" dirty="0"/>
+              <a:t>Framework Design Guidelines</a:t>
+            </a:r>
+            <a:r>
+              <a:rPr lang="ru-RU" sz="2800" dirty="0" smtClean="0"/>
+              <a:t>»</a:t>
+            </a:r>
+            <a:r>
+              <a:rPr lang="en-US" sz="2800" dirty="0" smtClean="0"/>
+              <a:t>, 2nd </a:t>
+            </a:r>
+            <a:r>
+              <a:rPr lang="en-US" sz="2800" dirty="0"/>
+              <a:t>Edition, 2008</a:t>
+            </a:r>
+            <a:endParaRPr lang="ru-RU" sz="2800" dirty="0"/>
+          </a:p>
+        </p:txBody>
+      </p:sp>
+      <p:sp>
+        <p:nvSpPr>
+          <p:cNvPr id="3" name="Content Placeholder 2"/>
+          <p:cNvSpPr>
+            <a:spLocks noGrp="1"/>
+          </p:cNvSpPr>
+          <p:nvPr>
+            <p:ph idx="1"/>
+          </p:nvPr>
+        </p:nvSpPr>
+        <p:spPr>
+          <a:xfrm>
+            <a:off x="2267744" y="1600200"/>
+            <a:ext cx="6419056" cy="4525963"/>
+          </a:xfrm>
+        </p:spPr>
+        <p:txBody>
+          <a:bodyPr>
+            <a:normAutofit fontScale="70000" lnSpcReduction="20000"/>
+          </a:bodyPr>
+          <a:lstStyle/>
+          <a:p>
+            <a:pPr marL="0" indent="0">
+              <a:buNone/>
+            </a:pPr>
+            <a:r>
+              <a:rPr lang="ru-RU" dirty="0"/>
+              <a:t>Разработка качественных систем является весьма сложной задачей, а разработка качественных библиотек (особенно фреймворков) является поистине вершиной мастерства архитекторов и разработчиков. Сложность здесь кроется в специфике принимаемых решений, ведь акцент серьезно смещается в сторону простоты и удобства использования, расширяемости и надежности. И хотя именно тема разработка библиотек является центральной, книга будет также невероятно полезна и простым разработчикам, ведь знание ключевых идиом языка является совершенно необходимым, когда команда смотрит хотя бы немного дальше своего носа, и заботится не только о написании кода, но и о его последующем сопровождении</a:t>
+            </a:r>
+            <a:r>
+              <a:rPr lang="ru-RU" dirty="0" smtClean="0"/>
+              <a:t>.</a:t>
+            </a:r>
+            <a:endParaRPr lang="ru-RU" dirty="0"/>
+          </a:p>
+        </p:txBody>
+      </p:sp>
+      <p:pic>
+        <p:nvPicPr>
+          <p:cNvPr id="4098" name="Picture 2" descr="clip_image026"/>
+          <p:cNvPicPr>
+            <a:picLocks noChangeAspect="1" noChangeArrowheads="1"/>
+          </p:cNvPicPr>
+          <p:nvPr/>
+        </p:nvPicPr>
+        <p:blipFill>
+          <a:blip r:embed="rId2">
+            <a:extLst>
+              <a:ext uri="{28A0092B-C50C-407E-A947-70E740481C1C}">
+                <a14:useLocalDpi xmlns:a14="http://schemas.microsoft.com/office/drawing/2010/main" val="0"/>
+              </a:ext>
+            </a:extLst>
+          </a:blip>
+          <a:srcRect/>
+          <a:stretch>
+            <a:fillRect/>
+          </a:stretch>
+        </p:blipFill>
+        <p:spPr bwMode="auto">
+          <a:xfrm>
+            <a:off x="155575" y="2286000"/>
+            <a:ext cx="1685925" cy="2286001"/>
+          </a:xfrm>
+          <a:prstGeom prst="rect">
+            <a:avLst/>
+          </a:prstGeom>
+          <a:noFill/>
+          <a:extLst>
+            <a:ext uri="{909E8E84-426E-40DD-AFC4-6F175D3DCCD1}">
+              <a14:hiddenFill xmlns:a14="http://schemas.microsoft.com/office/drawing/2010/main">
+                <a:solidFill>
+                  <a:srgbClr val="FFFFFF"/>
+                </a:solidFill>
+              </a14:hiddenFill>
+            </a:ext>
+          </a:extLst>
+        </p:spPr>
+      </p:pic>
+    </p:spTree>
+    <p:extLst>
+      <p:ext uri="{BB962C8B-B14F-4D97-AF65-F5344CB8AC3E}">
+        <p14:creationId xmlns:p14="http://schemas.microsoft.com/office/powerpoint/2010/main" val="3172888255"/>
+      </p:ext>
+    </p:extLst>
+  </p:cSld>
+  <p:clrMapOvr>
+    <a:masterClrMapping/>
+  </p:clrMapOvr>
+  <p:timing>
+    <p:tnLst>
+      <p:par>
+        <p:cTn id="1" dur="indefinite" restart="never" nodeType="tmRoot"/>
+      </p:par>
+    </p:tnLst>
+  </p:timing>
+</p:sld>
+</file>
+
+<file path=ppt/slides/slide21.xml><?xml version="1.0" encoding="utf-8"?>
+<p:sld xmlns:a="http://schemas.openxmlformats.org/drawingml/2006/main" xmlns:r="http://schemas.openxmlformats.org/officeDocument/2006/relationships" xmlns:p="http://schemas.openxmlformats.org/presentationml/2006/main">
+  <p:cSld>
+    <p:spTree>
+      <p:nvGrpSpPr>
+        <p:cNvPr id="1" name=""/>
+        <p:cNvGrpSpPr/>
+        <p:nvPr/>
+      </p:nvGrpSpPr>
+      <p:grpSpPr>
+        <a:xfrm>
+          <a:off x="0" y="0"/>
+          <a:ext cx="0" cy="0"/>
+          <a:chOff x="0" y="0"/>
+          <a:chExt cx="0" cy="0"/>
+        </a:xfrm>
+      </p:grpSpPr>
+      <p:sp>
+        <p:nvSpPr>
+          <p:cNvPr id="2" name="Title 1"/>
+          <p:cNvSpPr>
+            <a:spLocks noGrp="1"/>
+          </p:cNvSpPr>
+          <p:nvPr>
+            <p:ph type="title"/>
+          </p:nvPr>
+        </p:nvSpPr>
+        <p:spPr>
+          <a:xfrm>
+            <a:off x="457200" y="2459174"/>
+            <a:ext cx="8229600" cy="1939652"/>
+          </a:xfrm>
+        </p:spPr>
+        <p:txBody>
+          <a:bodyPr>
+            <a:normAutofit/>
+          </a:bodyPr>
+          <a:lstStyle/>
+          <a:p>
+            <a:r>
+              <a:rPr lang="ru-RU" dirty="0" smtClean="0"/>
+              <a:t>Другое</a:t>
+            </a:r>
+            <a:endParaRPr lang="ru-RU" dirty="0"/>
+          </a:p>
+        </p:txBody>
+      </p:sp>
+    </p:spTree>
+    <p:extLst>
+      <p:ext uri="{BB962C8B-B14F-4D97-AF65-F5344CB8AC3E}">
+        <p14:creationId xmlns:p14="http://schemas.microsoft.com/office/powerpoint/2010/main" val="941366620"/>
+      </p:ext>
+    </p:extLst>
+  </p:cSld>
+  <p:clrMapOvr>
+    <a:masterClrMapping/>
+  </p:clrMapOvr>
+  <p:timing>
+    <p:tnLst>
+      <p:par>
+        <p:cTn id="1" dur="indefinite" restart="never" nodeType="tmRoot"/>
+      </p:par>
+    </p:tnLst>
+  </p:timing>
+</p:sld>
+</file>
+
+<file path=ppt/slides/slide22.xml><?xml version="1.0" encoding="utf-8"?>
+<p:sld xmlns:a="http://schemas.openxmlformats.org/drawingml/2006/main" xmlns:r="http://schemas.openxmlformats.org/officeDocument/2006/relationships" xmlns:p="http://schemas.openxmlformats.org/presentationml/2006/main">
+  <p:cSld>
+    <p:spTree>
+      <p:nvGrpSpPr>
+        <p:cNvPr id="1" name=""/>
+        <p:cNvGrpSpPr/>
+        <p:nvPr/>
+      </p:nvGrpSpPr>
+      <p:grpSpPr>
+        <a:xfrm>
+          <a:off x="0" y="0"/>
+          <a:ext cx="0" cy="0"/>
+          <a:chOff x="0" y="0"/>
+          <a:chExt cx="0" cy="0"/>
+        </a:xfrm>
+      </p:grpSpPr>
+      <p:sp>
+        <p:nvSpPr>
+          <p:cNvPr id="2" name="Title 1"/>
+          <p:cNvSpPr>
+            <a:spLocks noGrp="1"/>
+          </p:cNvSpPr>
+          <p:nvPr>
+            <p:ph type="title"/>
+          </p:nvPr>
+        </p:nvSpPr>
+        <p:spPr>
           <a:noFill/>
           <a:ln>
             <a:solidFill>
@@ -5380,7 +5822,7 @@
 </p:sld>
 </file>
 
-<file path=ppt/slides/slide21.xml><?xml version="1.0" encoding="utf-8"?>
+<file path=ppt/slides/slide23.xml><?xml version="1.0" encoding="utf-8"?>
 <p:sld xmlns:a="http://schemas.openxmlformats.org/drawingml/2006/main" xmlns:r="http://schemas.openxmlformats.org/officeDocument/2006/relationships" xmlns:p="http://schemas.openxmlformats.org/presentationml/2006/main">
   <p:cSld>
     <p:spTree>
@@ -5774,23 +6216,11 @@
             </a:pPr>
             <a:r>
               <a:rPr lang="ru-RU" sz="2800" dirty="0" smtClean="0"/>
-              <a:t>Джон Скит </a:t>
-            </a:r>
-            <a:r>
-              <a:rPr lang="ru-RU" sz="2800" dirty="0" smtClean="0"/>
-              <a:t>заслуженно </a:t>
-            </a:r>
-            <a:r>
-              <a:rPr lang="ru-RU" sz="2800" dirty="0" smtClean="0"/>
-              <a:t>известен как «Чак Норрис </a:t>
+              <a:t>Джон Скит заслуженно известен как «Чак Норрис </a:t>
             </a:r>
             <a:r>
               <a:rPr lang="en-US" sz="2800" dirty="0" smtClean="0"/>
-              <a:t>.NET</a:t>
-            </a:r>
-            <a:r>
-              <a:rPr lang="en-US" sz="2800" dirty="0" smtClean="0"/>
-              <a:t>-a</a:t>
+              <a:t>.NET-a</a:t>
             </a:r>
             <a:r>
               <a:rPr lang="ru-RU" sz="2800" dirty="0" smtClean="0"/>

</xml_diff>

<commit_message>
Updated books to read. Added sections and books on EF
</commit_message>
<xml_diff>
--- a/Presentation/books-to-read.pptx
+++ b/Presentation/books-to-read.pptx
@@ -5,32 +5,37 @@
     <p:sldMasterId id="2147483648" r:id="rId1"/>
   </p:sldMasterIdLst>
   <p:notesMasterIdLst>
-    <p:notesMasterId r:id="rId25"/>
+    <p:notesMasterId r:id="rId30"/>
   </p:notesMasterIdLst>
   <p:sldIdLst>
     <p:sldId id="258" r:id="rId2"/>
-    <p:sldId id="269" r:id="rId3"/>
-    <p:sldId id="270" r:id="rId4"/>
-    <p:sldId id="282" r:id="rId5"/>
-    <p:sldId id="277" r:id="rId6"/>
-    <p:sldId id="271" r:id="rId7"/>
-    <p:sldId id="265" r:id="rId8"/>
-    <p:sldId id="279" r:id="rId9"/>
-    <p:sldId id="268" r:id="rId10"/>
-    <p:sldId id="278" r:id="rId11"/>
-    <p:sldId id="272" r:id="rId12"/>
-    <p:sldId id="259" r:id="rId13"/>
-    <p:sldId id="262" r:id="rId14"/>
-    <p:sldId id="260" r:id="rId15"/>
-    <p:sldId id="263" r:id="rId16"/>
-    <p:sldId id="281" r:id="rId17"/>
-    <p:sldId id="283" r:id="rId18"/>
-    <p:sldId id="284" r:id="rId19"/>
-    <p:sldId id="280" r:id="rId20"/>
-    <p:sldId id="264" r:id="rId21"/>
-    <p:sldId id="261" r:id="rId22"/>
-    <p:sldId id="275" r:id="rId23"/>
-    <p:sldId id="276" r:id="rId24"/>
+    <p:sldId id="265" r:id="rId3"/>
+    <p:sldId id="269" r:id="rId4"/>
+    <p:sldId id="286" r:id="rId5"/>
+    <p:sldId id="270" r:id="rId6"/>
+    <p:sldId id="282" r:id="rId7"/>
+    <p:sldId id="277" r:id="rId8"/>
+    <p:sldId id="271" r:id="rId9"/>
+    <p:sldId id="285" r:id="rId10"/>
+    <p:sldId id="279" r:id="rId11"/>
+    <p:sldId id="268" r:id="rId12"/>
+    <p:sldId id="278" r:id="rId13"/>
+    <p:sldId id="272" r:id="rId14"/>
+    <p:sldId id="259" r:id="rId15"/>
+    <p:sldId id="262" r:id="rId16"/>
+    <p:sldId id="260" r:id="rId17"/>
+    <p:sldId id="263" r:id="rId18"/>
+    <p:sldId id="287" r:id="rId19"/>
+    <p:sldId id="288" r:id="rId20"/>
+    <p:sldId id="289" r:id="rId21"/>
+    <p:sldId id="281" r:id="rId22"/>
+    <p:sldId id="283" r:id="rId23"/>
+    <p:sldId id="284" r:id="rId24"/>
+    <p:sldId id="280" r:id="rId25"/>
+    <p:sldId id="264" r:id="rId26"/>
+    <p:sldId id="261" r:id="rId27"/>
+    <p:sldId id="275" r:id="rId28"/>
+    <p:sldId id="276" r:id="rId29"/>
   </p:sldIdLst>
   <p:sldSz cx="9144000" cy="6858000" type="screen4x3"/>
   <p:notesSz cx="6858000" cy="9144000"/>
@@ -129,6 +134,86 @@
       </a:defRPr>
     </a:lvl9pPr>
   </p:defaultTextStyle>
+  <p:extLst>
+    <p:ext uri="{521415D9-36F7-43E2-AB2F-B90AF26B5E84}">
+      <p14:sectionLst xmlns:p14="http://schemas.microsoft.com/office/powerpoint/2010/main">
+        <p14:section name="Default Section" id="{81770E32-8A89-46F3-9C2D-7B8559E4870A}">
+          <p14:sldIdLst>
+            <p14:sldId id="258"/>
+            <p14:sldId id="265"/>
+            <p14:sldId id="269"/>
+          </p14:sldIdLst>
+        </p14:section>
+        <p14:section name="Для продолжающих" id="{56F71D58-A94A-4EA9-B6F5-310B0B9E8EAA}">
+          <p14:sldIdLst>
+            <p14:sldId id="286"/>
+            <p14:sldId id="270"/>
+            <p14:sldId id="282"/>
+            <p14:sldId id="277"/>
+            <p14:sldId id="271"/>
+          </p14:sldIdLst>
+        </p14:section>
+        <p14:section name="ООП и паттерны" id="{1BCF32D7-334E-40B1-8CB8-4433AA8A54A3}">
+          <p14:sldIdLst>
+            <p14:sldId id="285"/>
+            <p14:sldId id="279"/>
+            <p14:sldId id="268"/>
+            <p14:sldId id="278"/>
+            <p14:sldId id="272"/>
+          </p14:sldIdLst>
+        </p14:section>
+        <p14:section name="Стиль кодирования" id="{D6926DC9-8D7D-42A4-BF62-C525878265E2}">
+          <p14:sldIdLst>
+            <p14:sldId id="259"/>
+            <p14:sldId id="262"/>
+            <p14:sldId id="260"/>
+          </p14:sldIdLst>
+        </p14:section>
+        <p14:section name="Entity Framework" id="{D2261E48-3561-47B1-9323-791AAAC82049}">
+          <p14:sldIdLst>
+            <p14:sldId id="263"/>
+            <p14:sldId id="287"/>
+            <p14:sldId id="288"/>
+            <p14:sldId id="289"/>
+            <p14:sldId id="281"/>
+          </p14:sldIdLst>
+        </p14:section>
+        <p14:section name="TDD" id="{318A25E3-9622-4EFA-87BE-5752E5FB980F}">
+          <p14:sldIdLst>
+            <p14:sldId id="283"/>
+            <p14:sldId id="284"/>
+          </p14:sldIdLst>
+        </p14:section>
+        <p14:section name="Проектирование" id="{7D1BAFED-0A81-422B-84BD-57FA0CFE6C33}">
+          <p14:sldIdLst>
+            <p14:sldId id="280"/>
+            <p14:sldId id="264"/>
+          </p14:sldIdLst>
+        </p14:section>
+        <p14:section name="Другое" id="{C880A9E3-47AD-4E03-B875-4B7CF60B6B52}">
+          <p14:sldIdLst>
+            <p14:sldId id="261"/>
+            <p14:sldId id="275"/>
+            <p14:sldId id="276"/>
+          </p14:sldIdLst>
+        </p14:section>
+      </p14:sectionLst>
+    </p:ext>
+    <p:ext uri="{EFAFB233-063F-42B5-8137-9DF3F51BA10A}">
+      <p15:sldGuideLst xmlns:p15="http://schemas.microsoft.com/office/powerpoint/2012/main">
+        <p15:guide id="1" orient="horz" pos="2160">
+          <p15:clr>
+            <a:srgbClr val="A4A3A4"/>
+          </p15:clr>
+        </p15:guide>
+        <p15:guide id="2" pos="2880">
+          <p15:clr>
+            <a:srgbClr val="A4A3A4"/>
+          </p15:clr>
+        </p15:guide>
+      </p15:sldGuideLst>
+    </p:ext>
+  </p:extLst>
 </p:presentation>
 </file>
 
@@ -214,7 +299,7 @@
           <a:p>
             <a:fld id="{B24A7054-7FFB-49F4-A126-5DF6E687FF53}" type="datetimeFigureOut">
               <a:rPr lang="ru-RU" smtClean="0"/>
-              <a:t>02.10.2016</a:t>
+              <a:t>15.01.2017</a:t>
             </a:fld>
             <a:endParaRPr lang="ru-RU"/>
           </a:p>
@@ -1496,7 +1581,7 @@
           <a:p>
             <a:fld id="{8E6E6A2A-E9D3-4A0D-B04A-ABDD367A1E08}" type="datetimeFigureOut">
               <a:rPr lang="ru-RU" smtClean="0"/>
-              <a:t>02.10.2016</a:t>
+              <a:t>15.01.2017</a:t>
             </a:fld>
             <a:endParaRPr lang="ru-RU"/>
           </a:p>
@@ -2941,7 +3026,7 @@
           <a:p>
             <a:fld id="{AC3D3127-B7C4-45E3-9797-C527EC9FDD78}" type="datetimeFigureOut">
               <a:rPr lang="ru-RU" smtClean="0"/>
-              <a:t>02.10.2016</a:t>
+              <a:t>15.01.2017</a:t>
             </a:fld>
             <a:endParaRPr lang="ru-RU"/>
           </a:p>
@@ -3526,6 +3611,365 @@
 </file>
 
 <file path=ppt/slides/slide10.xml><?xml version="1.0" encoding="utf-8"?>
+<p:sld xmlns:a="http://schemas.openxmlformats.org/drawingml/2006/main" xmlns:r="http://schemas.openxmlformats.org/officeDocument/2006/relationships" xmlns:p="http://schemas.openxmlformats.org/presentationml/2006/main">
+  <p:cSld>
+    <p:spTree>
+      <p:nvGrpSpPr>
+        <p:cNvPr id="1" name=""/>
+        <p:cNvGrpSpPr/>
+        <p:nvPr/>
+      </p:nvGrpSpPr>
+      <p:grpSpPr>
+        <a:xfrm>
+          <a:off x="0" y="0"/>
+          <a:ext cx="0" cy="0"/>
+          <a:chOff x="0" y="0"/>
+          <a:chExt cx="0" cy="0"/>
+        </a:xfrm>
+      </p:grpSpPr>
+      <p:sp>
+        <p:nvSpPr>
+          <p:cNvPr id="2" name="Title 1"/>
+          <p:cNvSpPr>
+            <a:spLocks noGrp="1"/>
+          </p:cNvSpPr>
+          <p:nvPr>
+            <p:ph type="title"/>
+          </p:nvPr>
+        </p:nvSpPr>
+        <p:spPr>
+          <a:noFill/>
+          <a:ln>
+            <a:solidFill>
+              <a:schemeClr val="tx1"/>
+            </a:solidFill>
+          </a:ln>
+        </p:spPr>
+        <p:txBody>
+          <a:bodyPr>
+            <a:noAutofit/>
+          </a:bodyPr>
+          <a:lstStyle/>
+          <a:p>
+            <a:r>
+              <a:rPr lang="ru-RU" sz="2400" i="1" dirty="0">
+                <a:solidFill>
+                  <a:srgbClr val="FFFF00"/>
+                </a:solidFill>
+              </a:rPr>
+              <a:t>Объектно-ориентированный анализ и проектирование с примерами </a:t>
+            </a:r>
+            <a:r>
+              <a:rPr lang="ru-RU" sz="2400" i="1" dirty="0" smtClean="0">
+                <a:solidFill>
+                  <a:srgbClr val="FFFF00"/>
+                </a:solidFill>
+              </a:rPr>
+              <a:t>приложений</a:t>
+            </a:r>
+            <a:r>
+              <a:rPr lang="en-US" sz="2400" i="1" dirty="0" smtClean="0"/>
+              <a:t/>
+            </a:r>
+            <a:br>
+              <a:rPr lang="en-US" sz="2400" i="1" dirty="0" smtClean="0"/>
+            </a:br>
+            <a:r>
+              <a:rPr lang="ru-RU" sz="2400" dirty="0" smtClean="0"/>
+              <a:t>Гради Буч</a:t>
+            </a:r>
+            <a:endParaRPr lang="ru-RU" sz="2400" dirty="0"/>
+          </a:p>
+        </p:txBody>
+      </p:sp>
+      <p:sp>
+        <p:nvSpPr>
+          <p:cNvPr id="3" name="Content Placeholder 2"/>
+          <p:cNvSpPr>
+            <a:spLocks noGrp="1"/>
+          </p:cNvSpPr>
+          <p:nvPr>
+            <p:ph idx="1"/>
+          </p:nvPr>
+        </p:nvSpPr>
+        <p:spPr>
+          <a:xfrm>
+            <a:off x="3131840" y="1600200"/>
+            <a:ext cx="5554960" cy="4525963"/>
+          </a:xfrm>
+        </p:spPr>
+        <p:txBody>
+          <a:bodyPr anchor="t" anchorCtr="0">
+            <a:normAutofit fontScale="92500" lnSpcReduction="20000"/>
+          </a:bodyPr>
+          <a:lstStyle/>
+          <a:p>
+            <a:pPr marL="0" indent="0">
+              <a:buNone/>
+            </a:pPr>
+            <a:r>
+              <a:rPr lang="ru-RU" dirty="0" smtClean="0"/>
+              <a:t>В книге описываются </a:t>
+            </a:r>
+            <a:r>
+              <a:rPr lang="ru-RU" dirty="0"/>
+              <a:t>объектные методы решения сложных проблем, связанные с разработкой систем и программного обеспечения. Используя многочисленные примеры, </a:t>
+            </a:r>
+            <a:r>
+              <a:rPr lang="ru-RU" dirty="0" smtClean="0"/>
+              <a:t>иллюстрируются </a:t>
+            </a:r>
+            <a:r>
+              <a:rPr lang="ru-RU" dirty="0"/>
+              <a:t>основные концепции объектно-ориентированного подхода на примере разработки систем управления, сбора данных и искусственного интеллекта.</a:t>
+            </a:r>
+          </a:p>
+        </p:txBody>
+      </p:sp>
+      <p:pic>
+        <p:nvPicPr>
+          <p:cNvPr id="4" name="Picture 3"/>
+          <p:cNvPicPr>
+            <a:picLocks noChangeAspect="1"/>
+          </p:cNvPicPr>
+          <p:nvPr/>
+        </p:nvPicPr>
+        <p:blipFill>
+          <a:blip r:embed="rId2">
+            <a:extLst>
+              <a:ext uri="{28A0092B-C50C-407E-A947-70E740481C1C}">
+                <a14:useLocalDpi xmlns:a14="http://schemas.microsoft.com/office/drawing/2010/main" val="0"/>
+              </a:ext>
+            </a:extLst>
+          </a:blip>
+          <a:stretch>
+            <a:fillRect/>
+          </a:stretch>
+        </p:blipFill>
+        <p:spPr>
+          <a:xfrm>
+            <a:off x="467544" y="1600200"/>
+            <a:ext cx="2520000" cy="3578400"/>
+          </a:xfrm>
+          <a:prstGeom prst="rect">
+            <a:avLst/>
+          </a:prstGeom>
+        </p:spPr>
+      </p:pic>
+    </p:spTree>
+    <p:extLst>
+      <p:ext uri="{BB962C8B-B14F-4D97-AF65-F5344CB8AC3E}">
+        <p14:creationId xmlns:p14="http://schemas.microsoft.com/office/powerpoint/2010/main" val="3217659103"/>
+      </p:ext>
+    </p:extLst>
+  </p:cSld>
+  <p:clrMapOvr>
+    <a:masterClrMapping/>
+  </p:clrMapOvr>
+  <p:timing>
+    <p:tnLst>
+      <p:par>
+        <p:cTn id="1" dur="indefinite" restart="never" nodeType="tmRoot"/>
+      </p:par>
+    </p:tnLst>
+  </p:timing>
+</p:sld>
+</file>
+
+<file path=ppt/slides/slide11.xml><?xml version="1.0" encoding="utf-8"?>
+<p:sld xmlns:a="http://schemas.openxmlformats.org/drawingml/2006/main" xmlns:r="http://schemas.openxmlformats.org/officeDocument/2006/relationships" xmlns:p="http://schemas.openxmlformats.org/presentationml/2006/main">
+  <p:cSld>
+    <p:spTree>
+      <p:nvGrpSpPr>
+        <p:cNvPr id="1" name=""/>
+        <p:cNvGrpSpPr/>
+        <p:nvPr/>
+      </p:nvGrpSpPr>
+      <p:grpSpPr>
+        <a:xfrm>
+          <a:off x="0" y="0"/>
+          <a:ext cx="0" cy="0"/>
+          <a:chOff x="0" y="0"/>
+          <a:chExt cx="0" cy="0"/>
+        </a:xfrm>
+      </p:grpSpPr>
+      <p:sp>
+        <p:nvSpPr>
+          <p:cNvPr id="2" name="Title 1"/>
+          <p:cNvSpPr>
+            <a:spLocks noGrp="1"/>
+          </p:cNvSpPr>
+          <p:nvPr>
+            <p:ph type="title"/>
+          </p:nvPr>
+        </p:nvSpPr>
+        <p:spPr>
+          <a:noFill/>
+          <a:ln>
+            <a:solidFill>
+              <a:schemeClr val="tx1"/>
+            </a:solidFill>
+          </a:ln>
+        </p:spPr>
+        <p:txBody>
+          <a:bodyPr>
+            <a:noAutofit/>
+          </a:bodyPr>
+          <a:lstStyle/>
+          <a:p>
+            <a:r>
+              <a:rPr lang="ru-RU" sz="2400" i="1" smtClean="0">
+                <a:solidFill>
+                  <a:srgbClr val="FFFF00"/>
+                </a:solidFill>
+              </a:rPr>
+              <a:t>Объектно-ориентированное конструирование программных систем</a:t>
+            </a:r>
+            <a:r>
+              <a:rPr lang="en-US" sz="2400" i="1" smtClean="0">
+                <a:solidFill>
+                  <a:srgbClr val="FFFF00"/>
+                </a:solidFill>
+              </a:rPr>
+              <a:t/>
+            </a:r>
+            <a:br>
+              <a:rPr lang="en-US" sz="2400" i="1" smtClean="0">
+                <a:solidFill>
+                  <a:srgbClr val="FFFF00"/>
+                </a:solidFill>
+              </a:rPr>
+            </a:br>
+            <a:r>
+              <a:rPr lang="ru-RU" sz="2400" smtClean="0"/>
+              <a:t>Бертран Мейер</a:t>
+            </a:r>
+            <a:endParaRPr lang="ru-RU" sz="2400" dirty="0"/>
+          </a:p>
+        </p:txBody>
+      </p:sp>
+      <p:sp>
+        <p:nvSpPr>
+          <p:cNvPr id="3" name="Content Placeholder 2"/>
+          <p:cNvSpPr>
+            <a:spLocks noGrp="1"/>
+          </p:cNvSpPr>
+          <p:nvPr>
+            <p:ph idx="1"/>
+          </p:nvPr>
+        </p:nvSpPr>
+        <p:spPr>
+          <a:xfrm>
+            <a:off x="3131840" y="1600200"/>
+            <a:ext cx="5554960" cy="4525963"/>
+          </a:xfrm>
+        </p:spPr>
+        <p:txBody>
+          <a:bodyPr anchor="t" anchorCtr="0">
+            <a:normAutofit/>
+          </a:bodyPr>
+          <a:lstStyle/>
+          <a:p>
+            <a:pPr marL="0" indent="0">
+              <a:buNone/>
+            </a:pPr>
+            <a:r>
+              <a:rPr lang="ru-RU" sz="2000" dirty="0" smtClean="0"/>
+              <a:t>Книга посвящена обоснованию и технологии применения объектного подхода при разработке программных систем. Основное внимание уделяется вопросам качества, повторного использования и расширяемости проектируемых систем. </a:t>
+            </a:r>
+            <a:br>
+              <a:rPr lang="ru-RU" sz="2000" dirty="0" smtClean="0"/>
+            </a:br>
+            <a:r>
+              <a:rPr lang="ru-RU" sz="2000" dirty="0" smtClean="0"/>
+              <a:t/>
+            </a:r>
+            <a:br>
+              <a:rPr lang="ru-RU" sz="2000" dirty="0" smtClean="0"/>
+            </a:br>
+            <a:r>
+              <a:rPr lang="ru-RU" sz="2000" dirty="0" smtClean="0"/>
+              <a:t>Рассматриваемый объектный подход охватывает весь жизненный цикл разработки - анализ, проектирование, программирование и сопровождение.</a:t>
+            </a:r>
+            <a:endParaRPr lang="en-US" sz="2000" dirty="0" smtClean="0"/>
+          </a:p>
+          <a:p>
+            <a:pPr marL="0" indent="0">
+              <a:buNone/>
+            </a:pPr>
+            <a:endParaRPr lang="en-US" sz="2000" dirty="0" smtClean="0"/>
+          </a:p>
+          <a:p>
+            <a:pPr marL="0" indent="0">
+              <a:buNone/>
+            </a:pPr>
+            <a:r>
+              <a:rPr lang="en-US" sz="2000" dirty="0" smtClean="0"/>
+              <a:t>http://www.ozon.ru/context/detail/id/2336754/</a:t>
+            </a:r>
+            <a:endParaRPr lang="ru-RU" sz="2000" dirty="0"/>
+          </a:p>
+        </p:txBody>
+      </p:sp>
+      <p:pic>
+        <p:nvPicPr>
+          <p:cNvPr id="5" name="Picture 4"/>
+          <p:cNvPicPr>
+            <a:picLocks noChangeAspect="1"/>
+          </p:cNvPicPr>
+          <p:nvPr/>
+        </p:nvPicPr>
+        <p:blipFill>
+          <a:blip r:embed="rId2">
+            <a:extLst>
+              <a:ext uri="{28A0092B-C50C-407E-A947-70E740481C1C}">
+                <a14:useLocalDpi xmlns:a14="http://schemas.microsoft.com/office/drawing/2010/main" val="0"/>
+              </a:ext>
+            </a:extLst>
+          </a:blip>
+          <a:stretch>
+            <a:fillRect/>
+          </a:stretch>
+        </p:blipFill>
+        <p:spPr>
+          <a:xfrm>
+            <a:off x="467544" y="1574800"/>
+            <a:ext cx="2540000" cy="3708400"/>
+          </a:xfrm>
+          <a:prstGeom prst="rect">
+            <a:avLst/>
+          </a:prstGeom>
+        </p:spPr>
+      </p:pic>
+    </p:spTree>
+    <p:extLst>
+      <p:ext uri="{BB962C8B-B14F-4D97-AF65-F5344CB8AC3E}">
+        <p14:creationId xmlns:p14="http://schemas.microsoft.com/office/powerpoint/2010/main" val="3884244200"/>
+      </p:ext>
+    </p:extLst>
+  </p:cSld>
+  <p:clrMapOvr>
+    <a:masterClrMapping/>
+  </p:clrMapOvr>
+  <mc:AlternateContent xmlns:mc="http://schemas.openxmlformats.org/markup-compatibility/2006" xmlns:p14="http://schemas.microsoft.com/office/powerpoint/2010/main">
+    <mc:Choice Requires="p14">
+      <p:transition spd="slow" p14:dur="2000"/>
+    </mc:Choice>
+    <mc:Fallback xmlns="">
+      <p:transition spd="slow"/>
+    </mc:Fallback>
+  </mc:AlternateContent>
+  <p:timing>
+    <p:tnLst>
+      <p:par>
+        <p:cTn id="1" dur="indefinite" restart="never" nodeType="tmRoot"/>
+      </p:par>
+    </p:tnLst>
+  </p:timing>
+</p:sld>
+</file>
+
+<file path=ppt/slides/slide12.xml><?xml version="1.0" encoding="utf-8"?>
 <p:sld xmlns:a="http://schemas.openxmlformats.org/drawingml/2006/main" xmlns:r="http://schemas.openxmlformats.org/officeDocument/2006/relationships" xmlns:p="http://schemas.openxmlformats.org/presentationml/2006/main" show="0">
   <p:cSld>
     <p:spTree>
@@ -3749,7 +4193,7 @@
 </p:sld>
 </file>
 
-<file path=ppt/slides/slide11.xml><?xml version="1.0" encoding="utf-8"?>
+<file path=ppt/slides/slide13.xml><?xml version="1.0" encoding="utf-8"?>
 <p:sld xmlns:a="http://schemas.openxmlformats.org/drawingml/2006/main" xmlns:r="http://schemas.openxmlformats.org/officeDocument/2006/relationships" xmlns:p="http://schemas.openxmlformats.org/presentationml/2006/main">
   <p:cSld>
     <p:spTree>
@@ -3948,7 +4392,7 @@
 </p:sld>
 </file>
 
-<file path=ppt/slides/slide12.xml><?xml version="1.0" encoding="utf-8"?>
+<file path=ppt/slides/slide14.xml><?xml version="1.0" encoding="utf-8"?>
 <p:sld xmlns:a="http://schemas.openxmlformats.org/drawingml/2006/main" xmlns:r="http://schemas.openxmlformats.org/officeDocument/2006/relationships" xmlns:p="http://schemas.openxmlformats.org/presentationml/2006/main">
   <p:cSld>
     <p:spTree>
@@ -4013,7 +4457,7 @@
 </p:sld>
 </file>
 
-<file path=ppt/slides/slide13.xml><?xml version="1.0" encoding="utf-8"?>
+<file path=ppt/slides/slide15.xml><?xml version="1.0" encoding="utf-8"?>
 <p:sld xmlns:a="http://schemas.openxmlformats.org/drawingml/2006/main" xmlns:r="http://schemas.openxmlformats.org/officeDocument/2006/relationships" xmlns:p="http://schemas.openxmlformats.org/presentationml/2006/main">
   <p:cSld>
     <p:spTree>
@@ -4302,7 +4746,7 @@
 </p:sld>
 </file>
 
-<file path=ppt/slides/slide14.xml><?xml version="1.0" encoding="utf-8"?>
+<file path=ppt/slides/slide16.xml><?xml version="1.0" encoding="utf-8"?>
 <p:sld xmlns:a="http://schemas.openxmlformats.org/drawingml/2006/main" xmlns:r="http://schemas.openxmlformats.org/officeDocument/2006/relationships" xmlns:p="http://schemas.openxmlformats.org/presentationml/2006/main">
   <p:cSld>
     <p:spTree>
@@ -4538,7 +4982,586 @@
 </p:sld>
 </file>
 
-<file path=ppt/slides/slide15.xml><?xml version="1.0" encoding="utf-8"?>
+<file path=ppt/slides/slide17.xml><?xml version="1.0" encoding="utf-8"?>
+<p:sld xmlns:a="http://schemas.openxmlformats.org/drawingml/2006/main" xmlns:r="http://schemas.openxmlformats.org/officeDocument/2006/relationships" xmlns:p="http://schemas.openxmlformats.org/presentationml/2006/main">
+  <p:cSld>
+    <p:spTree>
+      <p:nvGrpSpPr>
+        <p:cNvPr id="1" name=""/>
+        <p:cNvGrpSpPr/>
+        <p:nvPr/>
+      </p:nvGrpSpPr>
+      <p:grpSpPr>
+        <a:xfrm>
+          <a:off x="0" y="0"/>
+          <a:ext cx="0" cy="0"/>
+          <a:chOff x="0" y="0"/>
+          <a:chExt cx="0" cy="0"/>
+        </a:xfrm>
+      </p:grpSpPr>
+      <p:sp>
+        <p:nvSpPr>
+          <p:cNvPr id="2" name="Title 1"/>
+          <p:cNvSpPr>
+            <a:spLocks noGrp="1"/>
+          </p:cNvSpPr>
+          <p:nvPr>
+            <p:ph type="title"/>
+          </p:nvPr>
+        </p:nvSpPr>
+        <p:spPr>
+          <a:xfrm>
+            <a:off x="457200" y="2857500"/>
+            <a:ext cx="8229600" cy="1143000"/>
+          </a:xfrm>
+        </p:spPr>
+        <p:txBody>
+          <a:bodyPr/>
+          <a:lstStyle/>
+          <a:p>
+            <a:r>
+              <a:rPr lang="en-US" dirty="0" smtClean="0"/>
+              <a:t>ADO.NET / </a:t>
+            </a:r>
+            <a:r>
+              <a:rPr lang="en-US" dirty="0" err="1" smtClean="0"/>
+              <a:t>EntityFramework</a:t>
+            </a:r>
+            <a:endParaRPr lang="ru-RU" dirty="0"/>
+          </a:p>
+        </p:txBody>
+      </p:sp>
+    </p:spTree>
+    <p:extLst>
+      <p:ext uri="{BB962C8B-B14F-4D97-AF65-F5344CB8AC3E}">
+        <p14:creationId xmlns:p14="http://schemas.microsoft.com/office/powerpoint/2010/main" val="2493670811"/>
+      </p:ext>
+    </p:extLst>
+  </p:cSld>
+  <p:clrMapOvr>
+    <a:masterClrMapping/>
+  </p:clrMapOvr>
+  <mc:AlternateContent xmlns:mc="http://schemas.openxmlformats.org/markup-compatibility/2006">
+    <mc:Choice xmlns:p14="http://schemas.microsoft.com/office/powerpoint/2010/main" Requires="p14">
+      <p:transition spd="slow" p14:dur="2000"/>
+    </mc:Choice>
+    <mc:Fallback>
+      <p:transition spd="slow"/>
+    </mc:Fallback>
+  </mc:AlternateContent>
+  <p:timing>
+    <p:tnLst>
+      <p:par>
+        <p:cTn id="1" dur="indefinite" restart="never" nodeType="tmRoot"/>
+      </p:par>
+    </p:tnLst>
+  </p:timing>
+</p:sld>
+</file>
+
+<file path=ppt/slides/slide18.xml><?xml version="1.0" encoding="utf-8"?>
+<p:sld xmlns:a="http://schemas.openxmlformats.org/drawingml/2006/main" xmlns:r="http://schemas.openxmlformats.org/officeDocument/2006/relationships" xmlns:p="http://schemas.openxmlformats.org/presentationml/2006/main">
+  <p:cSld>
+    <p:spTree>
+      <p:nvGrpSpPr>
+        <p:cNvPr id="1" name=""/>
+        <p:cNvGrpSpPr/>
+        <p:nvPr/>
+      </p:nvGrpSpPr>
+      <p:grpSpPr>
+        <a:xfrm>
+          <a:off x="0" y="0"/>
+          <a:ext cx="0" cy="0"/>
+          <a:chOff x="0" y="0"/>
+          <a:chExt cx="0" cy="0"/>
+        </a:xfrm>
+      </p:grpSpPr>
+      <p:sp>
+        <p:nvSpPr>
+          <p:cNvPr id="2" name="Title 1"/>
+          <p:cNvSpPr>
+            <a:spLocks noGrp="1"/>
+          </p:cNvSpPr>
+          <p:nvPr>
+            <p:ph type="title"/>
+          </p:nvPr>
+        </p:nvSpPr>
+        <p:spPr>
+          <a:noFill/>
+          <a:ln>
+            <a:solidFill>
+              <a:schemeClr val="tx1"/>
+            </a:solidFill>
+          </a:ln>
+        </p:spPr>
+        <p:txBody>
+          <a:bodyPr>
+            <a:noAutofit/>
+          </a:bodyPr>
+          <a:lstStyle/>
+          <a:p>
+            <a:r>
+              <a:rPr lang="en-US" sz="2400" i="1" dirty="0">
+                <a:solidFill>
+                  <a:srgbClr val="FFFF00"/>
+                </a:solidFill>
+              </a:rPr>
+              <a:t>Programming Entity Framework: DbContext: Querying, Changing, and Validating Your Data with Entity </a:t>
+            </a:r>
+            <a:r>
+              <a:rPr lang="en-US" sz="2400" i="1" dirty="0" smtClean="0">
+                <a:solidFill>
+                  <a:srgbClr val="FFFF00"/>
+                </a:solidFill>
+              </a:rPr>
+              <a:t>Framework</a:t>
+            </a:r>
+            <a:r>
+              <a:rPr lang="en-US" sz="2400" dirty="0" smtClean="0"/>
+              <a:t/>
+            </a:r>
+            <a:br>
+              <a:rPr lang="en-US" sz="2400" dirty="0" smtClean="0"/>
+            </a:br>
+            <a:r>
+              <a:rPr lang="en-US" sz="2400" dirty="0"/>
+              <a:t>Julia Lerman, Rowan Miller</a:t>
+            </a:r>
+            <a:endParaRPr lang="ru-RU" sz="2400" dirty="0"/>
+          </a:p>
+        </p:txBody>
+      </p:sp>
+      <p:sp>
+        <p:nvSpPr>
+          <p:cNvPr id="3" name="Content Placeholder 2"/>
+          <p:cNvSpPr>
+            <a:spLocks noGrp="1"/>
+          </p:cNvSpPr>
+          <p:nvPr>
+            <p:ph idx="1"/>
+          </p:nvPr>
+        </p:nvSpPr>
+        <p:spPr>
+          <a:xfrm>
+            <a:off x="3131840" y="1568450"/>
+            <a:ext cx="5554960" cy="4525963"/>
+          </a:xfrm>
+        </p:spPr>
+        <p:txBody>
+          <a:bodyPr anchor="t" anchorCtr="0">
+            <a:normAutofit/>
+          </a:bodyPr>
+          <a:lstStyle/>
+          <a:p>
+            <a:pPr marL="0" indent="0">
+              <a:buNone/>
+            </a:pPr>
+            <a:r>
+              <a:rPr lang="en-US" sz="2800" dirty="0" smtClean="0"/>
+              <a:t>DbContext</a:t>
+            </a:r>
+            <a:endParaRPr lang="ru-RU" sz="2800" dirty="0"/>
+          </a:p>
+        </p:txBody>
+      </p:sp>
+      <p:pic>
+        <p:nvPicPr>
+          <p:cNvPr id="5" name="Picture 4"/>
+          <p:cNvPicPr>
+            <a:picLocks noChangeAspect="1"/>
+          </p:cNvPicPr>
+          <p:nvPr/>
+        </p:nvPicPr>
+        <p:blipFill>
+          <a:blip r:embed="rId2"/>
+          <a:stretch>
+            <a:fillRect/>
+          </a:stretch>
+        </p:blipFill>
+        <p:spPr>
+          <a:xfrm>
+            <a:off x="480618" y="1568452"/>
+            <a:ext cx="2540000" cy="3326667"/>
+          </a:xfrm>
+          <a:prstGeom prst="rect">
+            <a:avLst/>
+          </a:prstGeom>
+        </p:spPr>
+      </p:pic>
+    </p:spTree>
+    <p:extLst>
+      <p:ext uri="{BB962C8B-B14F-4D97-AF65-F5344CB8AC3E}">
+        <p14:creationId xmlns:p14="http://schemas.microsoft.com/office/powerpoint/2010/main" val="315945106"/>
+      </p:ext>
+    </p:extLst>
+  </p:cSld>
+  <p:clrMapOvr>
+    <a:masterClrMapping/>
+  </p:clrMapOvr>
+  <p:timing>
+    <p:tnLst>
+      <p:par>
+        <p:cTn id="1" dur="indefinite" restart="never" nodeType="tmRoot"/>
+      </p:par>
+    </p:tnLst>
+  </p:timing>
+</p:sld>
+</file>
+
+<file path=ppt/slides/slide19.xml><?xml version="1.0" encoding="utf-8"?>
+<p:sld xmlns:a="http://schemas.openxmlformats.org/drawingml/2006/main" xmlns:r="http://schemas.openxmlformats.org/officeDocument/2006/relationships" xmlns:p="http://schemas.openxmlformats.org/presentationml/2006/main">
+  <p:cSld>
+    <p:spTree>
+      <p:nvGrpSpPr>
+        <p:cNvPr id="1" name=""/>
+        <p:cNvGrpSpPr/>
+        <p:nvPr/>
+      </p:nvGrpSpPr>
+      <p:grpSpPr>
+        <a:xfrm>
+          <a:off x="0" y="0"/>
+          <a:ext cx="0" cy="0"/>
+          <a:chOff x="0" y="0"/>
+          <a:chExt cx="0" cy="0"/>
+        </a:xfrm>
+      </p:grpSpPr>
+      <p:sp>
+        <p:nvSpPr>
+          <p:cNvPr id="2" name="Title 1"/>
+          <p:cNvSpPr>
+            <a:spLocks noGrp="1"/>
+          </p:cNvSpPr>
+          <p:nvPr>
+            <p:ph type="title"/>
+          </p:nvPr>
+        </p:nvSpPr>
+        <p:spPr>
+          <a:noFill/>
+          <a:ln>
+            <a:solidFill>
+              <a:schemeClr val="tx1"/>
+            </a:solidFill>
+          </a:ln>
+        </p:spPr>
+        <p:txBody>
+          <a:bodyPr>
+            <a:noAutofit/>
+          </a:bodyPr>
+          <a:lstStyle/>
+          <a:p>
+            <a:r>
+              <a:rPr lang="en-US" sz="2400" i="1" dirty="0">
+                <a:solidFill>
+                  <a:srgbClr val="FFFF00"/>
+                </a:solidFill>
+              </a:rPr>
+              <a:t>Programming Entity Framework: Code First: Creating and Configuring Data Models from Your Classes</a:t>
+            </a:r>
+            <a:r>
+              <a:rPr lang="en-US" sz="2400" dirty="0" smtClean="0"/>
+              <a:t/>
+            </a:r>
+            <a:br>
+              <a:rPr lang="en-US" sz="2400" dirty="0" smtClean="0"/>
+            </a:br>
+            <a:r>
+              <a:rPr lang="en-US" sz="2400" dirty="0"/>
+              <a:t>Julia Lerman, Rowan Miller</a:t>
+            </a:r>
+            <a:endParaRPr lang="ru-RU" sz="2400" dirty="0"/>
+          </a:p>
+        </p:txBody>
+      </p:sp>
+      <p:sp>
+        <p:nvSpPr>
+          <p:cNvPr id="3" name="Content Placeholder 2"/>
+          <p:cNvSpPr>
+            <a:spLocks noGrp="1"/>
+          </p:cNvSpPr>
+          <p:nvPr>
+            <p:ph idx="1"/>
+          </p:nvPr>
+        </p:nvSpPr>
+        <p:spPr>
+          <a:xfrm>
+            <a:off x="3131840" y="1568450"/>
+            <a:ext cx="5554960" cy="4525963"/>
+          </a:xfrm>
+        </p:spPr>
+        <p:txBody>
+          <a:bodyPr anchor="t" anchorCtr="0">
+            <a:normAutofit/>
+          </a:bodyPr>
+          <a:lstStyle/>
+          <a:p>
+            <a:pPr marL="0" indent="0">
+              <a:buNone/>
+            </a:pPr>
+            <a:r>
+              <a:rPr lang="en-US" sz="2800" dirty="0" smtClean="0"/>
+              <a:t>CodeFirst</a:t>
+            </a:r>
+            <a:endParaRPr lang="ru-RU" sz="2800" dirty="0"/>
+          </a:p>
+        </p:txBody>
+      </p:sp>
+      <p:pic>
+        <p:nvPicPr>
+          <p:cNvPr id="4" name="Picture 3"/>
+          <p:cNvPicPr>
+            <a:picLocks noChangeAspect="1"/>
+          </p:cNvPicPr>
+          <p:nvPr/>
+        </p:nvPicPr>
+        <p:blipFill>
+          <a:blip r:embed="rId2"/>
+          <a:stretch>
+            <a:fillRect/>
+          </a:stretch>
+        </p:blipFill>
+        <p:spPr>
+          <a:xfrm>
+            <a:off x="467544" y="1577085"/>
+            <a:ext cx="2593333" cy="3326667"/>
+          </a:xfrm>
+          <a:prstGeom prst="rect">
+            <a:avLst/>
+          </a:prstGeom>
+        </p:spPr>
+      </p:pic>
+    </p:spTree>
+    <p:extLst>
+      <p:ext uri="{BB962C8B-B14F-4D97-AF65-F5344CB8AC3E}">
+        <p14:creationId xmlns:p14="http://schemas.microsoft.com/office/powerpoint/2010/main" val="237427012"/>
+      </p:ext>
+    </p:extLst>
+  </p:cSld>
+  <p:clrMapOvr>
+    <a:masterClrMapping/>
+  </p:clrMapOvr>
+  <p:timing>
+    <p:tnLst>
+      <p:par>
+        <p:cTn id="1" dur="indefinite" restart="never" nodeType="tmRoot"/>
+      </p:par>
+    </p:tnLst>
+  </p:timing>
+</p:sld>
+</file>
+
+<file path=ppt/slides/slide2.xml><?xml version="1.0" encoding="utf-8"?>
+<p:sld xmlns:a="http://schemas.openxmlformats.org/drawingml/2006/main" xmlns:r="http://schemas.openxmlformats.org/officeDocument/2006/relationships" xmlns:p="http://schemas.openxmlformats.org/presentationml/2006/main">
+  <p:cSld>
+    <p:spTree>
+      <p:nvGrpSpPr>
+        <p:cNvPr id="1" name=""/>
+        <p:cNvGrpSpPr/>
+        <p:nvPr/>
+      </p:nvGrpSpPr>
+      <p:grpSpPr>
+        <a:xfrm>
+          <a:off x="0" y="0"/>
+          <a:ext cx="0" cy="0"/>
+          <a:chOff x="0" y="0"/>
+          <a:chExt cx="0" cy="0"/>
+        </a:xfrm>
+      </p:grpSpPr>
+      <p:sp>
+        <p:nvSpPr>
+          <p:cNvPr id="2" name="Title 1"/>
+          <p:cNvSpPr>
+            <a:spLocks noGrp="1"/>
+          </p:cNvSpPr>
+          <p:nvPr>
+            <p:ph type="title"/>
+          </p:nvPr>
+        </p:nvSpPr>
+        <p:spPr>
+          <a:xfrm>
+            <a:off x="457200" y="2459174"/>
+            <a:ext cx="8229600" cy="1939652"/>
+          </a:xfrm>
+        </p:spPr>
+        <p:txBody>
+          <a:bodyPr>
+            <a:normAutofit/>
+          </a:bodyPr>
+          <a:lstStyle/>
+          <a:p>
+            <a:r>
+              <a:rPr lang="ru-RU" dirty="0" smtClean="0"/>
+              <a:t>Для начинающих</a:t>
+            </a:r>
+            <a:endParaRPr lang="ru-RU" dirty="0"/>
+          </a:p>
+        </p:txBody>
+      </p:sp>
+    </p:spTree>
+    <p:extLst>
+      <p:ext uri="{BB962C8B-B14F-4D97-AF65-F5344CB8AC3E}">
+        <p14:creationId xmlns:p14="http://schemas.microsoft.com/office/powerpoint/2010/main" val="1698115381"/>
+      </p:ext>
+    </p:extLst>
+  </p:cSld>
+  <p:clrMapOvr>
+    <a:masterClrMapping/>
+  </p:clrMapOvr>
+  <p:timing>
+    <p:tnLst>
+      <p:par>
+        <p:cTn id="1" dur="indefinite" restart="never" nodeType="tmRoot"/>
+      </p:par>
+    </p:tnLst>
+  </p:timing>
+</p:sld>
+</file>
+
+<file path=ppt/slides/slide20.xml><?xml version="1.0" encoding="utf-8"?>
+<p:sld xmlns:a="http://schemas.openxmlformats.org/drawingml/2006/main" xmlns:r="http://schemas.openxmlformats.org/officeDocument/2006/relationships" xmlns:p="http://schemas.openxmlformats.org/presentationml/2006/main">
+  <p:cSld>
+    <p:spTree>
+      <p:nvGrpSpPr>
+        <p:cNvPr id="1" name=""/>
+        <p:cNvGrpSpPr/>
+        <p:nvPr/>
+      </p:nvGrpSpPr>
+      <p:grpSpPr>
+        <a:xfrm>
+          <a:off x="0" y="0"/>
+          <a:ext cx="0" cy="0"/>
+          <a:chOff x="0" y="0"/>
+          <a:chExt cx="0" cy="0"/>
+        </a:xfrm>
+      </p:grpSpPr>
+      <p:pic>
+        <p:nvPicPr>
+          <p:cNvPr id="5" name="Picture 4"/>
+          <p:cNvPicPr>
+            <a:picLocks noChangeAspect="1"/>
+          </p:cNvPicPr>
+          <p:nvPr/>
+        </p:nvPicPr>
+        <p:blipFill>
+          <a:blip r:embed="rId2"/>
+          <a:stretch>
+            <a:fillRect/>
+          </a:stretch>
+        </p:blipFill>
+        <p:spPr>
+          <a:xfrm>
+            <a:off x="467548" y="1564509"/>
+            <a:ext cx="2540000" cy="3326667"/>
+          </a:xfrm>
+          <a:prstGeom prst="rect">
+            <a:avLst/>
+          </a:prstGeom>
+        </p:spPr>
+      </p:pic>
+      <p:sp>
+        <p:nvSpPr>
+          <p:cNvPr id="2" name="Title 1"/>
+          <p:cNvSpPr>
+            <a:spLocks noGrp="1"/>
+          </p:cNvSpPr>
+          <p:nvPr>
+            <p:ph type="title"/>
+          </p:nvPr>
+        </p:nvSpPr>
+        <p:spPr>
+          <a:noFill/>
+          <a:ln>
+            <a:solidFill>
+              <a:schemeClr val="tx1"/>
+            </a:solidFill>
+          </a:ln>
+        </p:spPr>
+        <p:txBody>
+          <a:bodyPr>
+            <a:noAutofit/>
+          </a:bodyPr>
+          <a:lstStyle/>
+          <a:p>
+            <a:r>
+              <a:rPr lang="en-US" sz="2400" i="1" dirty="0">
+                <a:solidFill>
+                  <a:srgbClr val="FFFF00"/>
+                </a:solidFill>
+              </a:rPr>
+              <a:t>Programming Entity Framework: Building Data Centric Apps with the ADO.NET Entity Framework</a:t>
+            </a:r>
+            <a:r>
+              <a:rPr lang="en-US" sz="2400" dirty="0" smtClean="0"/>
+              <a:t/>
+            </a:r>
+            <a:br>
+              <a:rPr lang="en-US" sz="2400" dirty="0" smtClean="0"/>
+            </a:br>
+            <a:r>
+              <a:rPr lang="en-US" sz="2400" dirty="0"/>
+              <a:t>Julia </a:t>
+            </a:r>
+            <a:r>
+              <a:rPr lang="en-US" sz="2400" dirty="0" smtClean="0"/>
+              <a:t>Lerman</a:t>
+            </a:r>
+            <a:endParaRPr lang="ru-RU" sz="2400" dirty="0"/>
+          </a:p>
+        </p:txBody>
+      </p:sp>
+      <p:sp>
+        <p:nvSpPr>
+          <p:cNvPr id="3" name="Content Placeholder 2"/>
+          <p:cNvSpPr>
+            <a:spLocks noGrp="1"/>
+          </p:cNvSpPr>
+          <p:nvPr>
+            <p:ph idx="1"/>
+          </p:nvPr>
+        </p:nvSpPr>
+        <p:spPr>
+          <a:xfrm>
+            <a:off x="3131840" y="1568450"/>
+            <a:ext cx="5554960" cy="4525963"/>
+          </a:xfrm>
+        </p:spPr>
+        <p:txBody>
+          <a:bodyPr anchor="t" anchorCtr="0">
+            <a:normAutofit/>
+          </a:bodyPr>
+          <a:lstStyle/>
+          <a:p>
+            <a:pPr marL="0" indent="0">
+              <a:buNone/>
+            </a:pPr>
+            <a:r>
+              <a:rPr lang="en-US" sz="2800" dirty="0" smtClean="0"/>
+              <a:t>EF</a:t>
+            </a:r>
+            <a:endParaRPr lang="ru-RU" sz="2800" dirty="0"/>
+          </a:p>
+        </p:txBody>
+      </p:sp>
+    </p:spTree>
+    <p:extLst>
+      <p:ext uri="{BB962C8B-B14F-4D97-AF65-F5344CB8AC3E}">
+        <p14:creationId xmlns:p14="http://schemas.microsoft.com/office/powerpoint/2010/main" val="1697424397"/>
+      </p:ext>
+    </p:extLst>
+  </p:cSld>
+  <p:clrMapOvr>
+    <a:masterClrMapping/>
+  </p:clrMapOvr>
+  <p:timing>
+    <p:tnLst>
+      <p:par>
+        <p:cTn id="1" dur="indefinite" restart="never" nodeType="tmRoot"/>
+      </p:par>
+    </p:tnLst>
+  </p:timing>
+</p:sld>
+</file>
+
+<file path=ppt/slides/slide21.xml><?xml version="1.0" encoding="utf-8"?>
 <p:sld xmlns:a="http://schemas.openxmlformats.org/drawingml/2006/main" xmlns:r="http://schemas.openxmlformats.org/officeDocument/2006/relationships" xmlns:p="http://schemas.openxmlformats.org/presentationml/2006/main" show="0">
   <p:cSld>
     <p:spTree>
@@ -4565,197 +5588,43 @@
             <p:ph type="title"/>
           </p:nvPr>
         </p:nvSpPr>
-        <p:spPr>
-          <a:xfrm>
-            <a:off x="457200" y="2857500"/>
-            <a:ext cx="8229600" cy="1143000"/>
-          </a:xfrm>
-        </p:spPr>
+        <p:spPr/>
         <p:txBody>
           <a:bodyPr/>
           <a:lstStyle/>
           <a:p>
             <a:r>
               <a:rPr lang="en-US" dirty="0" smtClean="0"/>
-              <a:t>ADO.NET / </a:t>
-            </a:r>
-            <a:r>
-              <a:rPr lang="en-US" dirty="0" err="1" smtClean="0"/>
-              <a:t>EntityFramework</a:t>
+              <a:t>Review</a:t>
             </a:r>
             <a:endParaRPr lang="ru-RU" dirty="0"/>
           </a:p>
         </p:txBody>
       </p:sp>
-    </p:spTree>
-    <p:extLst>
-      <p:ext uri="{BB962C8B-B14F-4D97-AF65-F5344CB8AC3E}">
-        <p14:creationId xmlns:p14="http://schemas.microsoft.com/office/powerpoint/2010/main" val="2493670811"/>
-      </p:ext>
-    </p:extLst>
-  </p:cSld>
-  <p:clrMapOvr>
-    <a:masterClrMapping/>
-  </p:clrMapOvr>
-  <mc:AlternateContent xmlns:mc="http://schemas.openxmlformats.org/markup-compatibility/2006" xmlns:p14="http://schemas.microsoft.com/office/powerpoint/2010/main">
-    <mc:Choice Requires="p14">
-      <p:transition spd="slow" p14:dur="2000"/>
-    </mc:Choice>
-    <mc:Fallback xmlns="">
-      <p:transition spd="slow"/>
-    </mc:Fallback>
-  </mc:AlternateContent>
-  <p:timing>
-    <p:tnLst>
-      <p:par>
-        <p:cTn id="1" dur="indefinite" restart="never" nodeType="tmRoot"/>
-      </p:par>
-    </p:tnLst>
-  </p:timing>
-</p:sld>
-</file>
-
-<file path=ppt/slides/slide16.xml><?xml version="1.0" encoding="utf-8"?>
-<p:sld xmlns:a="http://schemas.openxmlformats.org/drawingml/2006/main" xmlns:r="http://schemas.openxmlformats.org/officeDocument/2006/relationships" xmlns:p="http://schemas.openxmlformats.org/presentationml/2006/main" show="0">
-  <p:cSld>
-    <p:spTree>
-      <p:nvGrpSpPr>
-        <p:cNvPr id="1" name=""/>
-        <p:cNvGrpSpPr/>
-        <p:nvPr/>
-      </p:nvGrpSpPr>
-      <p:grpSpPr>
-        <a:xfrm>
-          <a:off x="0" y="0"/>
-          <a:ext cx="0" cy="0"/>
-          <a:chOff x="0" y="0"/>
-          <a:chExt cx="0" cy="0"/>
-        </a:xfrm>
-      </p:grpSpPr>
-      <p:sp>
-        <p:nvSpPr>
-          <p:cNvPr id="2" name="Title 1"/>
+      <p:sp>
+        <p:nvSpPr>
+          <p:cNvPr id="3" name="Content Placeholder 2"/>
           <p:cNvSpPr>
             <a:spLocks noGrp="1"/>
           </p:cNvSpPr>
           <p:nvPr>
-            <p:ph type="title"/>
+            <p:ph idx="1"/>
           </p:nvPr>
         </p:nvSpPr>
         <p:spPr/>
         <p:txBody>
-          <a:bodyPr/>
-          <a:lstStyle/>
-          <a:p>
-            <a:r>
-              <a:rPr lang="en-US" dirty="0" smtClean="0"/>
-              <a:t>Review</a:t>
-            </a:r>
-            <a:endParaRPr lang="ru-RU" dirty="0"/>
-          </a:p>
-        </p:txBody>
-      </p:sp>
-      <p:sp>
-        <p:nvSpPr>
-          <p:cNvPr id="3" name="Content Placeholder 2"/>
-          <p:cNvSpPr>
-            <a:spLocks noGrp="1"/>
-          </p:cNvSpPr>
-          <p:nvPr>
-            <p:ph idx="1"/>
-          </p:nvPr>
-        </p:nvSpPr>
-        <p:spPr/>
-        <p:txBody>
           <a:bodyPr>
-            <a:normAutofit fontScale="92500"/>
+            <a:normAutofit/>
           </a:bodyPr>
           <a:lstStyle/>
           <a:p>
             <a:r>
+              <a:rPr lang="en-US" dirty="0" smtClean="0"/>
+              <a:t>Entity </a:t>
+            </a:r>
+            <a:r>
               <a:rPr lang="en-US" dirty="0"/>
-              <a:t>Programming Entity Framework: </a:t>
-            </a:r>
-            <a:r>
-              <a:rPr lang="en-US" dirty="0" err="1" smtClean="0"/>
-              <a:t>DbContext</a:t>
-            </a:r>
-            <a:r>
-              <a:rPr lang="en-US" dirty="0"/>
-              <a:t/>
-            </a:r>
-            <a:br>
-              <a:rPr lang="en-US" dirty="0"/>
-            </a:br>
-            <a:r>
-              <a:rPr lang="en-US" dirty="0" smtClean="0"/>
-              <a:t>Julia </a:t>
-            </a:r>
-            <a:r>
-              <a:rPr lang="en-US" dirty="0" err="1" smtClean="0"/>
-              <a:t>Lerman</a:t>
-            </a:r>
-            <a:r>
-              <a:rPr lang="en-US" dirty="0" smtClean="0"/>
-              <a:t>, </a:t>
-            </a:r>
-            <a:r>
-              <a:rPr lang="en-US" dirty="0"/>
-              <a:t>Rowan </a:t>
-            </a:r>
-            <a:r>
-              <a:rPr lang="en-US" dirty="0" smtClean="0"/>
-              <a:t>Miller</a:t>
-            </a:r>
-          </a:p>
-          <a:p>
-            <a:r>
-              <a:rPr lang="en-US" dirty="0"/>
-              <a:t>Programming Entity Framework: Code First</a:t>
-            </a:r>
-            <a:br>
-              <a:rPr lang="en-US" dirty="0"/>
-            </a:br>
-            <a:r>
-              <a:rPr lang="en-US" dirty="0"/>
-              <a:t>Julia </a:t>
-            </a:r>
-            <a:r>
-              <a:rPr lang="en-US" dirty="0" err="1"/>
-              <a:t>Lerman</a:t>
-            </a:r>
-            <a:r>
-              <a:rPr lang="en-US" dirty="0"/>
-              <a:t>, Rowan Miller</a:t>
-            </a:r>
-            <a:br>
-              <a:rPr lang="en-US" dirty="0"/>
-            </a:br>
-            <a:r>
-              <a:rPr lang="en-US" dirty="0"/>
-              <a:t>Programming Entity Framework: Building Data Centric Apps with the ADO.NET Entity </a:t>
-            </a:r>
-            <a:r>
-              <a:rPr lang="en-US" dirty="0" smtClean="0"/>
-              <a:t>Framework</a:t>
-            </a:r>
-            <a:br>
-              <a:rPr lang="en-US" dirty="0" smtClean="0"/>
-            </a:br>
-            <a:r>
-              <a:rPr lang="en-US" dirty="0"/>
-              <a:t>Julia </a:t>
-            </a:r>
-            <a:r>
-              <a:rPr lang="en-US" dirty="0" err="1" smtClean="0"/>
-              <a:t>Lerman</a:t>
-            </a:r>
-            <a:endParaRPr lang="en-US" dirty="0" smtClean="0"/>
-          </a:p>
-          <a:p>
-            <a:r>
-              <a:rPr lang="en-US" dirty="0"/>
-              <a:t>Entity Framework 6 </a:t>
+              <a:t>Framework 6 </a:t>
             </a:r>
             <a:r>
               <a:rPr lang="en-US" dirty="0" smtClean="0"/>
@@ -4793,7 +5662,7 @@
 </p:sld>
 </file>
 
-<file path=ppt/slides/slide17.xml><?xml version="1.0" encoding="utf-8"?>
+<file path=ppt/slides/slide22.xml><?xml version="1.0" encoding="utf-8"?>
 <p:sld xmlns:a="http://schemas.openxmlformats.org/drawingml/2006/main" xmlns:r="http://schemas.openxmlformats.org/officeDocument/2006/relationships" xmlns:p="http://schemas.openxmlformats.org/presentationml/2006/main">
   <p:cSld>
     <p:spTree>
@@ -4867,7 +5736,7 @@
 </p:sld>
 </file>
 
-<file path=ppt/slides/slide18.xml><?xml version="1.0" encoding="utf-8"?>
+<file path=ppt/slides/slide23.xml><?xml version="1.0" encoding="utf-8"?>
 <p:sld xmlns:a="http://schemas.openxmlformats.org/drawingml/2006/main" xmlns:r="http://schemas.openxmlformats.org/officeDocument/2006/relationships" xmlns:p="http://schemas.openxmlformats.org/presentationml/2006/main">
   <p:cSld>
     <p:spTree>
@@ -5182,7 +6051,7 @@
 </p:sld>
 </file>
 
-<file path=ppt/slides/slide19.xml><?xml version="1.0" encoding="utf-8"?>
+<file path=ppt/slides/slide24.xml><?xml version="1.0" encoding="utf-8"?>
 <p:sld xmlns:a="http://schemas.openxmlformats.org/drawingml/2006/main" xmlns:r="http://schemas.openxmlformats.org/officeDocument/2006/relationships" xmlns:p="http://schemas.openxmlformats.org/presentationml/2006/main">
   <p:cSld>
     <p:spTree>
@@ -5247,186 +6116,7 @@
 </p:sld>
 </file>
 
-<file path=ppt/slides/slide2.xml><?xml version="1.0" encoding="utf-8"?>
-<p:sld xmlns:a="http://schemas.openxmlformats.org/drawingml/2006/main" xmlns:r="http://schemas.openxmlformats.org/officeDocument/2006/relationships" xmlns:p="http://schemas.openxmlformats.org/presentationml/2006/main">
-  <p:cSld>
-    <p:spTree>
-      <p:nvGrpSpPr>
-        <p:cNvPr id="1" name=""/>
-        <p:cNvGrpSpPr/>
-        <p:nvPr/>
-      </p:nvGrpSpPr>
-      <p:grpSpPr>
-        <a:xfrm>
-          <a:off x="0" y="0"/>
-          <a:ext cx="0" cy="0"/>
-          <a:chOff x="0" y="0"/>
-          <a:chExt cx="0" cy="0"/>
-        </a:xfrm>
-      </p:grpSpPr>
-      <p:sp>
-        <p:nvSpPr>
-          <p:cNvPr id="2" name="Title 1"/>
-          <p:cNvSpPr>
-            <a:spLocks noGrp="1"/>
-          </p:cNvSpPr>
-          <p:nvPr>
-            <p:ph type="title"/>
-          </p:nvPr>
-        </p:nvSpPr>
-        <p:spPr>
-          <a:noFill/>
-          <a:ln>
-            <a:solidFill>
-              <a:schemeClr val="tx1"/>
-            </a:solidFill>
-          </a:ln>
-        </p:spPr>
-        <p:txBody>
-          <a:bodyPr>
-            <a:noAutofit/>
-          </a:bodyPr>
-          <a:lstStyle/>
-          <a:p>
-            <a:r>
-              <a:rPr lang="ru-RU" sz="2400" i="1" dirty="0">
-                <a:solidFill>
-                  <a:srgbClr val="FFFF00"/>
-                </a:solidFill>
-              </a:rPr>
-              <a:t>Язык программирования C# 5.0 и платформа .NET </a:t>
-            </a:r>
-            <a:r>
-              <a:rPr lang="ru-RU" sz="2400" i="1" dirty="0" smtClean="0">
-                <a:solidFill>
-                  <a:srgbClr val="FFFF00"/>
-                </a:solidFill>
-              </a:rPr>
-              <a:t>4.5</a:t>
-            </a:r>
-            <a:r>
-              <a:rPr lang="en-US" sz="2400" dirty="0" smtClean="0"/>
-              <a:t/>
-            </a:r>
-            <a:br>
-              <a:rPr lang="en-US" sz="2400" dirty="0" smtClean="0"/>
-            </a:br>
-            <a:r>
-              <a:rPr lang="ru-RU" sz="2400" dirty="0"/>
-              <a:t>Эндрю </a:t>
-            </a:r>
-            <a:r>
-              <a:rPr lang="ru-RU" sz="2400" dirty="0" smtClean="0"/>
-              <a:t>Троелсен</a:t>
-            </a:r>
-            <a:endParaRPr lang="ru-RU" sz="2400" dirty="0"/>
-          </a:p>
-        </p:txBody>
-      </p:sp>
-      <p:sp>
-        <p:nvSpPr>
-          <p:cNvPr id="3" name="Content Placeholder 2"/>
-          <p:cNvSpPr>
-            <a:spLocks noGrp="1"/>
-          </p:cNvSpPr>
-          <p:nvPr>
-            <p:ph idx="1"/>
-          </p:nvPr>
-        </p:nvSpPr>
-        <p:spPr>
-          <a:xfrm>
-            <a:off x="3131840" y="1568450"/>
-            <a:ext cx="5554960" cy="4525963"/>
-          </a:xfrm>
-        </p:spPr>
-        <p:txBody>
-          <a:bodyPr anchor="t" anchorCtr="0">
-            <a:normAutofit/>
-          </a:bodyPr>
-          <a:lstStyle/>
-          <a:p>
-            <a:pPr marL="0" indent="0">
-              <a:buNone/>
-            </a:pPr>
-            <a:r>
-              <a:rPr lang="ru-RU" sz="2800" dirty="0" smtClean="0"/>
-              <a:t>Хорошая книга для начинающих. Автор описывает базовые возможности языка; объясняет механизмы ООП; рассказывает о работе с БД; дает введение в технологии </a:t>
-            </a:r>
-            <a:r>
-              <a:rPr lang="en-US" sz="2800" dirty="0" smtClean="0"/>
-              <a:t>WPF </a:t>
-            </a:r>
-            <a:r>
-              <a:rPr lang="ru-RU" sz="2800" dirty="0" smtClean="0"/>
-              <a:t>и </a:t>
-            </a:r>
-            <a:r>
-              <a:rPr lang="en-US" sz="2800" dirty="0" smtClean="0"/>
-              <a:t>ASP.NET </a:t>
-            </a:r>
-            <a:r>
-              <a:rPr lang="en-US" sz="2800" dirty="0" err="1" smtClean="0"/>
-              <a:t>WebForms</a:t>
-            </a:r>
-            <a:r>
-              <a:rPr lang="en-US" sz="2800" dirty="0" smtClean="0"/>
-              <a:t>.</a:t>
-            </a:r>
-            <a:endParaRPr lang="ru-RU" sz="2800" dirty="0"/>
-          </a:p>
-        </p:txBody>
-      </p:sp>
-      <p:pic>
-        <p:nvPicPr>
-          <p:cNvPr id="4" name="Picture 3"/>
-          <p:cNvPicPr>
-            <a:picLocks noChangeAspect="1"/>
-          </p:cNvPicPr>
-          <p:nvPr/>
-        </p:nvPicPr>
-        <p:blipFill>
-          <a:blip r:embed="rId2">
-            <a:extLst>
-              <a:ext uri="{28A0092B-C50C-407E-A947-70E740481C1C}">
-                <a14:useLocalDpi xmlns:a14="http://schemas.microsoft.com/office/drawing/2010/main" val="0"/>
-              </a:ext>
-            </a:extLst>
-          </a:blip>
-          <a:stretch>
-            <a:fillRect/>
-          </a:stretch>
-        </p:blipFill>
-        <p:spPr>
-          <a:xfrm>
-            <a:off x="467544" y="1568450"/>
-            <a:ext cx="2520000" cy="3691800"/>
-          </a:xfrm>
-          <a:prstGeom prst="rect">
-            <a:avLst/>
-          </a:prstGeom>
-        </p:spPr>
-      </p:pic>
-    </p:spTree>
-    <p:extLst>
-      <p:ext uri="{BB962C8B-B14F-4D97-AF65-F5344CB8AC3E}">
-        <p14:creationId xmlns:p14="http://schemas.microsoft.com/office/powerpoint/2010/main" val="2755117374"/>
-      </p:ext>
-    </p:extLst>
-  </p:cSld>
-  <p:clrMapOvr>
-    <a:masterClrMapping/>
-  </p:clrMapOvr>
-  <p:timing>
-    <p:tnLst>
-      <p:par>
-        <p:cTn id="1" dur="indefinite" restart="never" nodeType="tmRoot"/>
-      </p:par>
-    </p:tnLst>
-  </p:timing>
-</p:sld>
-</file>
-
-<file path=ppt/slides/slide20.xml><?xml version="1.0" encoding="utf-8"?>
+<file path=ppt/slides/slide25.xml><?xml version="1.0" encoding="utf-8"?>
 <p:sld xmlns:a="http://schemas.openxmlformats.org/drawingml/2006/main" xmlns:r="http://schemas.openxmlformats.org/officeDocument/2006/relationships" xmlns:p="http://schemas.openxmlformats.org/presentationml/2006/main">
   <p:cSld>
     <p:spTree>
@@ -5607,7 +6297,7 @@
 </p:sld>
 </file>
 
-<file path=ppt/slides/slide21.xml><?xml version="1.0" encoding="utf-8"?>
+<file path=ppt/slides/slide26.xml><?xml version="1.0" encoding="utf-8"?>
 <p:sld xmlns:a="http://schemas.openxmlformats.org/drawingml/2006/main" xmlns:r="http://schemas.openxmlformats.org/officeDocument/2006/relationships" xmlns:p="http://schemas.openxmlformats.org/presentationml/2006/main">
   <p:cSld>
     <p:spTree>
@@ -5674,7 +6364,7 @@
 </p:sld>
 </file>
 
-<file path=ppt/slides/slide22.xml><?xml version="1.0" encoding="utf-8"?>
+<file path=ppt/slides/slide27.xml><?xml version="1.0" encoding="utf-8"?>
 <p:sld xmlns:a="http://schemas.openxmlformats.org/drawingml/2006/main" xmlns:r="http://schemas.openxmlformats.org/officeDocument/2006/relationships" xmlns:p="http://schemas.openxmlformats.org/presentationml/2006/main">
   <p:cSld>
     <p:spTree>
@@ -5821,7 +6511,7 @@
 </p:sld>
 </file>
 
-<file path=ppt/slides/slide23.xml><?xml version="1.0" encoding="utf-8"?>
+<file path=ppt/slides/slide28.xml><?xml version="1.0" encoding="utf-8"?>
 <p:sld xmlns:a="http://schemas.openxmlformats.org/drawingml/2006/main" xmlns:r="http://schemas.openxmlformats.org/officeDocument/2006/relationships" xmlns:p="http://schemas.openxmlformats.org/presentationml/2006/main">
   <p:cSld>
     <p:spTree>
@@ -5968,6 +6658,252 @@
                   <a:srgbClr val="FFFF00"/>
                 </a:solidFill>
               </a:rPr>
+              <a:t>Язык программирования C# 5.0 и платформа .NET </a:t>
+            </a:r>
+            <a:r>
+              <a:rPr lang="ru-RU" sz="2400" i="1" dirty="0" smtClean="0">
+                <a:solidFill>
+                  <a:srgbClr val="FFFF00"/>
+                </a:solidFill>
+              </a:rPr>
+              <a:t>4.5</a:t>
+            </a:r>
+            <a:r>
+              <a:rPr lang="en-US" sz="2400" dirty="0" smtClean="0"/>
+              <a:t/>
+            </a:r>
+            <a:br>
+              <a:rPr lang="en-US" sz="2400" dirty="0" smtClean="0"/>
+            </a:br>
+            <a:r>
+              <a:rPr lang="ru-RU" sz="2400" dirty="0"/>
+              <a:t>Эндрю </a:t>
+            </a:r>
+            <a:r>
+              <a:rPr lang="ru-RU" sz="2400" dirty="0" smtClean="0"/>
+              <a:t>Троелсен</a:t>
+            </a:r>
+            <a:endParaRPr lang="ru-RU" sz="2400" dirty="0"/>
+          </a:p>
+        </p:txBody>
+      </p:sp>
+      <p:sp>
+        <p:nvSpPr>
+          <p:cNvPr id="3" name="Content Placeholder 2"/>
+          <p:cNvSpPr>
+            <a:spLocks noGrp="1"/>
+          </p:cNvSpPr>
+          <p:nvPr>
+            <p:ph idx="1"/>
+          </p:nvPr>
+        </p:nvSpPr>
+        <p:spPr>
+          <a:xfrm>
+            <a:off x="3131840" y="1568450"/>
+            <a:ext cx="5554960" cy="4525963"/>
+          </a:xfrm>
+        </p:spPr>
+        <p:txBody>
+          <a:bodyPr anchor="t" anchorCtr="0">
+            <a:normAutofit/>
+          </a:bodyPr>
+          <a:lstStyle/>
+          <a:p>
+            <a:pPr marL="0" indent="0">
+              <a:buNone/>
+            </a:pPr>
+            <a:r>
+              <a:rPr lang="ru-RU" sz="2800" dirty="0" smtClean="0"/>
+              <a:t>Хорошая книга для начинающих. Автор описывает базовые возможности языка; объясняет механизмы ООП; рассказывает о работе с БД; дает введение в технологии </a:t>
+            </a:r>
+            <a:r>
+              <a:rPr lang="en-US" sz="2800" dirty="0" smtClean="0"/>
+              <a:t>WPF </a:t>
+            </a:r>
+            <a:r>
+              <a:rPr lang="ru-RU" sz="2800" dirty="0" smtClean="0"/>
+              <a:t>и </a:t>
+            </a:r>
+            <a:r>
+              <a:rPr lang="en-US" sz="2800" dirty="0" smtClean="0"/>
+              <a:t>ASP.NET </a:t>
+            </a:r>
+            <a:r>
+              <a:rPr lang="en-US" sz="2800" dirty="0" err="1" smtClean="0"/>
+              <a:t>WebForms</a:t>
+            </a:r>
+            <a:r>
+              <a:rPr lang="en-US" sz="2800" dirty="0" smtClean="0"/>
+              <a:t>.</a:t>
+            </a:r>
+            <a:endParaRPr lang="ru-RU" sz="2800" dirty="0"/>
+          </a:p>
+        </p:txBody>
+      </p:sp>
+      <p:pic>
+        <p:nvPicPr>
+          <p:cNvPr id="4" name="Picture 3"/>
+          <p:cNvPicPr>
+            <a:picLocks noChangeAspect="1"/>
+          </p:cNvPicPr>
+          <p:nvPr/>
+        </p:nvPicPr>
+        <p:blipFill>
+          <a:blip r:embed="rId2">
+            <a:extLst>
+              <a:ext uri="{28A0092B-C50C-407E-A947-70E740481C1C}">
+                <a14:useLocalDpi xmlns:a14="http://schemas.microsoft.com/office/drawing/2010/main" val="0"/>
+              </a:ext>
+            </a:extLst>
+          </a:blip>
+          <a:stretch>
+            <a:fillRect/>
+          </a:stretch>
+        </p:blipFill>
+        <p:spPr>
+          <a:xfrm>
+            <a:off x="467544" y="1568450"/>
+            <a:ext cx="2520000" cy="3691800"/>
+          </a:xfrm>
+          <a:prstGeom prst="rect">
+            <a:avLst/>
+          </a:prstGeom>
+        </p:spPr>
+      </p:pic>
+    </p:spTree>
+    <p:extLst>
+      <p:ext uri="{BB962C8B-B14F-4D97-AF65-F5344CB8AC3E}">
+        <p14:creationId xmlns:p14="http://schemas.microsoft.com/office/powerpoint/2010/main" val="2755117374"/>
+      </p:ext>
+    </p:extLst>
+  </p:cSld>
+  <p:clrMapOvr>
+    <a:masterClrMapping/>
+  </p:clrMapOvr>
+  <p:timing>
+    <p:tnLst>
+      <p:par>
+        <p:cTn id="1" dur="indefinite" restart="never" nodeType="tmRoot"/>
+      </p:par>
+    </p:tnLst>
+  </p:timing>
+</p:sld>
+</file>
+
+<file path=ppt/slides/slide4.xml><?xml version="1.0" encoding="utf-8"?>
+<p:sld xmlns:a="http://schemas.openxmlformats.org/drawingml/2006/main" xmlns:r="http://schemas.openxmlformats.org/officeDocument/2006/relationships" xmlns:p="http://schemas.openxmlformats.org/presentationml/2006/main">
+  <p:cSld>
+    <p:spTree>
+      <p:nvGrpSpPr>
+        <p:cNvPr id="1" name=""/>
+        <p:cNvGrpSpPr/>
+        <p:nvPr/>
+      </p:nvGrpSpPr>
+      <p:grpSpPr>
+        <a:xfrm>
+          <a:off x="0" y="0"/>
+          <a:ext cx="0" cy="0"/>
+          <a:chOff x="0" y="0"/>
+          <a:chExt cx="0" cy="0"/>
+        </a:xfrm>
+      </p:grpSpPr>
+      <p:sp>
+        <p:nvSpPr>
+          <p:cNvPr id="2" name="Title 1"/>
+          <p:cNvSpPr>
+            <a:spLocks noGrp="1"/>
+          </p:cNvSpPr>
+          <p:nvPr>
+            <p:ph type="title"/>
+          </p:nvPr>
+        </p:nvSpPr>
+        <p:spPr>
+          <a:xfrm>
+            <a:off x="457200" y="2459174"/>
+            <a:ext cx="8229600" cy="1939652"/>
+          </a:xfrm>
+        </p:spPr>
+        <p:txBody>
+          <a:bodyPr>
+            <a:normAutofit/>
+          </a:bodyPr>
+          <a:lstStyle/>
+          <a:p>
+            <a:r>
+              <a:rPr lang="ru-RU" dirty="0" smtClean="0"/>
+              <a:t>Для продолжающих</a:t>
+            </a:r>
+            <a:endParaRPr lang="ru-RU" dirty="0"/>
+          </a:p>
+        </p:txBody>
+      </p:sp>
+    </p:spTree>
+    <p:extLst>
+      <p:ext uri="{BB962C8B-B14F-4D97-AF65-F5344CB8AC3E}">
+        <p14:creationId xmlns:p14="http://schemas.microsoft.com/office/powerpoint/2010/main" val="1399673045"/>
+      </p:ext>
+    </p:extLst>
+  </p:cSld>
+  <p:clrMapOvr>
+    <a:masterClrMapping/>
+  </p:clrMapOvr>
+  <p:timing>
+    <p:tnLst>
+      <p:par>
+        <p:cTn id="1" dur="indefinite" restart="never" nodeType="tmRoot"/>
+      </p:par>
+    </p:tnLst>
+  </p:timing>
+</p:sld>
+</file>
+
+<file path=ppt/slides/slide5.xml><?xml version="1.0" encoding="utf-8"?>
+<p:sld xmlns:a="http://schemas.openxmlformats.org/drawingml/2006/main" xmlns:r="http://schemas.openxmlformats.org/officeDocument/2006/relationships" xmlns:p="http://schemas.openxmlformats.org/presentationml/2006/main">
+  <p:cSld>
+    <p:spTree>
+      <p:nvGrpSpPr>
+        <p:cNvPr id="1" name=""/>
+        <p:cNvGrpSpPr/>
+        <p:nvPr/>
+      </p:nvGrpSpPr>
+      <p:grpSpPr>
+        <a:xfrm>
+          <a:off x="0" y="0"/>
+          <a:ext cx="0" cy="0"/>
+          <a:chOff x="0" y="0"/>
+          <a:chExt cx="0" cy="0"/>
+        </a:xfrm>
+      </p:grpSpPr>
+      <p:sp>
+        <p:nvSpPr>
+          <p:cNvPr id="2" name="Title 1"/>
+          <p:cNvSpPr>
+            <a:spLocks noGrp="1"/>
+          </p:cNvSpPr>
+          <p:nvPr>
+            <p:ph type="title"/>
+          </p:nvPr>
+        </p:nvSpPr>
+        <p:spPr>
+          <a:noFill/>
+          <a:ln>
+            <a:solidFill>
+              <a:schemeClr val="tx1"/>
+            </a:solidFill>
+          </a:ln>
+        </p:spPr>
+        <p:txBody>
+          <a:bodyPr>
+            <a:noAutofit/>
+          </a:bodyPr>
+          <a:lstStyle/>
+          <a:p>
+            <a:r>
+              <a:rPr lang="ru-RU" sz="2400" i="1" dirty="0">
+                <a:solidFill>
+                  <a:srgbClr val="FFFF00"/>
+                </a:solidFill>
+              </a:rPr>
               <a:t>CLR via C#. Программирование на платформе Microsoft .NET Framework 4.5 на языке C#</a:t>
             </a:r>
             <a:r>
@@ -6044,7 +6980,15 @@
             </a:r>
             <a:r>
               <a:rPr lang="en-US" sz="2800" dirty="0" smtClean="0"/>
-              <a:t>C#, VB.NET, F# b </a:t>
+              <a:t>C#, VB.NET, F# </a:t>
+            </a:r>
+            <a:r>
+              <a:rPr lang="ru-RU" sz="2800" dirty="0" smtClean="0"/>
+              <a:t>и</a:t>
+            </a:r>
+            <a:r>
+              <a:rPr lang="en-US" sz="2800" dirty="0" smtClean="0"/>
+              <a:t> </a:t>
             </a:r>
             <a:r>
               <a:rPr lang="ru-RU" sz="2800" dirty="0" smtClean="0"/>
@@ -6108,7 +7052,7 @@
 </p:sld>
 </file>
 
-<file path=ppt/slides/slide4.xml><?xml version="1.0" encoding="utf-8"?>
+<file path=ppt/slides/slide6.xml><?xml version="1.0" encoding="utf-8"?>
 <p:sld xmlns:a="http://schemas.openxmlformats.org/drawingml/2006/main" xmlns:r="http://schemas.openxmlformats.org/officeDocument/2006/relationships" xmlns:p="http://schemas.openxmlformats.org/presentationml/2006/main">
   <p:cSld>
     <p:spTree>
@@ -6329,7 +7273,7 @@
 </p:sld>
 </file>
 
-<file path=ppt/slides/slide5.xml><?xml version="1.0" encoding="utf-8"?>
+<file path=ppt/slides/slide7.xml><?xml version="1.0" encoding="utf-8"?>
 <p:sld xmlns:a="http://schemas.openxmlformats.org/drawingml/2006/main" xmlns:r="http://schemas.openxmlformats.org/officeDocument/2006/relationships" xmlns:p="http://schemas.openxmlformats.org/presentationml/2006/main">
   <p:cSld>
     <p:spTree>
@@ -6488,7 +7432,7 @@
 </p:sld>
 </file>
 
-<file path=ppt/slides/slide6.xml><?xml version="1.0" encoding="utf-8"?>
+<file path=ppt/slides/slide8.xml><?xml version="1.0" encoding="utf-8"?>
 <p:sld xmlns:a="http://schemas.openxmlformats.org/drawingml/2006/main" xmlns:r="http://schemas.openxmlformats.org/officeDocument/2006/relationships" xmlns:p="http://schemas.openxmlformats.org/presentationml/2006/main">
   <p:cSld>
     <p:spTree>
@@ -6698,239 +7642,6 @@
 </p:sld>
 </file>
 
-<file path=ppt/slides/slide7.xml><?xml version="1.0" encoding="utf-8"?>
-<p:sld xmlns:a="http://schemas.openxmlformats.org/drawingml/2006/main" xmlns:r="http://schemas.openxmlformats.org/officeDocument/2006/relationships" xmlns:p="http://schemas.openxmlformats.org/presentationml/2006/main">
-  <p:cSld>
-    <p:spTree>
-      <p:nvGrpSpPr>
-        <p:cNvPr id="1" name=""/>
-        <p:cNvGrpSpPr/>
-        <p:nvPr/>
-      </p:nvGrpSpPr>
-      <p:grpSpPr>
-        <a:xfrm>
-          <a:off x="0" y="0"/>
-          <a:ext cx="0" cy="0"/>
-          <a:chOff x="0" y="0"/>
-          <a:chExt cx="0" cy="0"/>
-        </a:xfrm>
-      </p:grpSpPr>
-      <p:sp>
-        <p:nvSpPr>
-          <p:cNvPr id="2" name="Title 1"/>
-          <p:cNvSpPr>
-            <a:spLocks noGrp="1"/>
-          </p:cNvSpPr>
-          <p:nvPr>
-            <p:ph type="title"/>
-          </p:nvPr>
-        </p:nvSpPr>
-        <p:spPr>
-          <a:xfrm>
-            <a:off x="457200" y="2459174"/>
-            <a:ext cx="8229600" cy="1939652"/>
-          </a:xfrm>
-        </p:spPr>
-        <p:txBody>
-          <a:bodyPr>
-            <a:normAutofit fontScale="90000"/>
-          </a:bodyPr>
-          <a:lstStyle/>
-          <a:p>
-            <a:r>
-              <a:rPr lang="ru-RU" dirty="0" smtClean="0"/>
-              <a:t>Объектно-ориентированное программирование и проектирование</a:t>
-            </a:r>
-            <a:endParaRPr lang="ru-RU" dirty="0"/>
-          </a:p>
-        </p:txBody>
-      </p:sp>
-    </p:spTree>
-    <p:extLst>
-      <p:ext uri="{BB962C8B-B14F-4D97-AF65-F5344CB8AC3E}">
-        <p14:creationId xmlns:p14="http://schemas.microsoft.com/office/powerpoint/2010/main" val="1698115381"/>
-      </p:ext>
-    </p:extLst>
-  </p:cSld>
-  <p:clrMapOvr>
-    <a:masterClrMapping/>
-  </p:clrMapOvr>
-  <p:timing>
-    <p:tnLst>
-      <p:par>
-        <p:cTn id="1" dur="indefinite" restart="never" nodeType="tmRoot"/>
-      </p:par>
-    </p:tnLst>
-  </p:timing>
-</p:sld>
-</file>
-
-<file path=ppt/slides/slide8.xml><?xml version="1.0" encoding="utf-8"?>
-<p:sld xmlns:a="http://schemas.openxmlformats.org/drawingml/2006/main" xmlns:r="http://schemas.openxmlformats.org/officeDocument/2006/relationships" xmlns:p="http://schemas.openxmlformats.org/presentationml/2006/main">
-  <p:cSld>
-    <p:spTree>
-      <p:nvGrpSpPr>
-        <p:cNvPr id="1" name=""/>
-        <p:cNvGrpSpPr/>
-        <p:nvPr/>
-      </p:nvGrpSpPr>
-      <p:grpSpPr>
-        <a:xfrm>
-          <a:off x="0" y="0"/>
-          <a:ext cx="0" cy="0"/>
-          <a:chOff x="0" y="0"/>
-          <a:chExt cx="0" cy="0"/>
-        </a:xfrm>
-      </p:grpSpPr>
-      <p:sp>
-        <p:nvSpPr>
-          <p:cNvPr id="2" name="Title 1"/>
-          <p:cNvSpPr>
-            <a:spLocks noGrp="1"/>
-          </p:cNvSpPr>
-          <p:nvPr>
-            <p:ph type="title"/>
-          </p:nvPr>
-        </p:nvSpPr>
-        <p:spPr>
-          <a:noFill/>
-          <a:ln>
-            <a:solidFill>
-              <a:schemeClr val="tx1"/>
-            </a:solidFill>
-          </a:ln>
-        </p:spPr>
-        <p:txBody>
-          <a:bodyPr>
-            <a:noAutofit/>
-          </a:bodyPr>
-          <a:lstStyle/>
-          <a:p>
-            <a:r>
-              <a:rPr lang="ru-RU" sz="2400" i="1" dirty="0">
-                <a:solidFill>
-                  <a:srgbClr val="FFFF00"/>
-                </a:solidFill>
-              </a:rPr>
-              <a:t>Объектно-ориентированный анализ и проектирование с примерами </a:t>
-            </a:r>
-            <a:r>
-              <a:rPr lang="ru-RU" sz="2400" i="1" dirty="0" smtClean="0">
-                <a:solidFill>
-                  <a:srgbClr val="FFFF00"/>
-                </a:solidFill>
-              </a:rPr>
-              <a:t>приложений</a:t>
-            </a:r>
-            <a:r>
-              <a:rPr lang="en-US" sz="2400" i="1" dirty="0" smtClean="0"/>
-              <a:t/>
-            </a:r>
-            <a:br>
-              <a:rPr lang="en-US" sz="2400" i="1" dirty="0" smtClean="0"/>
-            </a:br>
-            <a:r>
-              <a:rPr lang="ru-RU" sz="2400" dirty="0" smtClean="0"/>
-              <a:t>Гради Буч</a:t>
-            </a:r>
-            <a:endParaRPr lang="ru-RU" sz="2400" dirty="0"/>
-          </a:p>
-        </p:txBody>
-      </p:sp>
-      <p:sp>
-        <p:nvSpPr>
-          <p:cNvPr id="3" name="Content Placeholder 2"/>
-          <p:cNvSpPr>
-            <a:spLocks noGrp="1"/>
-          </p:cNvSpPr>
-          <p:nvPr>
-            <p:ph idx="1"/>
-          </p:nvPr>
-        </p:nvSpPr>
-        <p:spPr>
-          <a:xfrm>
-            <a:off x="3131840" y="1600200"/>
-            <a:ext cx="5554960" cy="4525963"/>
-          </a:xfrm>
-        </p:spPr>
-        <p:txBody>
-          <a:bodyPr anchor="t" anchorCtr="0">
-            <a:normAutofit fontScale="92500" lnSpcReduction="20000"/>
-          </a:bodyPr>
-          <a:lstStyle/>
-          <a:p>
-            <a:pPr marL="0" indent="0">
-              <a:buNone/>
-            </a:pPr>
-            <a:r>
-              <a:rPr lang="ru-RU" dirty="0" smtClean="0"/>
-              <a:t>В книге описываются </a:t>
-            </a:r>
-            <a:r>
-              <a:rPr lang="ru-RU" dirty="0"/>
-              <a:t>объектные методы решения сложных проблем, связанные с разработкой систем и программного обеспечения. Используя многочисленные примеры, </a:t>
-            </a:r>
-            <a:r>
-              <a:rPr lang="ru-RU" dirty="0" smtClean="0"/>
-              <a:t>иллюстрируются </a:t>
-            </a:r>
-            <a:r>
-              <a:rPr lang="ru-RU" dirty="0"/>
-              <a:t>основные концепции объектно-ориентированного подхода на примере разработки систем управления, сбора данных и искусственного интеллекта.</a:t>
-            </a:r>
-          </a:p>
-        </p:txBody>
-      </p:sp>
-      <p:pic>
-        <p:nvPicPr>
-          <p:cNvPr id="4" name="Picture 3"/>
-          <p:cNvPicPr>
-            <a:picLocks noChangeAspect="1"/>
-          </p:cNvPicPr>
-          <p:nvPr/>
-        </p:nvPicPr>
-        <p:blipFill>
-          <a:blip r:embed="rId2">
-            <a:extLst>
-              <a:ext uri="{28A0092B-C50C-407E-A947-70E740481C1C}">
-                <a14:useLocalDpi xmlns:a14="http://schemas.microsoft.com/office/drawing/2010/main" val="0"/>
-              </a:ext>
-            </a:extLst>
-          </a:blip>
-          <a:stretch>
-            <a:fillRect/>
-          </a:stretch>
-        </p:blipFill>
-        <p:spPr>
-          <a:xfrm>
-            <a:off x="467544" y="1600200"/>
-            <a:ext cx="2520000" cy="3578400"/>
-          </a:xfrm>
-          <a:prstGeom prst="rect">
-            <a:avLst/>
-          </a:prstGeom>
-        </p:spPr>
-      </p:pic>
-    </p:spTree>
-    <p:extLst>
-      <p:ext uri="{BB962C8B-B14F-4D97-AF65-F5344CB8AC3E}">
-        <p14:creationId xmlns:p14="http://schemas.microsoft.com/office/powerpoint/2010/main" val="3217659103"/>
-      </p:ext>
-    </p:extLst>
-  </p:cSld>
-  <p:clrMapOvr>
-    <a:masterClrMapping/>
-  </p:clrMapOvr>
-  <p:timing>
-    <p:tnLst>
-      <p:par>
-        <p:cTn id="1" dur="indefinite" restart="never" nodeType="tmRoot"/>
-      </p:par>
-    </p:tnLst>
-  </p:timing>
-</p:sld>
-</file>
-
 <file path=ppt/slides/slide9.xml><?xml version="1.0" encoding="utf-8"?>
 <p:sld xmlns:a="http://schemas.openxmlformats.org/drawingml/2006/main" xmlns:r="http://schemas.openxmlformats.org/officeDocument/2006/relationships" xmlns:p="http://schemas.openxmlformats.org/presentationml/2006/main">
   <p:cSld>
@@ -6959,161 +7670,43 @@
           </p:nvPr>
         </p:nvSpPr>
         <p:spPr>
-          <a:noFill/>
-          <a:ln>
-            <a:solidFill>
-              <a:schemeClr val="tx1"/>
-            </a:solidFill>
-          </a:ln>
+          <a:xfrm>
+            <a:off x="457200" y="2459174"/>
+            <a:ext cx="8229600" cy="1939652"/>
+          </a:xfrm>
         </p:spPr>
         <p:txBody>
           <a:bodyPr>
-            <a:noAutofit/>
+            <a:normAutofit fontScale="90000"/>
           </a:bodyPr>
           <a:lstStyle/>
           <a:p>
             <a:r>
-              <a:rPr lang="ru-RU" sz="2400" i="1" smtClean="0">
-                <a:solidFill>
-                  <a:srgbClr val="FFFF00"/>
-                </a:solidFill>
-              </a:rPr>
-              <a:t>Объектно-ориентированное конструирование программных систем</a:t>
-            </a:r>
-            <a:r>
-              <a:rPr lang="en-US" sz="2400" i="1" smtClean="0">
-                <a:solidFill>
-                  <a:srgbClr val="FFFF00"/>
-                </a:solidFill>
-              </a:rPr>
-              <a:t/>
-            </a:r>
-            <a:br>
-              <a:rPr lang="en-US" sz="2400" i="1" smtClean="0">
-                <a:solidFill>
-                  <a:srgbClr val="FFFF00"/>
-                </a:solidFill>
-              </a:rPr>
-            </a:br>
-            <a:r>
-              <a:rPr lang="ru-RU" sz="2400" smtClean="0"/>
-              <a:t>Бертран Мейер</a:t>
-            </a:r>
-            <a:endParaRPr lang="ru-RU" sz="2400" dirty="0"/>
-          </a:p>
-        </p:txBody>
-      </p:sp>
-      <p:sp>
-        <p:nvSpPr>
-          <p:cNvPr id="3" name="Content Placeholder 2"/>
-          <p:cNvSpPr>
-            <a:spLocks noGrp="1"/>
-          </p:cNvSpPr>
-          <p:nvPr>
-            <p:ph idx="1"/>
-          </p:nvPr>
-        </p:nvSpPr>
-        <p:spPr>
-          <a:xfrm>
-            <a:off x="3131840" y="1600200"/>
-            <a:ext cx="5554960" cy="4525963"/>
-          </a:xfrm>
-        </p:spPr>
-        <p:txBody>
-          <a:bodyPr anchor="t" anchorCtr="0">
-            <a:normAutofit/>
-          </a:bodyPr>
-          <a:lstStyle/>
-          <a:p>
-            <a:pPr marL="0" indent="0">
-              <a:buNone/>
-            </a:pPr>
-            <a:r>
-              <a:rPr lang="ru-RU" sz="2000" dirty="0" smtClean="0"/>
-              <a:t>Книга посвящена обоснованию и технологии применения объектного подхода при разработке программных систем. Основное внимание уделяется вопросам качества, повторного использования и расширяемости проектируемых систем. </a:t>
-            </a:r>
-            <a:br>
-              <a:rPr lang="ru-RU" sz="2000" dirty="0" smtClean="0"/>
-            </a:br>
-            <a:r>
-              <a:rPr lang="ru-RU" sz="2000" dirty="0" smtClean="0"/>
-              <a:t/>
-            </a:r>
-            <a:br>
-              <a:rPr lang="ru-RU" sz="2000" dirty="0" smtClean="0"/>
-            </a:br>
-            <a:r>
-              <a:rPr lang="ru-RU" sz="2000" dirty="0" smtClean="0"/>
-              <a:t>Рассматриваемый объектный подход охватывает весь жизненный цикл разработки - анализ, проектирование, программирование и сопровождение.</a:t>
-            </a:r>
-            <a:endParaRPr lang="en-US" sz="2000" dirty="0" smtClean="0"/>
-          </a:p>
-          <a:p>
-            <a:pPr marL="0" indent="0">
-              <a:buNone/>
-            </a:pPr>
-            <a:endParaRPr lang="en-US" sz="2000" dirty="0" smtClean="0"/>
-          </a:p>
-          <a:p>
-            <a:pPr marL="0" indent="0">
-              <a:buNone/>
-            </a:pPr>
-            <a:r>
-              <a:rPr lang="en-US" sz="2000" dirty="0" smtClean="0"/>
-              <a:t>http://www.ozon.ru/context/detail/id/2336754/</a:t>
-            </a:r>
-            <a:endParaRPr lang="ru-RU" sz="2000" dirty="0"/>
-          </a:p>
-        </p:txBody>
-      </p:sp>
-      <p:pic>
-        <p:nvPicPr>
-          <p:cNvPr id="5" name="Picture 4"/>
-          <p:cNvPicPr>
-            <a:picLocks noChangeAspect="1"/>
-          </p:cNvPicPr>
-          <p:nvPr/>
-        </p:nvPicPr>
-        <p:blipFill>
-          <a:blip r:embed="rId2">
-            <a:extLst>
-              <a:ext uri="{28A0092B-C50C-407E-A947-70E740481C1C}">
-                <a14:useLocalDpi xmlns:a14="http://schemas.microsoft.com/office/drawing/2010/main" val="0"/>
-              </a:ext>
-            </a:extLst>
-          </a:blip>
-          <a:stretch>
-            <a:fillRect/>
-          </a:stretch>
-        </p:blipFill>
-        <p:spPr>
-          <a:xfrm>
-            <a:off x="467544" y="1574800"/>
-            <a:ext cx="2540000" cy="3708400"/>
-          </a:xfrm>
-          <a:prstGeom prst="rect">
-            <a:avLst/>
-          </a:prstGeom>
-        </p:spPr>
-      </p:pic>
+              <a:rPr lang="ru-RU" dirty="0" smtClean="0"/>
+              <a:t>Объектно-ориентированное программирование и </a:t>
+            </a:r>
+            <a:r>
+              <a:rPr lang="ru-RU" dirty="0" smtClean="0"/>
+              <a:t>шаблоны </a:t>
+            </a:r>
+            <a:r>
+              <a:rPr lang="ru-RU" dirty="0" smtClean="0"/>
+              <a:t>проектирования</a:t>
+            </a:r>
+            <a:endParaRPr lang="ru-RU" dirty="0"/>
+          </a:p>
+        </p:txBody>
+      </p:sp>
     </p:spTree>
     <p:extLst>
       <p:ext uri="{BB962C8B-B14F-4D97-AF65-F5344CB8AC3E}">
-        <p14:creationId xmlns:p14="http://schemas.microsoft.com/office/powerpoint/2010/main" val="3884244200"/>
+        <p14:creationId xmlns:p14="http://schemas.microsoft.com/office/powerpoint/2010/main" val="834023638"/>
       </p:ext>
     </p:extLst>
   </p:cSld>
   <p:clrMapOvr>
     <a:masterClrMapping/>
   </p:clrMapOvr>
-  <mc:AlternateContent xmlns:mc="http://schemas.openxmlformats.org/markup-compatibility/2006">
-    <mc:Choice xmlns:p14="http://schemas.microsoft.com/office/powerpoint/2010/main" Requires="p14">
-      <p:transition spd="slow" p14:dur="2000"/>
-    </mc:Choice>
-    <mc:Fallback>
-      <p:transition spd="slow"/>
-    </mc:Fallback>
-  </mc:AlternateContent>
   <p:timing>
     <p:tnLst>
       <p:par>

</xml_diff>